<commit_message>
fix pptx and add some python codes
</commit_message>
<xml_diff>
--- a/1st/2학기_씨앗_1회.pptx
+++ b/1st/2학기_씨앗_1회.pptx
@@ -223,7 +223,7 @@
           <a:p>
             <a:fld id="{8EAE290F-B4E2-4E57-9B1C-CC3C6B9C13A4}" type="datetimeFigureOut">
               <a:rPr lang="ko-KR" altLang="en-US" smtClean="0"/>
-              <a:t>2023-08-21</a:t>
+              <a:t>2023-08-27</a:t>
             </a:fld>
             <a:endParaRPr lang="ko-KR" altLang="en-US"/>
           </a:p>
@@ -637,7 +637,7 @@
           <a:p>
             <a:fld id="{46FB592F-1866-471B-8369-962215E884EB}" type="datetime1">
               <a:rPr lang="ko-KR" altLang="en-US" smtClean="0"/>
-              <a:t>2023-08-21</a:t>
+              <a:t>2023-08-27</a:t>
             </a:fld>
             <a:endParaRPr lang="ko-KR" altLang="en-US"/>
           </a:p>
@@ -835,7 +835,7 @@
           <a:p>
             <a:fld id="{03EC54D9-CEC2-4231-B18A-CD53338DA3F0}" type="datetime1">
               <a:rPr lang="ko-KR" altLang="en-US" smtClean="0"/>
-              <a:t>2023-08-21</a:t>
+              <a:t>2023-08-27</a:t>
             </a:fld>
             <a:endParaRPr lang="ko-KR" altLang="en-US"/>
           </a:p>
@@ -1043,7 +1043,7 @@
           <a:p>
             <a:fld id="{7EEAF396-2D55-444E-B5E5-67A0720F6F65}" type="datetime1">
               <a:rPr lang="ko-KR" altLang="en-US" smtClean="0"/>
-              <a:t>2023-08-21</a:t>
+              <a:t>2023-08-27</a:t>
             </a:fld>
             <a:endParaRPr lang="ko-KR" altLang="en-US"/>
           </a:p>
@@ -1241,7 +1241,7 @@
           <a:p>
             <a:fld id="{B09706D7-5F42-4959-957D-2BFD52762266}" type="datetime1">
               <a:rPr lang="ko-KR" altLang="en-US" smtClean="0"/>
-              <a:t>2023-08-21</a:t>
+              <a:t>2023-08-27</a:t>
             </a:fld>
             <a:endParaRPr lang="ko-KR" altLang="en-US"/>
           </a:p>
@@ -1516,7 +1516,7 @@
           <a:p>
             <a:fld id="{A0E500EC-7C13-4CC6-8CB9-B0533265ED13}" type="datetime1">
               <a:rPr lang="ko-KR" altLang="en-US" smtClean="0"/>
-              <a:t>2023-08-21</a:t>
+              <a:t>2023-08-27</a:t>
             </a:fld>
             <a:endParaRPr lang="ko-KR" altLang="en-US"/>
           </a:p>
@@ -1781,7 +1781,7 @@
           <a:p>
             <a:fld id="{16618C03-306C-4DE6-ABDE-61DA80775B2D}" type="datetime1">
               <a:rPr lang="ko-KR" altLang="en-US" smtClean="0"/>
-              <a:t>2023-08-21</a:t>
+              <a:t>2023-08-27</a:t>
             </a:fld>
             <a:endParaRPr lang="ko-KR" altLang="en-US"/>
           </a:p>
@@ -2193,7 +2193,7 @@
           <a:p>
             <a:fld id="{607ADABE-EE8A-4760-9821-E1E2B3F07092}" type="datetime1">
               <a:rPr lang="ko-KR" altLang="en-US" smtClean="0"/>
-              <a:t>2023-08-21</a:t>
+              <a:t>2023-08-27</a:t>
             </a:fld>
             <a:endParaRPr lang="ko-KR" altLang="en-US"/>
           </a:p>
@@ -2334,7 +2334,7 @@
           <a:p>
             <a:fld id="{FACCEE1C-D4C5-4B15-90C7-373075281ADC}" type="datetime1">
               <a:rPr lang="ko-KR" altLang="en-US" smtClean="0"/>
-              <a:t>2023-08-21</a:t>
+              <a:t>2023-08-27</a:t>
             </a:fld>
             <a:endParaRPr lang="ko-KR" altLang="en-US"/>
           </a:p>
@@ -2447,7 +2447,7 @@
           <a:p>
             <a:fld id="{05B634A9-2344-42E6-B91E-46A8ED0632C1}" type="datetime1">
               <a:rPr lang="ko-KR" altLang="en-US" smtClean="0"/>
-              <a:t>2023-08-21</a:t>
+              <a:t>2023-08-27</a:t>
             </a:fld>
             <a:endParaRPr lang="ko-KR" altLang="en-US"/>
           </a:p>
@@ -2758,7 +2758,7 @@
           <a:p>
             <a:fld id="{B2178117-4C9A-4E85-AE64-A7F83C95DAF6}" type="datetime1">
               <a:rPr lang="ko-KR" altLang="en-US" smtClean="0"/>
-              <a:t>2023-08-21</a:t>
+              <a:t>2023-08-27</a:t>
             </a:fld>
             <a:endParaRPr lang="ko-KR" altLang="en-US"/>
           </a:p>
@@ -3046,7 +3046,7 @@
           <a:p>
             <a:fld id="{B852AB6F-9094-4835-A6FD-BC9DEF33EF34}" type="datetime1">
               <a:rPr lang="ko-KR" altLang="en-US" smtClean="0"/>
-              <a:t>2023-08-21</a:t>
+              <a:t>2023-08-27</a:t>
             </a:fld>
             <a:endParaRPr lang="ko-KR" altLang="en-US"/>
           </a:p>
@@ -3287,7 +3287,7 @@
           <a:p>
             <a:fld id="{1BD16DA6-AC52-4EFA-BA91-CCC0674F73D1}" type="datetime1">
               <a:rPr lang="ko-KR" altLang="en-US" smtClean="0"/>
-              <a:t>2023-08-21</a:t>
+              <a:t>2023-08-27</a:t>
             </a:fld>
             <a:endParaRPr lang="ko-KR" altLang="en-US"/>
           </a:p>
@@ -12499,7 +12499,7 @@
                 <a:latin typeface="더잠실 3 Regular" panose="00000500000000000000" pitchFamily="2" charset="-127"/>
                 <a:ea typeface="더잠실 3 Regular" panose="00000500000000000000" pitchFamily="2" charset="-127"/>
               </a:rPr>
-              <a:t>두냐</a:t>
+              <a:t>두느냐</a:t>
             </a:r>
             <a:r>
               <a:rPr lang="ko-KR" altLang="en-US" dirty="0" err="1">
@@ -13058,14 +13058,7 @@
                 <a:latin typeface="더잠실 2 Light" panose="00000300000000000000" pitchFamily="2" charset="-127"/>
                 <a:ea typeface="더잠실 2 Light" panose="00000300000000000000" pitchFamily="2" charset="-127"/>
               </a:rPr>
-              <a:t> 단위로 표현하는 것은 </a:t>
-            </a:r>
-            <a:r>
-              <a:rPr lang="ko-KR" altLang="en-US" dirty="0" err="1">
-                <a:latin typeface="더잠실 2 Light" panose="00000300000000000000" pitchFamily="2" charset="-127"/>
-                <a:ea typeface="더잠실 2 Light" panose="00000300000000000000" pitchFamily="2" charset="-127"/>
-              </a:rPr>
-              <a:t>의미없음</a:t>
+              <a:t> 단위로 표현하는 것은 의미 없음</a:t>
             </a:r>
             <a:endParaRPr lang="en-US" altLang="ko-KR" dirty="0">
               <a:latin typeface="더잠실 2 Light" panose="00000300000000000000" pitchFamily="2" charset="-127"/>

</xml_diff>

<commit_message>
add Deque, module code & fix ppt
</commit_message>
<xml_diff>
--- a/1st/2학기_씨앗_1회.pptx
+++ b/1st/2학기_씨앗_1회.pptx
@@ -5,7 +5,7 @@
     <p:sldMasterId id="2147483648" r:id="rId1"/>
   </p:sldMasterIdLst>
   <p:notesMasterIdLst>
-    <p:notesMasterId r:id="rId29"/>
+    <p:notesMasterId r:id="rId38"/>
   </p:notesMasterIdLst>
   <p:sldIdLst>
     <p:sldId id="256" r:id="rId2"/>
@@ -22,19 +22,28 @@
     <p:sldId id="299" r:id="rId13"/>
     <p:sldId id="301" r:id="rId14"/>
     <p:sldId id="302" r:id="rId15"/>
-    <p:sldId id="303" r:id="rId16"/>
-    <p:sldId id="304" r:id="rId17"/>
-    <p:sldId id="309" r:id="rId18"/>
-    <p:sldId id="308" r:id="rId19"/>
-    <p:sldId id="316" r:id="rId20"/>
-    <p:sldId id="310" r:id="rId21"/>
+    <p:sldId id="327" r:id="rId16"/>
+    <p:sldId id="303" r:id="rId17"/>
+    <p:sldId id="304" r:id="rId18"/>
+    <p:sldId id="309" r:id="rId19"/>
+    <p:sldId id="308" r:id="rId20"/>
+    <p:sldId id="316" r:id="rId21"/>
     <p:sldId id="311" r:id="rId22"/>
-    <p:sldId id="318" r:id="rId23"/>
-    <p:sldId id="312" r:id="rId24"/>
-    <p:sldId id="313" r:id="rId25"/>
-    <p:sldId id="315" r:id="rId26"/>
-    <p:sldId id="314" r:id="rId27"/>
-    <p:sldId id="317" r:id="rId28"/>
+    <p:sldId id="310" r:id="rId23"/>
+    <p:sldId id="318" r:id="rId24"/>
+    <p:sldId id="312" r:id="rId25"/>
+    <p:sldId id="313" r:id="rId26"/>
+    <p:sldId id="315" r:id="rId27"/>
+    <p:sldId id="314" r:id="rId28"/>
+    <p:sldId id="319" r:id="rId29"/>
+    <p:sldId id="320" r:id="rId30"/>
+    <p:sldId id="322" r:id="rId31"/>
+    <p:sldId id="323" r:id="rId32"/>
+    <p:sldId id="324" r:id="rId33"/>
+    <p:sldId id="326" r:id="rId34"/>
+    <p:sldId id="325" r:id="rId35"/>
+    <p:sldId id="328" r:id="rId36"/>
+    <p:sldId id="317" r:id="rId37"/>
   </p:sldIdLst>
   <p:sldSz cx="12192000" cy="6858000"/>
   <p:notesSz cx="6858000" cy="9144000"/>
@@ -223,7 +232,7 @@
           <a:p>
             <a:fld id="{8EAE290F-B4E2-4E57-9B1C-CC3C6B9C13A4}" type="datetimeFigureOut">
               <a:rPr lang="ko-KR" altLang="en-US" smtClean="0"/>
-              <a:t>2023-09-04</a:t>
+              <a:t>2023-09-11</a:t>
             </a:fld>
             <a:endParaRPr lang="ko-KR" altLang="en-US"/>
           </a:p>
@@ -637,7 +646,7 @@
           <a:p>
             <a:fld id="{46FB592F-1866-471B-8369-962215E884EB}" type="datetime1">
               <a:rPr lang="ko-KR" altLang="en-US" smtClean="0"/>
-              <a:t>2023-09-04</a:t>
+              <a:t>2023-09-11</a:t>
             </a:fld>
             <a:endParaRPr lang="ko-KR" altLang="en-US"/>
           </a:p>
@@ -835,7 +844,7 @@
           <a:p>
             <a:fld id="{03EC54D9-CEC2-4231-B18A-CD53338DA3F0}" type="datetime1">
               <a:rPr lang="ko-KR" altLang="en-US" smtClean="0"/>
-              <a:t>2023-09-04</a:t>
+              <a:t>2023-09-11</a:t>
             </a:fld>
             <a:endParaRPr lang="ko-KR" altLang="en-US"/>
           </a:p>
@@ -1043,7 +1052,7 @@
           <a:p>
             <a:fld id="{7EEAF396-2D55-444E-B5E5-67A0720F6F65}" type="datetime1">
               <a:rPr lang="ko-KR" altLang="en-US" smtClean="0"/>
-              <a:t>2023-09-04</a:t>
+              <a:t>2023-09-11</a:t>
             </a:fld>
             <a:endParaRPr lang="ko-KR" altLang="en-US"/>
           </a:p>
@@ -1241,7 +1250,7 @@
           <a:p>
             <a:fld id="{B09706D7-5F42-4959-957D-2BFD52762266}" type="datetime1">
               <a:rPr lang="ko-KR" altLang="en-US" smtClean="0"/>
-              <a:t>2023-09-04</a:t>
+              <a:t>2023-09-11</a:t>
             </a:fld>
             <a:endParaRPr lang="ko-KR" altLang="en-US"/>
           </a:p>
@@ -1516,7 +1525,7 @@
           <a:p>
             <a:fld id="{A0E500EC-7C13-4CC6-8CB9-B0533265ED13}" type="datetime1">
               <a:rPr lang="ko-KR" altLang="en-US" smtClean="0"/>
-              <a:t>2023-09-04</a:t>
+              <a:t>2023-09-11</a:t>
             </a:fld>
             <a:endParaRPr lang="ko-KR" altLang="en-US"/>
           </a:p>
@@ -1781,7 +1790,7 @@
           <a:p>
             <a:fld id="{16618C03-306C-4DE6-ABDE-61DA80775B2D}" type="datetime1">
               <a:rPr lang="ko-KR" altLang="en-US" smtClean="0"/>
-              <a:t>2023-09-04</a:t>
+              <a:t>2023-09-11</a:t>
             </a:fld>
             <a:endParaRPr lang="ko-KR" altLang="en-US"/>
           </a:p>
@@ -2193,7 +2202,7 @@
           <a:p>
             <a:fld id="{607ADABE-EE8A-4760-9821-E1E2B3F07092}" type="datetime1">
               <a:rPr lang="ko-KR" altLang="en-US" smtClean="0"/>
-              <a:t>2023-09-04</a:t>
+              <a:t>2023-09-11</a:t>
             </a:fld>
             <a:endParaRPr lang="ko-KR" altLang="en-US"/>
           </a:p>
@@ -2334,7 +2343,7 @@
           <a:p>
             <a:fld id="{FACCEE1C-D4C5-4B15-90C7-373075281ADC}" type="datetime1">
               <a:rPr lang="ko-KR" altLang="en-US" smtClean="0"/>
-              <a:t>2023-09-04</a:t>
+              <a:t>2023-09-11</a:t>
             </a:fld>
             <a:endParaRPr lang="ko-KR" altLang="en-US"/>
           </a:p>
@@ -2447,7 +2456,7 @@
           <a:p>
             <a:fld id="{05B634A9-2344-42E6-B91E-46A8ED0632C1}" type="datetime1">
               <a:rPr lang="ko-KR" altLang="en-US" smtClean="0"/>
-              <a:t>2023-09-04</a:t>
+              <a:t>2023-09-11</a:t>
             </a:fld>
             <a:endParaRPr lang="ko-KR" altLang="en-US"/>
           </a:p>
@@ -2758,7 +2767,7 @@
           <a:p>
             <a:fld id="{B2178117-4C9A-4E85-AE64-A7F83C95DAF6}" type="datetime1">
               <a:rPr lang="ko-KR" altLang="en-US" smtClean="0"/>
-              <a:t>2023-09-04</a:t>
+              <a:t>2023-09-11</a:t>
             </a:fld>
             <a:endParaRPr lang="ko-KR" altLang="en-US"/>
           </a:p>
@@ -3046,7 +3055,7 @@
           <a:p>
             <a:fld id="{B852AB6F-9094-4835-A6FD-BC9DEF33EF34}" type="datetime1">
               <a:rPr lang="ko-KR" altLang="en-US" smtClean="0"/>
-              <a:t>2023-09-04</a:t>
+              <a:t>2023-09-11</a:t>
             </a:fld>
             <a:endParaRPr lang="ko-KR" altLang="en-US"/>
           </a:p>
@@ -3287,7 +3296,7 @@
           <a:p>
             <a:fld id="{1BD16DA6-AC52-4EFA-BA91-CCC0674F73D1}" type="datetime1">
               <a:rPr lang="ko-KR" altLang="en-US" smtClean="0"/>
-              <a:t>2023-09-04</a:t>
+              <a:t>2023-09-11</a:t>
             </a:fld>
             <a:endParaRPr lang="ko-KR" altLang="en-US"/>
           </a:p>
@@ -3969,8 +3978,8 @@
           </a:p>
         </p:txBody>
       </p:sp>
-      <mc:AlternateContent xmlns:mc="http://schemas.openxmlformats.org/markup-compatibility/2006">
-        <mc:Choice xmlns:a14="http://schemas.microsoft.com/office/drawing/2010/main" Requires="a14">
+      <mc:AlternateContent xmlns:mc="http://schemas.openxmlformats.org/markup-compatibility/2006" xmlns:a14="http://schemas.microsoft.com/office/drawing/2010/main">
+        <mc:Choice Requires="a14">
           <p:sp>
             <p:nvSpPr>
               <p:cNvPr id="3" name="내용 개체 틀 2">
@@ -4971,7 +4980,7 @@
             </p:txBody>
           </p:sp>
         </mc:Choice>
-        <mc:Fallback>
+        <mc:Fallback xmlns="">
           <p:sp>
             <p:nvSpPr>
               <p:cNvPr id="3" name="내용 개체 틀 2">
@@ -6367,10 +6376,60 @@
       </p:grpSpPr>
       <p:sp>
         <p:nvSpPr>
+          <p:cNvPr id="2" name="제목 1">
+            <a:extLst>
+              <a:ext uri="{FF2B5EF4-FFF2-40B4-BE49-F238E27FC236}">
+                <a16:creationId xmlns:a16="http://schemas.microsoft.com/office/drawing/2014/main" id="{9F708489-3BF6-B164-36D8-B5818041E3DF}"/>
+              </a:ext>
+            </a:extLst>
+          </p:cNvPr>
+          <p:cNvSpPr>
+            <a:spLocks noGrp="1"/>
+          </p:cNvSpPr>
+          <p:nvPr>
+            <p:ph type="title"/>
+          </p:nvPr>
+        </p:nvSpPr>
+        <p:spPr/>
+        <p:txBody>
+          <a:bodyPr/>
+          <a:lstStyle/>
+          <a:p>
+            <a:endParaRPr lang="ko-KR" altLang="en-US"/>
+          </a:p>
+        </p:txBody>
+      </p:sp>
+      <p:sp>
+        <p:nvSpPr>
+          <p:cNvPr id="3" name="내용 개체 틀 2">
+            <a:extLst>
+              <a:ext uri="{FF2B5EF4-FFF2-40B4-BE49-F238E27FC236}">
+                <a16:creationId xmlns:a16="http://schemas.microsoft.com/office/drawing/2014/main" id="{CD7EC548-E52A-8E5C-9A86-F091F4AF7ED8}"/>
+              </a:ext>
+            </a:extLst>
+          </p:cNvPr>
+          <p:cNvSpPr>
+            <a:spLocks noGrp="1"/>
+          </p:cNvSpPr>
+          <p:nvPr>
+            <p:ph idx="1"/>
+          </p:nvPr>
+        </p:nvSpPr>
+        <p:spPr/>
+        <p:txBody>
+          <a:bodyPr/>
+          <a:lstStyle/>
+          <a:p>
+            <a:endParaRPr lang="ko-KR" altLang="en-US" dirty="0"/>
+          </a:p>
+        </p:txBody>
+      </p:sp>
+      <p:sp>
+        <p:nvSpPr>
           <p:cNvPr id="4" name="슬라이드 번호 개체 틀 3">
             <a:extLst>
               <a:ext uri="{FF2B5EF4-FFF2-40B4-BE49-F238E27FC236}">
-                <a16:creationId xmlns:a16="http://schemas.microsoft.com/office/drawing/2014/main" id="{009FF367-B652-5FDA-2532-E8996B5BE951}"/>
+                <a16:creationId xmlns:a16="http://schemas.microsoft.com/office/drawing/2014/main" id="{5CA68917-9C73-DEDA-BB96-6C0F21FB87CF}"/>
               </a:ext>
             </a:extLst>
           </p:cNvPr>
@@ -6389,6 +6448,94 @@
             <a:fld id="{35B45C20-CD26-4AB6-99FD-1165E1BECAF9}" type="slidenum">
               <a:rPr lang="ko-KR" altLang="en-US" smtClean="0"/>
               <a:t>15</a:t>
+            </a:fld>
+            <a:endParaRPr lang="ko-KR" altLang="en-US"/>
+          </a:p>
+        </p:txBody>
+      </p:sp>
+      <p:pic>
+        <p:nvPicPr>
+          <p:cNvPr id="6" name="그림 5">
+            <a:extLst>
+              <a:ext uri="{FF2B5EF4-FFF2-40B4-BE49-F238E27FC236}">
+                <a16:creationId xmlns:a16="http://schemas.microsoft.com/office/drawing/2014/main" id="{180CDB24-ADF8-099F-015B-33991C36FC89}"/>
+              </a:ext>
+            </a:extLst>
+          </p:cNvPr>
+          <p:cNvPicPr>
+            <a:picLocks noChangeAspect="1"/>
+          </p:cNvPicPr>
+          <p:nvPr/>
+        </p:nvPicPr>
+        <p:blipFill rotWithShape="1">
+          <a:blip r:embed="rId2"/>
+          <a:srcRect b="23610"/>
+          <a:stretch/>
+        </p:blipFill>
+        <p:spPr>
+          <a:xfrm>
+            <a:off x="1492792" y="518790"/>
+            <a:ext cx="9206415" cy="6202685"/>
+          </a:xfrm>
+          <a:prstGeom prst="rect">
+            <a:avLst/>
+          </a:prstGeom>
+        </p:spPr>
+      </p:pic>
+    </p:spTree>
+    <p:extLst>
+      <p:ext uri="{BB962C8B-B14F-4D97-AF65-F5344CB8AC3E}">
+        <p14:creationId xmlns:p14="http://schemas.microsoft.com/office/powerpoint/2010/main" val="2578411668"/>
+      </p:ext>
+    </p:extLst>
+  </p:cSld>
+  <p:clrMapOvr>
+    <a:masterClrMapping/>
+  </p:clrMapOvr>
+</p:sld>
+</file>
+
+<file path=ppt/slides/slide16.xml><?xml version="1.0" encoding="utf-8"?>
+<p:sld xmlns:a="http://schemas.openxmlformats.org/drawingml/2006/main" xmlns:r="http://schemas.openxmlformats.org/officeDocument/2006/relationships" xmlns:p="http://schemas.openxmlformats.org/presentationml/2006/main">
+  <p:cSld>
+    <p:spTree>
+      <p:nvGrpSpPr>
+        <p:cNvPr id="1" name=""/>
+        <p:cNvGrpSpPr/>
+        <p:nvPr/>
+      </p:nvGrpSpPr>
+      <p:grpSpPr>
+        <a:xfrm>
+          <a:off x="0" y="0"/>
+          <a:ext cx="0" cy="0"/>
+          <a:chOff x="0" y="0"/>
+          <a:chExt cx="0" cy="0"/>
+        </a:xfrm>
+      </p:grpSpPr>
+      <p:sp>
+        <p:nvSpPr>
+          <p:cNvPr id="4" name="슬라이드 번호 개체 틀 3">
+            <a:extLst>
+              <a:ext uri="{FF2B5EF4-FFF2-40B4-BE49-F238E27FC236}">
+                <a16:creationId xmlns:a16="http://schemas.microsoft.com/office/drawing/2014/main" id="{009FF367-B652-5FDA-2532-E8996B5BE951}"/>
+              </a:ext>
+            </a:extLst>
+          </p:cNvPr>
+          <p:cNvSpPr>
+            <a:spLocks noGrp="1"/>
+          </p:cNvSpPr>
+          <p:nvPr>
+            <p:ph type="sldNum" sz="quarter" idx="12"/>
+          </p:nvPr>
+        </p:nvSpPr>
+        <p:spPr/>
+        <p:txBody>
+          <a:bodyPr/>
+          <a:lstStyle/>
+          <a:p>
+            <a:fld id="{35B45C20-CD26-4AB6-99FD-1165E1BECAF9}" type="slidenum">
+              <a:rPr lang="ko-KR" altLang="en-US" smtClean="0"/>
+              <a:t>16</a:t>
             </a:fld>
             <a:endParaRPr lang="ko-KR" altLang="en-US"/>
           </a:p>
@@ -6578,7 +6725,7 @@
 </p:sld>
 </file>
 
-<file path=ppt/slides/slide16.xml><?xml version="1.0" encoding="utf-8"?>
+<file path=ppt/slides/slide17.xml><?xml version="1.0" encoding="utf-8"?>
 <p:sld xmlns:a="http://schemas.openxmlformats.org/drawingml/2006/main" xmlns:r="http://schemas.openxmlformats.org/officeDocument/2006/relationships" xmlns:p="http://schemas.openxmlformats.org/presentationml/2006/main">
   <p:cSld>
     <p:spTree>
@@ -6687,7 +6834,7 @@
           <a:p>
             <a:fld id="{35B45C20-CD26-4AB6-99FD-1165E1BECAF9}" type="slidenum">
               <a:rPr lang="ko-KR" altLang="en-US" smtClean="0"/>
-              <a:t>16</a:t>
+              <a:t>17</a:t>
             </a:fld>
             <a:endParaRPr lang="ko-KR" altLang="en-US"/>
           </a:p>
@@ -7003,7 +7150,7 @@
 </p:sld>
 </file>
 
-<file path=ppt/slides/slide17.xml><?xml version="1.0" encoding="utf-8"?>
+<file path=ppt/slides/slide18.xml><?xml version="1.0" encoding="utf-8"?>
 <p:sld xmlns:a="http://schemas.openxmlformats.org/drawingml/2006/main" xmlns:r="http://schemas.openxmlformats.org/officeDocument/2006/relationships" xmlns:p="http://schemas.openxmlformats.org/presentationml/2006/main">
   <p:cSld>
     <p:spTree>
@@ -7115,7 +7262,7 @@
           <a:p>
             <a:fld id="{35B45C20-CD26-4AB6-99FD-1165E1BECAF9}" type="slidenum">
               <a:rPr lang="ko-KR" altLang="en-US" smtClean="0"/>
-              <a:t>17</a:t>
+              <a:t>18</a:t>
             </a:fld>
             <a:endParaRPr lang="ko-KR" altLang="en-US"/>
           </a:p>
@@ -8058,7 +8205,7 @@
 </p:sld>
 </file>
 
-<file path=ppt/slides/slide18.xml><?xml version="1.0" encoding="utf-8"?>
+<file path=ppt/slides/slide19.xml><?xml version="1.0" encoding="utf-8"?>
 <p:sld xmlns:a="http://schemas.openxmlformats.org/drawingml/2006/main" xmlns:r="http://schemas.openxmlformats.org/officeDocument/2006/relationships" xmlns:p="http://schemas.openxmlformats.org/presentationml/2006/main">
   <p:cSld>
     <p:spTree>
@@ -8238,7 +8385,7 @@
           <a:p>
             <a:fld id="{35B45C20-CD26-4AB6-99FD-1165E1BECAF9}" type="slidenum">
               <a:rPr lang="ko-KR" altLang="en-US" smtClean="0"/>
-              <a:t>18</a:t>
+              <a:t>19</a:t>
             </a:fld>
             <a:endParaRPr lang="ko-KR" altLang="en-US"/>
           </a:p>
@@ -8668,291 +8815,6 @@
 </p:sld>
 </file>
 
-<file path=ppt/slides/slide19.xml><?xml version="1.0" encoding="utf-8"?>
-<p:sld xmlns:a="http://schemas.openxmlformats.org/drawingml/2006/main" xmlns:r="http://schemas.openxmlformats.org/officeDocument/2006/relationships" xmlns:p="http://schemas.openxmlformats.org/presentationml/2006/main">
-  <p:cSld>
-    <p:spTree>
-      <p:nvGrpSpPr>
-        <p:cNvPr id="1" name=""/>
-        <p:cNvGrpSpPr/>
-        <p:nvPr/>
-      </p:nvGrpSpPr>
-      <p:grpSpPr>
-        <a:xfrm>
-          <a:off x="0" y="0"/>
-          <a:ext cx="0" cy="0"/>
-          <a:chOff x="0" y="0"/>
-          <a:chExt cx="0" cy="0"/>
-        </a:xfrm>
-      </p:grpSpPr>
-      <p:pic>
-        <p:nvPicPr>
-          <p:cNvPr id="2050" name="Picture 2">
-            <a:extLst>
-              <a:ext uri="{FF2B5EF4-FFF2-40B4-BE49-F238E27FC236}">
-                <a16:creationId xmlns:a16="http://schemas.microsoft.com/office/drawing/2014/main" id="{B079F304-91D8-C087-BD06-A776B25D996B}"/>
-              </a:ext>
-            </a:extLst>
-          </p:cNvPr>
-          <p:cNvPicPr>
-            <a:picLocks noChangeAspect="1" noChangeArrowheads="1"/>
-          </p:cNvPicPr>
-          <p:nvPr/>
-        </p:nvPicPr>
-        <p:blipFill>
-          <a:blip r:embed="rId2">
-            <a:extLst>
-              <a:ext uri="{28A0092B-C50C-407E-A947-70E740481C1C}">
-                <a14:useLocalDpi xmlns:a14="http://schemas.microsoft.com/office/drawing/2010/main" val="0"/>
-              </a:ext>
-            </a:extLst>
-          </a:blip>
-          <a:srcRect/>
-          <a:stretch>
-            <a:fillRect/>
-          </a:stretch>
-        </p:blipFill>
-        <p:spPr bwMode="auto">
-          <a:xfrm>
-            <a:off x="2011229" y="1477961"/>
-            <a:ext cx="8169541" cy="3501232"/>
-          </a:xfrm>
-          <a:prstGeom prst="rect">
-            <a:avLst/>
-          </a:prstGeom>
-          <a:noFill/>
-          <a:extLst>
-            <a:ext uri="{909E8E84-426E-40DD-AFC4-6F175D3DCCD1}">
-              <a14:hiddenFill xmlns:a14="http://schemas.microsoft.com/office/drawing/2010/main">
-                <a:solidFill>
-                  <a:srgbClr val="FFFFFF"/>
-                </a:solidFill>
-              </a14:hiddenFill>
-            </a:ext>
-          </a:extLst>
-        </p:spPr>
-      </p:pic>
-      <p:sp>
-        <p:nvSpPr>
-          <p:cNvPr id="2" name="제목 1">
-            <a:extLst>
-              <a:ext uri="{FF2B5EF4-FFF2-40B4-BE49-F238E27FC236}">
-                <a16:creationId xmlns:a16="http://schemas.microsoft.com/office/drawing/2014/main" id="{8BF0C089-04F1-5167-669F-E41DAB47691E}"/>
-              </a:ext>
-            </a:extLst>
-          </p:cNvPr>
-          <p:cNvSpPr>
-            <a:spLocks noGrp="1"/>
-          </p:cNvSpPr>
-          <p:nvPr>
-            <p:ph type="title"/>
-          </p:nvPr>
-        </p:nvSpPr>
-        <p:spPr/>
-        <p:txBody>
-          <a:bodyPr/>
-          <a:lstStyle/>
-          <a:p>
-            <a:r>
-              <a:rPr lang="ko-KR" altLang="en-US" dirty="0" err="1">
-                <a:latin typeface="더잠실 3 Regular" panose="00000500000000000000" pitchFamily="2" charset="-127"/>
-                <a:ea typeface="더잠실 3 Regular" panose="00000500000000000000" pitchFamily="2" charset="-127"/>
-              </a:rPr>
-              <a:t>덱</a:t>
-            </a:r>
-            <a:r>
-              <a:rPr lang="en-US" altLang="ko-KR" dirty="0">
-                <a:latin typeface="더잠실 3 Regular" panose="00000500000000000000" pitchFamily="2" charset="-127"/>
-                <a:ea typeface="더잠실 3 Regular" panose="00000500000000000000" pitchFamily="2" charset="-127"/>
-              </a:rPr>
-              <a:t>_Deque</a:t>
-            </a:r>
-            <a:endParaRPr lang="ko-KR" altLang="en-US" dirty="0">
-              <a:latin typeface="더잠실 3 Regular" panose="00000500000000000000" pitchFamily="2" charset="-127"/>
-              <a:ea typeface="더잠실 3 Regular" panose="00000500000000000000" pitchFamily="2" charset="-127"/>
-            </a:endParaRPr>
-          </a:p>
-        </p:txBody>
-      </p:sp>
-      <p:sp>
-        <p:nvSpPr>
-          <p:cNvPr id="3" name="내용 개체 틀 2">
-            <a:extLst>
-              <a:ext uri="{FF2B5EF4-FFF2-40B4-BE49-F238E27FC236}">
-                <a16:creationId xmlns:a16="http://schemas.microsoft.com/office/drawing/2014/main" id="{238B5934-3117-7E8D-F528-38723210D5CD}"/>
-              </a:ext>
-            </a:extLst>
-          </p:cNvPr>
-          <p:cNvSpPr>
-            <a:spLocks noGrp="1"/>
-          </p:cNvSpPr>
-          <p:nvPr>
-            <p:ph idx="1"/>
-          </p:nvPr>
-        </p:nvSpPr>
-        <p:spPr>
-          <a:xfrm>
-            <a:off x="2711449" y="4979986"/>
-            <a:ext cx="6769100" cy="1146175"/>
-          </a:xfrm>
-        </p:spPr>
-        <p:txBody>
-          <a:bodyPr>
-            <a:normAutofit/>
-          </a:bodyPr>
-          <a:lstStyle/>
-          <a:p>
-            <a:pPr marL="0" indent="0">
-              <a:buNone/>
-            </a:pPr>
-            <a:r>
-              <a:rPr lang="ko-KR" altLang="en-US" dirty="0">
-                <a:latin typeface="더잠실 2 Light" panose="00000300000000000000" pitchFamily="2" charset="-127"/>
-                <a:ea typeface="더잠실 2 Light" panose="00000300000000000000" pitchFamily="2" charset="-127"/>
-              </a:rPr>
-              <a:t>양쪽에서 넣었다</a:t>
-            </a:r>
-            <a:r>
-              <a:rPr lang="en-US" altLang="ko-KR" dirty="0">
-                <a:latin typeface="더잠실 2 Light" panose="00000300000000000000" pitchFamily="2" charset="-127"/>
-                <a:ea typeface="더잠실 2 Light" panose="00000300000000000000" pitchFamily="2" charset="-127"/>
-              </a:rPr>
-              <a:t>, </a:t>
-            </a:r>
-            <a:r>
-              <a:rPr lang="ko-KR" altLang="en-US" dirty="0">
-                <a:latin typeface="더잠실 2 Light" panose="00000300000000000000" pitchFamily="2" charset="-127"/>
-                <a:ea typeface="더잠실 2 Light" panose="00000300000000000000" pitchFamily="2" charset="-127"/>
-              </a:rPr>
-              <a:t>뺐다 할 수 있는 자료구조</a:t>
-            </a:r>
-            <a:endParaRPr lang="en-US" altLang="ko-KR" dirty="0">
-              <a:latin typeface="더잠실 2 Light" panose="00000300000000000000" pitchFamily="2" charset="-127"/>
-              <a:ea typeface="더잠실 2 Light" panose="00000300000000000000" pitchFamily="2" charset="-127"/>
-            </a:endParaRPr>
-          </a:p>
-        </p:txBody>
-      </p:sp>
-      <p:sp>
-        <p:nvSpPr>
-          <p:cNvPr id="4" name="슬라이드 번호 개체 틀 3">
-            <a:extLst>
-              <a:ext uri="{FF2B5EF4-FFF2-40B4-BE49-F238E27FC236}">
-                <a16:creationId xmlns:a16="http://schemas.microsoft.com/office/drawing/2014/main" id="{596C9801-D1EE-68D5-D79A-4C3D9B509F73}"/>
-              </a:ext>
-            </a:extLst>
-          </p:cNvPr>
-          <p:cNvSpPr>
-            <a:spLocks noGrp="1"/>
-          </p:cNvSpPr>
-          <p:nvPr>
-            <p:ph type="sldNum" sz="quarter" idx="12"/>
-          </p:nvPr>
-        </p:nvSpPr>
-        <p:spPr/>
-        <p:txBody>
-          <a:bodyPr/>
-          <a:lstStyle/>
-          <a:p>
-            <a:fld id="{35B45C20-CD26-4AB6-99FD-1165E1BECAF9}" type="slidenum">
-              <a:rPr lang="ko-KR" altLang="en-US" smtClean="0"/>
-              <a:t>19</a:t>
-            </a:fld>
-            <a:endParaRPr lang="ko-KR" altLang="en-US"/>
-          </a:p>
-        </p:txBody>
-      </p:sp>
-      <p:sp>
-        <p:nvSpPr>
-          <p:cNvPr id="6" name="TextBox 5">
-            <a:extLst>
-              <a:ext uri="{FF2B5EF4-FFF2-40B4-BE49-F238E27FC236}">
-                <a16:creationId xmlns:a16="http://schemas.microsoft.com/office/drawing/2014/main" id="{25BE6E06-94FF-1194-79AD-BB0CCF9BB477}"/>
-              </a:ext>
-            </a:extLst>
-          </p:cNvPr>
-          <p:cNvSpPr txBox="1"/>
-          <p:nvPr/>
-        </p:nvSpPr>
-        <p:spPr>
-          <a:xfrm>
-            <a:off x="25400" y="6123543"/>
-            <a:ext cx="1841500" cy="738664"/>
-          </a:xfrm>
-          <a:prstGeom prst="rect">
-            <a:avLst/>
-          </a:prstGeom>
-          <a:noFill/>
-        </p:spPr>
-        <p:txBody>
-          <a:bodyPr wrap="square" rtlCol="0">
-            <a:spAutoFit/>
-          </a:bodyPr>
-          <a:lstStyle/>
-          <a:p>
-            <a:r>
-              <a:rPr lang="ko-KR" altLang="en-US" sz="1400" dirty="0">
-                <a:solidFill>
-                  <a:schemeClr val="bg1">
-                    <a:lumMod val="65000"/>
-                  </a:schemeClr>
-                </a:solidFill>
-                <a:latin typeface="더잠실 2 Light" panose="00000300000000000000" pitchFamily="2" charset="-127"/>
-                <a:ea typeface="더잠실 2 Light" panose="00000300000000000000" pitchFamily="2" charset="-127"/>
-              </a:rPr>
-              <a:t>이미지 출처 </a:t>
-            </a:r>
-            <a:r>
-              <a:rPr lang="en-US" altLang="ko-KR" sz="1400" dirty="0">
-                <a:solidFill>
-                  <a:schemeClr val="bg1">
-                    <a:lumMod val="65000"/>
-                  </a:schemeClr>
-                </a:solidFill>
-                <a:latin typeface="더잠실 2 Light" panose="00000300000000000000" pitchFamily="2" charset="-127"/>
-                <a:ea typeface="더잠실 2 Light" panose="00000300000000000000" pitchFamily="2" charset="-127"/>
-              </a:rPr>
-              <a:t>:</a:t>
-            </a:r>
-          </a:p>
-          <a:p>
-            <a:r>
-              <a:rPr lang="en-US" altLang="ko-KR" sz="1400" dirty="0">
-                <a:solidFill>
-                  <a:schemeClr val="bg1">
-                    <a:lumMod val="65000"/>
-                  </a:schemeClr>
-                </a:solidFill>
-                <a:latin typeface="더잠실 2 Light" panose="00000300000000000000" pitchFamily="2" charset="-127"/>
-                <a:ea typeface="더잠실 2 Light" panose="00000300000000000000" pitchFamily="2" charset="-127"/>
-              </a:rPr>
-              <a:t>https://jjudrgn.tistory.com/15</a:t>
-            </a:r>
-            <a:endParaRPr lang="ko-KR" altLang="en-US" sz="1400" dirty="0">
-              <a:solidFill>
-                <a:schemeClr val="bg1">
-                  <a:lumMod val="65000"/>
-                </a:schemeClr>
-              </a:solidFill>
-              <a:latin typeface="더잠실 2 Light" panose="00000300000000000000" pitchFamily="2" charset="-127"/>
-              <a:ea typeface="더잠실 2 Light" panose="00000300000000000000" pitchFamily="2" charset="-127"/>
-            </a:endParaRPr>
-          </a:p>
-        </p:txBody>
-      </p:sp>
-    </p:spTree>
-    <p:extLst>
-      <p:ext uri="{BB962C8B-B14F-4D97-AF65-F5344CB8AC3E}">
-        <p14:creationId xmlns:p14="http://schemas.microsoft.com/office/powerpoint/2010/main" val="2711219594"/>
-      </p:ext>
-    </p:extLst>
-  </p:cSld>
-  <p:clrMapOvr>
-    <a:masterClrMapping/>
-  </p:clrMapOvr>
-</p:sld>
-</file>
-
 <file path=ppt/slides/slide2.xml><?xml version="1.0" encoding="utf-8"?>
 <p:sld xmlns:a="http://schemas.openxmlformats.org/drawingml/2006/main" xmlns:r="http://schemas.openxmlformats.org/officeDocument/2006/relationships" xmlns:p="http://schemas.openxmlformats.org/presentationml/2006/main">
   <p:cSld>
@@ -9224,19 +9086,17 @@
       </p:grpSpPr>
       <p:pic>
         <p:nvPicPr>
-          <p:cNvPr id="1026" name="Picture 2" descr="C++ 자료구조] 연결리스트 (단순 연결 - 스택) : 네이버 블로그">
-            <a:extLst>
-              <a:ext uri="{FF2B5EF4-FFF2-40B4-BE49-F238E27FC236}">
-                <a16:creationId xmlns:a16="http://schemas.microsoft.com/office/drawing/2014/main" id="{98014A09-9F23-AD6A-43A2-8D1C14EBB3A0}"/>
+          <p:cNvPr id="2050" name="Picture 2">
+            <a:extLst>
+              <a:ext uri="{FF2B5EF4-FFF2-40B4-BE49-F238E27FC236}">
+                <a16:creationId xmlns:a16="http://schemas.microsoft.com/office/drawing/2014/main" id="{B079F304-91D8-C087-BD06-A776B25D996B}"/>
               </a:ext>
             </a:extLst>
           </p:cNvPr>
           <p:cNvPicPr>
-            <a:picLocks noGrp="1" noChangeAspect="1" noChangeArrowheads="1"/>
+            <a:picLocks noChangeAspect="1" noChangeArrowheads="1"/>
           </p:cNvPicPr>
-          <p:nvPr>
-            <p:ph idx="1"/>
-          </p:nvPr>
+          <p:nvPr/>
         </p:nvPicPr>
         <p:blipFill>
           <a:blip r:embed="rId2">
@@ -9253,8 +9113,8 @@
         </p:blipFill>
         <p:spPr bwMode="auto">
           <a:xfrm>
-            <a:off x="2971976" y="244828"/>
-            <a:ext cx="6248047" cy="6248047"/>
+            <a:off x="2011229" y="1477961"/>
+            <a:ext cx="8169541" cy="3501232"/>
           </a:xfrm>
           <a:prstGeom prst="rect">
             <a:avLst/>
@@ -9276,7 +9136,7 @@
           <p:cNvPr id="2" name="제목 1">
             <a:extLst>
               <a:ext uri="{FF2B5EF4-FFF2-40B4-BE49-F238E27FC236}">
-                <a16:creationId xmlns:a16="http://schemas.microsoft.com/office/drawing/2014/main" id="{BC44089F-66FA-5666-4B33-BB99208C52A1}"/>
+                <a16:creationId xmlns:a16="http://schemas.microsoft.com/office/drawing/2014/main" id="{8BF0C089-04F1-5167-669F-E41DAB47691E}"/>
               </a:ext>
             </a:extLst>
           </p:cNvPr>
@@ -9293,12 +9153,82 @@
           <a:lstStyle/>
           <a:p>
             <a:r>
-              <a:rPr lang="ko-KR" altLang="en-US" dirty="0">
+              <a:rPr lang="ko-KR" altLang="en-US" dirty="0" err="1">
                 <a:latin typeface="더잠실 3 Regular" panose="00000500000000000000" pitchFamily="2" charset="-127"/>
                 <a:ea typeface="더잠실 3 Regular" panose="00000500000000000000" pitchFamily="2" charset="-127"/>
               </a:rPr>
-              <a:t>연결 리스트</a:t>
-            </a:r>
+              <a:t>덱</a:t>
+            </a:r>
+            <a:r>
+              <a:rPr lang="en-US" altLang="ko-KR" dirty="0">
+                <a:latin typeface="더잠실 3 Regular" panose="00000500000000000000" pitchFamily="2" charset="-127"/>
+                <a:ea typeface="더잠실 3 Regular" panose="00000500000000000000" pitchFamily="2" charset="-127"/>
+              </a:rPr>
+              <a:t>_Deque</a:t>
+            </a:r>
+            <a:endParaRPr lang="ko-KR" altLang="en-US" dirty="0">
+              <a:latin typeface="더잠실 3 Regular" panose="00000500000000000000" pitchFamily="2" charset="-127"/>
+              <a:ea typeface="더잠실 3 Regular" panose="00000500000000000000" pitchFamily="2" charset="-127"/>
+            </a:endParaRPr>
+          </a:p>
+        </p:txBody>
+      </p:sp>
+      <p:sp>
+        <p:nvSpPr>
+          <p:cNvPr id="3" name="내용 개체 틀 2">
+            <a:extLst>
+              <a:ext uri="{FF2B5EF4-FFF2-40B4-BE49-F238E27FC236}">
+                <a16:creationId xmlns:a16="http://schemas.microsoft.com/office/drawing/2014/main" id="{238B5934-3117-7E8D-F528-38723210D5CD}"/>
+              </a:ext>
+            </a:extLst>
+          </p:cNvPr>
+          <p:cNvSpPr>
+            <a:spLocks noGrp="1"/>
+          </p:cNvSpPr>
+          <p:nvPr>
+            <p:ph idx="1"/>
+          </p:nvPr>
+        </p:nvSpPr>
+        <p:spPr>
+          <a:xfrm>
+            <a:off x="2711449" y="4979986"/>
+            <a:ext cx="6769100" cy="1146175"/>
+          </a:xfrm>
+        </p:spPr>
+        <p:txBody>
+          <a:bodyPr>
+            <a:normAutofit/>
+          </a:bodyPr>
+          <a:lstStyle/>
+          <a:p>
+            <a:pPr marL="0" indent="0">
+              <a:buNone/>
+            </a:pPr>
+            <a:r>
+              <a:rPr lang="ko-KR" altLang="en-US" dirty="0">
+                <a:latin typeface="더잠실 2 Light" panose="00000300000000000000" pitchFamily="2" charset="-127"/>
+                <a:ea typeface="더잠실 2 Light" panose="00000300000000000000" pitchFamily="2" charset="-127"/>
+              </a:rPr>
+              <a:t>양쪽에서 넣었다</a:t>
+            </a:r>
+            <a:r>
+              <a:rPr lang="en-US" altLang="ko-KR" dirty="0">
+                <a:latin typeface="더잠실 2 Light" panose="00000300000000000000" pitchFamily="2" charset="-127"/>
+                <a:ea typeface="더잠실 2 Light" panose="00000300000000000000" pitchFamily="2" charset="-127"/>
+              </a:rPr>
+              <a:t>, </a:t>
+            </a:r>
+            <a:r>
+              <a:rPr lang="ko-KR" altLang="en-US" dirty="0">
+                <a:latin typeface="더잠실 2 Light" panose="00000300000000000000" pitchFamily="2" charset="-127"/>
+                <a:ea typeface="더잠실 2 Light" panose="00000300000000000000" pitchFamily="2" charset="-127"/>
+              </a:rPr>
+              <a:t>뺐다 할 수 있는 자료구조</a:t>
+            </a:r>
+            <a:endParaRPr lang="en-US" altLang="ko-KR" dirty="0">
+              <a:latin typeface="더잠실 2 Light" panose="00000300000000000000" pitchFamily="2" charset="-127"/>
+              <a:ea typeface="더잠실 2 Light" panose="00000300000000000000" pitchFamily="2" charset="-127"/>
+            </a:endParaRPr>
           </a:p>
         </p:txBody>
       </p:sp>
@@ -9307,7 +9237,7 @@
           <p:cNvPr id="4" name="슬라이드 번호 개체 틀 3">
             <a:extLst>
               <a:ext uri="{FF2B5EF4-FFF2-40B4-BE49-F238E27FC236}">
-                <a16:creationId xmlns:a16="http://schemas.microsoft.com/office/drawing/2014/main" id="{D7E41E2F-8615-CDA8-482D-A1CA1613E6E7}"/>
+                <a16:creationId xmlns:a16="http://schemas.microsoft.com/office/drawing/2014/main" id="{596C9801-D1EE-68D5-D79A-4C3D9B509F73}"/>
               </a:ext>
             </a:extLst>
           </p:cNvPr>
@@ -9331,10 +9261,88 @@
           </a:p>
         </p:txBody>
       </p:sp>
+      <p:sp>
+        <p:nvSpPr>
+          <p:cNvPr id="6" name="TextBox 5">
+            <a:extLst>
+              <a:ext uri="{FF2B5EF4-FFF2-40B4-BE49-F238E27FC236}">
+                <a16:creationId xmlns:a16="http://schemas.microsoft.com/office/drawing/2014/main" id="{25BE6E06-94FF-1194-79AD-BB0CCF9BB477}"/>
+              </a:ext>
+            </a:extLst>
+          </p:cNvPr>
+          <p:cNvSpPr txBox="1"/>
+          <p:nvPr/>
+        </p:nvSpPr>
+        <p:spPr>
+          <a:xfrm>
+            <a:off x="25400" y="6123543"/>
+            <a:ext cx="1841500" cy="738664"/>
+          </a:xfrm>
+          <a:prstGeom prst="rect">
+            <a:avLst/>
+          </a:prstGeom>
+          <a:noFill/>
+        </p:spPr>
+        <p:txBody>
+          <a:bodyPr wrap="square" rtlCol="0">
+            <a:spAutoFit/>
+          </a:bodyPr>
+          <a:lstStyle/>
+          <a:p>
+            <a:r>
+              <a:rPr lang="ko-KR" altLang="en-US" sz="1400" dirty="0">
+                <a:solidFill>
+                  <a:schemeClr val="bg1">
+                    <a:lumMod val="65000"/>
+                  </a:schemeClr>
+                </a:solidFill>
+                <a:latin typeface="더잠실 2 Light" panose="00000300000000000000" pitchFamily="2" charset="-127"/>
+                <a:ea typeface="더잠실 2 Light" panose="00000300000000000000" pitchFamily="2" charset="-127"/>
+              </a:rPr>
+              <a:t>이미지 출처 </a:t>
+            </a:r>
+            <a:r>
+              <a:rPr lang="en-US" altLang="ko-KR" sz="1400" dirty="0">
+                <a:solidFill>
+                  <a:schemeClr val="bg1">
+                    <a:lumMod val="65000"/>
+                  </a:schemeClr>
+                </a:solidFill>
+                <a:latin typeface="더잠실 2 Light" panose="00000300000000000000" pitchFamily="2" charset="-127"/>
+                <a:ea typeface="더잠실 2 Light" panose="00000300000000000000" pitchFamily="2" charset="-127"/>
+              </a:rPr>
+              <a:t>:</a:t>
+            </a:r>
+          </a:p>
+          <a:p>
+            <a:r>
+              <a:rPr lang="en-US" altLang="ko-KR" sz="1400" dirty="0">
+                <a:solidFill>
+                  <a:schemeClr val="bg1">
+                    <a:lumMod val="65000"/>
+                  </a:schemeClr>
+                </a:solidFill>
+                <a:latin typeface="더잠실 2 Light" panose="00000300000000000000" pitchFamily="2" charset="-127"/>
+                <a:ea typeface="더잠실 2 Light" panose="00000300000000000000" pitchFamily="2" charset="-127"/>
+              </a:rPr>
+              <a:t>https://jjudrgn.tistory.com/15</a:t>
+            </a:r>
+            <a:endParaRPr lang="ko-KR" altLang="en-US" sz="1400" dirty="0">
+              <a:solidFill>
+                <a:schemeClr val="bg1">
+                  <a:lumMod val="65000"/>
+                </a:schemeClr>
+              </a:solidFill>
+              <a:latin typeface="더잠실 2 Light" panose="00000300000000000000" pitchFamily="2" charset="-127"/>
+              <a:ea typeface="더잠실 2 Light" panose="00000300000000000000" pitchFamily="2" charset="-127"/>
+            </a:endParaRPr>
+          </a:p>
+        </p:txBody>
+      </p:sp>
     </p:spTree>
     <p:extLst>
       <p:ext uri="{BB962C8B-B14F-4D97-AF65-F5344CB8AC3E}">
-        <p14:creationId xmlns:p14="http://schemas.microsoft.com/office/powerpoint/2010/main" val="2231422373"/>
+        <p14:creationId xmlns:p14="http://schemas.microsoft.com/office/powerpoint/2010/main" val="2711219594"/>
       </p:ext>
     </p:extLst>
   </p:cSld>
@@ -9714,12 +9722,61 @@
           <a:chExt cx="0" cy="0"/>
         </a:xfrm>
       </p:grpSpPr>
+      <p:pic>
+        <p:nvPicPr>
+          <p:cNvPr id="1026" name="Picture 2" descr="C++ 자료구조] 연결리스트 (단순 연결 - 스택) : 네이버 블로그">
+            <a:extLst>
+              <a:ext uri="{FF2B5EF4-FFF2-40B4-BE49-F238E27FC236}">
+                <a16:creationId xmlns:a16="http://schemas.microsoft.com/office/drawing/2014/main" id="{98014A09-9F23-AD6A-43A2-8D1C14EBB3A0}"/>
+              </a:ext>
+            </a:extLst>
+          </p:cNvPr>
+          <p:cNvPicPr>
+            <a:picLocks noGrp="1" noChangeAspect="1" noChangeArrowheads="1"/>
+          </p:cNvPicPr>
+          <p:nvPr>
+            <p:ph idx="1"/>
+          </p:nvPr>
+        </p:nvPicPr>
+        <p:blipFill>
+          <a:blip r:embed="rId2">
+            <a:extLst>
+              <a:ext uri="{28A0092B-C50C-407E-A947-70E740481C1C}">
+                <a14:useLocalDpi xmlns:a14="http://schemas.microsoft.com/office/drawing/2010/main" val="0"/>
+              </a:ext>
+            </a:extLst>
+          </a:blip>
+          <a:srcRect/>
+          <a:stretch>
+            <a:fillRect/>
+          </a:stretch>
+        </p:blipFill>
+        <p:spPr bwMode="auto">
+          <a:xfrm>
+            <a:off x="2971976" y="244828"/>
+            <a:ext cx="6248047" cy="6248047"/>
+          </a:xfrm>
+          <a:prstGeom prst="rect">
+            <a:avLst/>
+          </a:prstGeom>
+          <a:noFill/>
+          <a:extLst>
+            <a:ext uri="{909E8E84-426E-40DD-AFC4-6F175D3DCCD1}">
+              <a14:hiddenFill xmlns:a14="http://schemas.microsoft.com/office/drawing/2010/main">
+                <a:solidFill>
+                  <a:srgbClr val="FFFFFF"/>
+                </a:solidFill>
+              </a14:hiddenFill>
+            </a:ext>
+          </a:extLst>
+        </p:spPr>
+      </p:pic>
       <p:sp>
         <p:nvSpPr>
           <p:cNvPr id="2" name="제목 1">
             <a:extLst>
               <a:ext uri="{FF2B5EF4-FFF2-40B4-BE49-F238E27FC236}">
-                <a16:creationId xmlns:a16="http://schemas.microsoft.com/office/drawing/2014/main" id="{37F53AFA-5A27-C98D-C476-3D9F7CA34D84}"/>
+                <a16:creationId xmlns:a16="http://schemas.microsoft.com/office/drawing/2014/main" id="{BC44089F-66FA-5666-4B33-BB99208C52A1}"/>
               </a:ext>
             </a:extLst>
           </p:cNvPr>
@@ -9740,215 +9797,7 @@
                 <a:latin typeface="더잠실 3 Regular" panose="00000500000000000000" pitchFamily="2" charset="-127"/>
                 <a:ea typeface="더잠실 3 Regular" panose="00000500000000000000" pitchFamily="2" charset="-127"/>
               </a:rPr>
-              <a:t>자료구조의 구현</a:t>
-            </a:r>
-          </a:p>
-        </p:txBody>
-      </p:sp>
-      <p:sp>
-        <p:nvSpPr>
-          <p:cNvPr id="3" name="내용 개체 틀 2">
-            <a:extLst>
-              <a:ext uri="{FF2B5EF4-FFF2-40B4-BE49-F238E27FC236}">
-                <a16:creationId xmlns:a16="http://schemas.microsoft.com/office/drawing/2014/main" id="{FAEB1227-E49C-846B-C931-FE6D42C13EF2}"/>
-              </a:ext>
-            </a:extLst>
-          </p:cNvPr>
-          <p:cNvSpPr>
-            <a:spLocks noGrp="1"/>
-          </p:cNvSpPr>
-          <p:nvPr>
-            <p:ph idx="1"/>
-          </p:nvPr>
-        </p:nvSpPr>
-        <p:spPr/>
-        <p:txBody>
-          <a:bodyPr/>
-          <a:lstStyle/>
-          <a:p>
-            <a:pPr marL="0" indent="0">
-              <a:buNone/>
-            </a:pPr>
-            <a:r>
-              <a:rPr lang="ko-KR" altLang="en-US" dirty="0">
-                <a:latin typeface="더잠실 2 Light" panose="00000300000000000000" pitchFamily="2" charset="-127"/>
-                <a:ea typeface="더잠실 2 Light" panose="00000300000000000000" pitchFamily="2" charset="-127"/>
-              </a:rPr>
-              <a:t>사실 대부분의 자료구조는 모든 프로그래밍 언어에서</a:t>
-            </a:r>
-            <a:endParaRPr lang="en-US" altLang="ko-KR" dirty="0">
-              <a:latin typeface="더잠실 2 Light" panose="00000300000000000000" pitchFamily="2" charset="-127"/>
-              <a:ea typeface="더잠실 2 Light" panose="00000300000000000000" pitchFamily="2" charset="-127"/>
-            </a:endParaRPr>
-          </a:p>
-          <a:p>
-            <a:pPr marL="0" indent="0">
-              <a:buNone/>
-            </a:pPr>
-            <a:r>
-              <a:rPr lang="ko-KR" altLang="en-US" dirty="0">
-                <a:latin typeface="더잠실 2 Light" panose="00000300000000000000" pitchFamily="2" charset="-127"/>
-                <a:ea typeface="더잠실 2 Light" panose="00000300000000000000" pitchFamily="2" charset="-127"/>
-              </a:rPr>
-              <a:t>라이브러리</a:t>
-            </a:r>
-            <a:r>
-              <a:rPr lang="en-US" altLang="ko-KR" dirty="0">
-                <a:latin typeface="더잠실 2 Light" panose="00000300000000000000" pitchFamily="2" charset="-127"/>
-                <a:ea typeface="더잠실 2 Light" panose="00000300000000000000" pitchFamily="2" charset="-127"/>
-              </a:rPr>
-              <a:t>, </a:t>
-            </a:r>
-            <a:r>
-              <a:rPr lang="ko-KR" altLang="en-US" dirty="0">
-                <a:latin typeface="더잠실 2 Light" panose="00000300000000000000" pitchFamily="2" charset="-127"/>
-                <a:ea typeface="더잠실 2 Light" panose="00000300000000000000" pitchFamily="2" charset="-127"/>
-              </a:rPr>
-              <a:t>모듈 등을 통해 구현할 필요없이 사용 가능하므로</a:t>
-            </a:r>
-            <a:endParaRPr lang="en-US" altLang="ko-KR" dirty="0">
-              <a:latin typeface="더잠실 2 Light" panose="00000300000000000000" pitchFamily="2" charset="-127"/>
-              <a:ea typeface="더잠실 2 Light" panose="00000300000000000000" pitchFamily="2" charset="-127"/>
-            </a:endParaRPr>
-          </a:p>
-          <a:p>
-            <a:pPr marL="0" indent="0">
-              <a:buNone/>
-            </a:pPr>
-            <a:r>
-              <a:rPr lang="ko-KR" altLang="en-US" dirty="0">
-                <a:latin typeface="더잠실 2 Light" panose="00000300000000000000" pitchFamily="2" charset="-127"/>
-                <a:ea typeface="더잠실 2 Light" panose="00000300000000000000" pitchFamily="2" charset="-127"/>
-              </a:rPr>
-              <a:t>실제로 </a:t>
-            </a:r>
-            <a:r>
-              <a:rPr lang="en-US" altLang="ko-KR" dirty="0">
-                <a:latin typeface="더잠실 2 Light" panose="00000300000000000000" pitchFamily="2" charset="-127"/>
-                <a:ea typeface="더잠실 2 Light" panose="00000300000000000000" pitchFamily="2" charset="-127"/>
-              </a:rPr>
-              <a:t>PS</a:t>
-            </a:r>
-            <a:r>
-              <a:rPr lang="ko-KR" altLang="en-US" dirty="0">
-                <a:latin typeface="더잠실 2 Light" panose="00000300000000000000" pitchFamily="2" charset="-127"/>
-                <a:ea typeface="더잠실 2 Light" panose="00000300000000000000" pitchFamily="2" charset="-127"/>
-              </a:rPr>
-              <a:t>나 대회에서는 일일이 구현하지 않음</a:t>
-            </a:r>
-            <a:endParaRPr lang="en-US" altLang="ko-KR" dirty="0">
-              <a:latin typeface="더잠실 2 Light" panose="00000300000000000000" pitchFamily="2" charset="-127"/>
-              <a:ea typeface="더잠실 2 Light" panose="00000300000000000000" pitchFamily="2" charset="-127"/>
-            </a:endParaRPr>
-          </a:p>
-          <a:p>
-            <a:pPr marL="0" indent="0">
-              <a:buNone/>
-            </a:pPr>
-            <a:endParaRPr lang="en-US" altLang="ko-KR" dirty="0">
-              <a:latin typeface="더잠실 2 Light" panose="00000300000000000000" pitchFamily="2" charset="-127"/>
-              <a:ea typeface="더잠실 2 Light" panose="00000300000000000000" pitchFamily="2" charset="-127"/>
-            </a:endParaRPr>
-          </a:p>
-          <a:p>
-            <a:pPr marL="0" indent="0">
-              <a:buNone/>
-            </a:pPr>
-            <a:r>
-              <a:rPr lang="ko-KR" altLang="en-US" dirty="0">
-                <a:latin typeface="더잠실 2 Light" panose="00000300000000000000" pitchFamily="2" charset="-127"/>
-                <a:ea typeface="더잠실 2 Light" panose="00000300000000000000" pitchFamily="2" charset="-127"/>
-              </a:rPr>
-              <a:t>하지만</a:t>
-            </a:r>
-            <a:r>
-              <a:rPr lang="en-US" altLang="ko-KR" dirty="0">
-                <a:latin typeface="더잠실 2 Light" panose="00000300000000000000" pitchFamily="2" charset="-127"/>
-                <a:ea typeface="더잠실 2 Light" panose="00000300000000000000" pitchFamily="2" charset="-127"/>
-              </a:rPr>
-              <a:t>, </a:t>
-            </a:r>
-            <a:r>
-              <a:rPr lang="ko-KR" altLang="en-US" dirty="0">
-                <a:latin typeface="더잠실 2 Light" panose="00000300000000000000" pitchFamily="2" charset="-127"/>
-                <a:ea typeface="더잠실 2 Light" panose="00000300000000000000" pitchFamily="2" charset="-127"/>
-              </a:rPr>
-              <a:t>알고리즘과 구현방식을 이해할 필요는 있음</a:t>
-            </a:r>
-            <a:r>
-              <a:rPr lang="en-US" altLang="ko-KR" dirty="0">
-                <a:latin typeface="더잠실 2 Light" panose="00000300000000000000" pitchFamily="2" charset="-127"/>
-                <a:ea typeface="더잠실 2 Light" panose="00000300000000000000" pitchFamily="2" charset="-127"/>
-              </a:rPr>
-              <a:t>.</a:t>
-            </a:r>
-          </a:p>
-          <a:p>
-            <a:pPr marL="0" indent="0">
-              <a:buNone/>
-            </a:pPr>
-            <a:r>
-              <a:rPr lang="en-US" altLang="ko-KR" dirty="0">
-                <a:latin typeface="더잠실 2 Light" panose="00000300000000000000" pitchFamily="2" charset="-127"/>
-                <a:ea typeface="더잠실 2 Light" panose="00000300000000000000" pitchFamily="2" charset="-127"/>
-              </a:rPr>
-              <a:t>(</a:t>
-            </a:r>
-            <a:r>
-              <a:rPr lang="ko-KR" altLang="en-US" dirty="0">
-                <a:latin typeface="더잠실 2 Light" panose="00000300000000000000" pitchFamily="2" charset="-127"/>
-                <a:ea typeface="더잠실 2 Light" panose="00000300000000000000" pitchFamily="2" charset="-127"/>
-              </a:rPr>
-              <a:t>성적</a:t>
-            </a:r>
-            <a:r>
-              <a:rPr lang="en-US" altLang="ko-KR" dirty="0">
-                <a:latin typeface="더잠실 2 Light" panose="00000300000000000000" pitchFamily="2" charset="-127"/>
-                <a:ea typeface="더잠실 2 Light" panose="00000300000000000000" pitchFamily="2" charset="-127"/>
-              </a:rPr>
-              <a:t>, </a:t>
-            </a:r>
-            <a:r>
-              <a:rPr lang="ko-KR" altLang="en-US" dirty="0">
-                <a:latin typeface="더잠실 2 Light" panose="00000300000000000000" pitchFamily="2" charset="-127"/>
-                <a:ea typeface="더잠실 2 Light" panose="00000300000000000000" pitchFamily="2" charset="-127"/>
-              </a:rPr>
-              <a:t>프로그래밍 실력 향상</a:t>
-            </a:r>
-            <a:r>
-              <a:rPr lang="en-US" altLang="ko-KR" dirty="0">
-                <a:latin typeface="더잠실 2 Light" panose="00000300000000000000" pitchFamily="2" charset="-127"/>
-                <a:ea typeface="더잠실 2 Light" panose="00000300000000000000" pitchFamily="2" charset="-127"/>
-              </a:rPr>
-              <a:t>, CS</a:t>
-            </a:r>
-            <a:r>
-              <a:rPr lang="ko-KR" altLang="en-US" dirty="0">
-                <a:latin typeface="더잠실 2 Light" panose="00000300000000000000" pitchFamily="2" charset="-127"/>
-                <a:ea typeface="더잠실 2 Light" panose="00000300000000000000" pitchFamily="2" charset="-127"/>
-              </a:rPr>
-              <a:t>면접 대비</a:t>
-            </a:r>
-            <a:r>
-              <a:rPr lang="en-US" altLang="ko-KR" dirty="0">
-                <a:latin typeface="더잠실 2 Light" panose="00000300000000000000" pitchFamily="2" charset="-127"/>
-                <a:ea typeface="더잠실 2 Light" panose="00000300000000000000" pitchFamily="2" charset="-127"/>
-              </a:rPr>
-              <a:t> </a:t>
-            </a:r>
-            <a:r>
-              <a:rPr lang="ko-KR" altLang="en-US" dirty="0">
-                <a:latin typeface="더잠실 2 Light" panose="00000300000000000000" pitchFamily="2" charset="-127"/>
-                <a:ea typeface="더잠실 2 Light" panose="00000300000000000000" pitchFamily="2" charset="-127"/>
-              </a:rPr>
-              <a:t>등등</a:t>
-            </a:r>
-            <a:r>
-              <a:rPr lang="en-US" altLang="ko-KR" dirty="0">
-                <a:latin typeface="더잠실 2 Light" panose="00000300000000000000" pitchFamily="2" charset="-127"/>
-                <a:ea typeface="더잠실 2 Light" panose="00000300000000000000" pitchFamily="2" charset="-127"/>
-              </a:rPr>
-              <a:t>)</a:t>
+              <a:t>연결 리스트</a:t>
             </a:r>
           </a:p>
         </p:txBody>
@@ -9958,7 +9807,7 @@
           <p:cNvPr id="4" name="슬라이드 번호 개체 틀 3">
             <a:extLst>
               <a:ext uri="{FF2B5EF4-FFF2-40B4-BE49-F238E27FC236}">
-                <a16:creationId xmlns:a16="http://schemas.microsoft.com/office/drawing/2014/main" id="{00AC164D-63D8-F1DC-A4E0-74985EEC44B9}"/>
+                <a16:creationId xmlns:a16="http://schemas.microsoft.com/office/drawing/2014/main" id="{D7E41E2F-8615-CDA8-482D-A1CA1613E6E7}"/>
               </a:ext>
             </a:extLst>
           </p:cNvPr>
@@ -9985,7 +9834,7 @@
     </p:spTree>
     <p:extLst>
       <p:ext uri="{BB962C8B-B14F-4D97-AF65-F5344CB8AC3E}">
-        <p14:creationId xmlns:p14="http://schemas.microsoft.com/office/powerpoint/2010/main" val="3174217409"/>
+        <p14:creationId xmlns:p14="http://schemas.microsoft.com/office/powerpoint/2010/main" val="2231422373"/>
       </p:ext>
     </p:extLst>
   </p:cSld>
@@ -10017,7 +9866,7 @@
           <p:cNvPr id="2" name="제목 1">
             <a:extLst>
               <a:ext uri="{FF2B5EF4-FFF2-40B4-BE49-F238E27FC236}">
-                <a16:creationId xmlns:a16="http://schemas.microsoft.com/office/drawing/2014/main" id="{3779A2BD-EC83-5C8B-68E1-C95366F4CB46}"/>
+                <a16:creationId xmlns:a16="http://schemas.microsoft.com/office/drawing/2014/main" id="{37F53AFA-5A27-C98D-C476-3D9F7CA34D84}"/>
               </a:ext>
             </a:extLst>
           </p:cNvPr>
@@ -10038,7 +9887,7 @@
                 <a:latin typeface="더잠실 3 Regular" panose="00000500000000000000" pitchFamily="2" charset="-127"/>
                 <a:ea typeface="더잠실 3 Regular" panose="00000500000000000000" pitchFamily="2" charset="-127"/>
               </a:rPr>
-              <a:t>스택 클래스 구현</a:t>
+              <a:t>자료구조의 구현</a:t>
             </a:r>
           </a:p>
         </p:txBody>
@@ -10048,7 +9897,7 @@
           <p:cNvPr id="3" name="내용 개체 틀 2">
             <a:extLst>
               <a:ext uri="{FF2B5EF4-FFF2-40B4-BE49-F238E27FC236}">
-                <a16:creationId xmlns:a16="http://schemas.microsoft.com/office/drawing/2014/main" id="{E7F7BF0B-540C-3A27-E3CB-A3D2DFC2DAD6}"/>
+                <a16:creationId xmlns:a16="http://schemas.microsoft.com/office/drawing/2014/main" id="{FAEB1227-E49C-846B-C931-FE6D42C13EF2}"/>
               </a:ext>
             </a:extLst>
           </p:cNvPr>
@@ -10067,13 +9916,173 @@
             <a:pPr marL="0" indent="0">
               <a:buNone/>
             </a:pPr>
-            <a:endParaRPr lang="en-US" altLang="ko-KR" dirty="0"/>
+            <a:r>
+              <a:rPr lang="ko-KR" altLang="en-US" dirty="0">
+                <a:latin typeface="더잠실 2 Light" panose="00000300000000000000" pitchFamily="2" charset="-127"/>
+                <a:ea typeface="더잠실 2 Light" panose="00000300000000000000" pitchFamily="2" charset="-127"/>
+              </a:rPr>
+              <a:t>사실 대부분의 자료구조는 모든 프로그래밍 언어에서</a:t>
+            </a:r>
+            <a:endParaRPr lang="en-US" altLang="ko-KR" dirty="0">
+              <a:latin typeface="더잠실 2 Light" panose="00000300000000000000" pitchFamily="2" charset="-127"/>
+              <a:ea typeface="더잠실 2 Light" panose="00000300000000000000" pitchFamily="2" charset="-127"/>
+            </a:endParaRPr>
           </a:p>
           <a:p>
             <a:pPr marL="0" indent="0">
               <a:buNone/>
             </a:pPr>
-            <a:endParaRPr lang="en-US" altLang="ko-KR" dirty="0"/>
+            <a:r>
+              <a:rPr lang="ko-KR" altLang="en-US" dirty="0">
+                <a:latin typeface="더잠실 2 Light" panose="00000300000000000000" pitchFamily="2" charset="-127"/>
+                <a:ea typeface="더잠실 2 Light" panose="00000300000000000000" pitchFamily="2" charset="-127"/>
+              </a:rPr>
+              <a:t>라이브러리</a:t>
+            </a:r>
+            <a:r>
+              <a:rPr lang="en-US" altLang="ko-KR" dirty="0">
+                <a:latin typeface="더잠실 2 Light" panose="00000300000000000000" pitchFamily="2" charset="-127"/>
+                <a:ea typeface="더잠실 2 Light" panose="00000300000000000000" pitchFamily="2" charset="-127"/>
+              </a:rPr>
+              <a:t>, </a:t>
+            </a:r>
+            <a:r>
+              <a:rPr lang="ko-KR" altLang="en-US" dirty="0">
+                <a:latin typeface="더잠실 2 Light" panose="00000300000000000000" pitchFamily="2" charset="-127"/>
+                <a:ea typeface="더잠실 2 Light" panose="00000300000000000000" pitchFamily="2" charset="-127"/>
+              </a:rPr>
+              <a:t>모듈 등을 통해 사용 가능하므로</a:t>
+            </a:r>
+            <a:endParaRPr lang="en-US" altLang="ko-KR" dirty="0">
+              <a:latin typeface="더잠실 2 Light" panose="00000300000000000000" pitchFamily="2" charset="-127"/>
+              <a:ea typeface="더잠실 2 Light" panose="00000300000000000000" pitchFamily="2" charset="-127"/>
+            </a:endParaRPr>
+          </a:p>
+          <a:p>
+            <a:pPr marL="0" indent="0">
+              <a:buNone/>
+            </a:pPr>
+            <a:r>
+              <a:rPr lang="ko-KR" altLang="en-US" dirty="0">
+                <a:latin typeface="더잠실 2 Light" panose="00000300000000000000" pitchFamily="2" charset="-127"/>
+                <a:ea typeface="더잠실 2 Light" panose="00000300000000000000" pitchFamily="2" charset="-127"/>
+              </a:rPr>
+              <a:t>실제 프로그래밍 중에는 구현할 필요가 없음</a:t>
+            </a:r>
+            <a:endParaRPr lang="en-US" altLang="ko-KR" dirty="0">
+              <a:latin typeface="더잠실 2 Light" panose="00000300000000000000" pitchFamily="2" charset="-127"/>
+              <a:ea typeface="더잠실 2 Light" panose="00000300000000000000" pitchFamily="2" charset="-127"/>
+            </a:endParaRPr>
+          </a:p>
+          <a:p>
+            <a:pPr marL="0" indent="0">
+              <a:buNone/>
+            </a:pPr>
+            <a:endParaRPr lang="en-US" altLang="ko-KR" dirty="0">
+              <a:latin typeface="더잠실 2 Light" panose="00000300000000000000" pitchFamily="2" charset="-127"/>
+              <a:ea typeface="더잠실 2 Light" panose="00000300000000000000" pitchFamily="2" charset="-127"/>
+            </a:endParaRPr>
+          </a:p>
+          <a:p>
+            <a:pPr marL="0" indent="0">
+              <a:buNone/>
+            </a:pPr>
+            <a:r>
+              <a:rPr lang="ko-KR" altLang="en-US" dirty="0">
+                <a:latin typeface="더잠실 2 Light" panose="00000300000000000000" pitchFamily="2" charset="-127"/>
+                <a:ea typeface="더잠실 2 Light" panose="00000300000000000000" pitchFamily="2" charset="-127"/>
+              </a:rPr>
+              <a:t>하지만</a:t>
+            </a:r>
+            <a:r>
+              <a:rPr lang="en-US" altLang="ko-KR" dirty="0">
+                <a:latin typeface="더잠실 2 Light" panose="00000300000000000000" pitchFamily="2" charset="-127"/>
+                <a:ea typeface="더잠실 2 Light" panose="00000300000000000000" pitchFamily="2" charset="-127"/>
+              </a:rPr>
+              <a:t>, </a:t>
+            </a:r>
+            <a:r>
+              <a:rPr lang="ko-KR" altLang="en-US" dirty="0">
+                <a:latin typeface="더잠실 2 Light" panose="00000300000000000000" pitchFamily="2" charset="-127"/>
+                <a:ea typeface="더잠실 2 Light" panose="00000300000000000000" pitchFamily="2" charset="-127"/>
+              </a:rPr>
+              <a:t>알고리즘과 구현방식을 이해할 필요는 있음</a:t>
+            </a:r>
+            <a:r>
+              <a:rPr lang="en-US" altLang="ko-KR" dirty="0">
+                <a:latin typeface="더잠실 2 Light" panose="00000300000000000000" pitchFamily="2" charset="-127"/>
+                <a:ea typeface="더잠실 2 Light" panose="00000300000000000000" pitchFamily="2" charset="-127"/>
+              </a:rPr>
+              <a:t>.</a:t>
+            </a:r>
+          </a:p>
+          <a:p>
+            <a:pPr marL="0" indent="0">
+              <a:buNone/>
+            </a:pPr>
+            <a:r>
+              <a:rPr lang="en-US" altLang="ko-KR" dirty="0">
+                <a:latin typeface="더잠실 2 Light" panose="00000300000000000000" pitchFamily="2" charset="-127"/>
+                <a:ea typeface="더잠실 2 Light" panose="00000300000000000000" pitchFamily="2" charset="-127"/>
+              </a:rPr>
+              <a:t>(</a:t>
+            </a:r>
+            <a:r>
+              <a:rPr lang="ko-KR" altLang="en-US" dirty="0">
+                <a:latin typeface="더잠실 2 Light" panose="00000300000000000000" pitchFamily="2" charset="-127"/>
+                <a:ea typeface="더잠실 2 Light" panose="00000300000000000000" pitchFamily="2" charset="-127"/>
+              </a:rPr>
+              <a:t>성적</a:t>
+            </a:r>
+            <a:r>
+              <a:rPr lang="en-US" altLang="ko-KR" dirty="0">
+                <a:latin typeface="더잠실 2 Light" panose="00000300000000000000" pitchFamily="2" charset="-127"/>
+                <a:ea typeface="더잠실 2 Light" panose="00000300000000000000" pitchFamily="2" charset="-127"/>
+              </a:rPr>
+              <a:t>, </a:t>
+            </a:r>
+            <a:r>
+              <a:rPr lang="ko-KR" altLang="en-US" dirty="0">
+                <a:latin typeface="더잠실 2 Light" panose="00000300000000000000" pitchFamily="2" charset="-127"/>
+                <a:ea typeface="더잠실 2 Light" panose="00000300000000000000" pitchFamily="2" charset="-127"/>
+              </a:rPr>
+              <a:t>프로그래밍 실력 향상</a:t>
+            </a:r>
+            <a:r>
+              <a:rPr lang="en-US" altLang="ko-KR" dirty="0">
+                <a:latin typeface="더잠실 2 Light" panose="00000300000000000000" pitchFamily="2" charset="-127"/>
+                <a:ea typeface="더잠실 2 Light" panose="00000300000000000000" pitchFamily="2" charset="-127"/>
+              </a:rPr>
+              <a:t>, CS</a:t>
+            </a:r>
+            <a:r>
+              <a:rPr lang="ko-KR" altLang="en-US" dirty="0">
+                <a:latin typeface="더잠실 2 Light" panose="00000300000000000000" pitchFamily="2" charset="-127"/>
+                <a:ea typeface="더잠실 2 Light" panose="00000300000000000000" pitchFamily="2" charset="-127"/>
+              </a:rPr>
+              <a:t>면접 대비</a:t>
+            </a:r>
+            <a:r>
+              <a:rPr lang="en-US" altLang="ko-KR" dirty="0">
+                <a:latin typeface="더잠실 2 Light" panose="00000300000000000000" pitchFamily="2" charset="-127"/>
+                <a:ea typeface="더잠실 2 Light" panose="00000300000000000000" pitchFamily="2" charset="-127"/>
+              </a:rPr>
+              <a:t> </a:t>
+            </a:r>
+            <a:r>
+              <a:rPr lang="ko-KR" altLang="en-US" dirty="0">
+                <a:latin typeface="더잠실 2 Light" panose="00000300000000000000" pitchFamily="2" charset="-127"/>
+                <a:ea typeface="더잠실 2 Light" panose="00000300000000000000" pitchFamily="2" charset="-127"/>
+              </a:rPr>
+              <a:t>등등</a:t>
+            </a:r>
+            <a:r>
+              <a:rPr lang="en-US" altLang="ko-KR" dirty="0">
+                <a:latin typeface="더잠실 2 Light" panose="00000300000000000000" pitchFamily="2" charset="-127"/>
+                <a:ea typeface="더잠실 2 Light" panose="00000300000000000000" pitchFamily="2" charset="-127"/>
+              </a:rPr>
+              <a:t>)</a:t>
+            </a:r>
           </a:p>
         </p:txBody>
       </p:sp>
@@ -10082,7 +10091,7 @@
           <p:cNvPr id="4" name="슬라이드 번호 개체 틀 3">
             <a:extLst>
               <a:ext uri="{FF2B5EF4-FFF2-40B4-BE49-F238E27FC236}">
-                <a16:creationId xmlns:a16="http://schemas.microsoft.com/office/drawing/2014/main" id="{37648B6A-0480-1C1E-D625-EE18B7DEBECC}"/>
+                <a16:creationId xmlns:a16="http://schemas.microsoft.com/office/drawing/2014/main" id="{00AC164D-63D8-F1DC-A4E0-74985EEC44B9}"/>
               </a:ext>
             </a:extLst>
           </p:cNvPr>
@@ -10101,6 +10110,130 @@
             <a:fld id="{35B45C20-CD26-4AB6-99FD-1165E1BECAF9}" type="slidenum">
               <a:rPr lang="ko-KR" altLang="en-US" smtClean="0"/>
               <a:t>23</a:t>
+            </a:fld>
+            <a:endParaRPr lang="ko-KR" altLang="en-US"/>
+          </a:p>
+        </p:txBody>
+      </p:sp>
+    </p:spTree>
+    <p:extLst>
+      <p:ext uri="{BB962C8B-B14F-4D97-AF65-F5344CB8AC3E}">
+        <p14:creationId xmlns:p14="http://schemas.microsoft.com/office/powerpoint/2010/main" val="3174217409"/>
+      </p:ext>
+    </p:extLst>
+  </p:cSld>
+  <p:clrMapOvr>
+    <a:masterClrMapping/>
+  </p:clrMapOvr>
+</p:sld>
+</file>
+
+<file path=ppt/slides/slide24.xml><?xml version="1.0" encoding="utf-8"?>
+<p:sld xmlns:a="http://schemas.openxmlformats.org/drawingml/2006/main" xmlns:r="http://schemas.openxmlformats.org/officeDocument/2006/relationships" xmlns:p="http://schemas.openxmlformats.org/presentationml/2006/main">
+  <p:cSld>
+    <p:spTree>
+      <p:nvGrpSpPr>
+        <p:cNvPr id="1" name=""/>
+        <p:cNvGrpSpPr/>
+        <p:nvPr/>
+      </p:nvGrpSpPr>
+      <p:grpSpPr>
+        <a:xfrm>
+          <a:off x="0" y="0"/>
+          <a:ext cx="0" cy="0"/>
+          <a:chOff x="0" y="0"/>
+          <a:chExt cx="0" cy="0"/>
+        </a:xfrm>
+      </p:grpSpPr>
+      <p:sp>
+        <p:nvSpPr>
+          <p:cNvPr id="2" name="제목 1">
+            <a:extLst>
+              <a:ext uri="{FF2B5EF4-FFF2-40B4-BE49-F238E27FC236}">
+                <a16:creationId xmlns:a16="http://schemas.microsoft.com/office/drawing/2014/main" id="{3779A2BD-EC83-5C8B-68E1-C95366F4CB46}"/>
+              </a:ext>
+            </a:extLst>
+          </p:cNvPr>
+          <p:cNvSpPr>
+            <a:spLocks noGrp="1"/>
+          </p:cNvSpPr>
+          <p:nvPr>
+            <p:ph type="title"/>
+          </p:nvPr>
+        </p:nvSpPr>
+        <p:spPr/>
+        <p:txBody>
+          <a:bodyPr/>
+          <a:lstStyle/>
+          <a:p>
+            <a:r>
+              <a:rPr lang="ko-KR" altLang="en-US" dirty="0">
+                <a:latin typeface="더잠실 3 Regular" panose="00000500000000000000" pitchFamily="2" charset="-127"/>
+                <a:ea typeface="더잠실 3 Regular" panose="00000500000000000000" pitchFamily="2" charset="-127"/>
+              </a:rPr>
+              <a:t>리스트를 이용한 스택 구현</a:t>
+            </a:r>
+          </a:p>
+        </p:txBody>
+      </p:sp>
+      <p:sp>
+        <p:nvSpPr>
+          <p:cNvPr id="3" name="내용 개체 틀 2">
+            <a:extLst>
+              <a:ext uri="{FF2B5EF4-FFF2-40B4-BE49-F238E27FC236}">
+                <a16:creationId xmlns:a16="http://schemas.microsoft.com/office/drawing/2014/main" id="{E7F7BF0B-540C-3A27-E3CB-A3D2DFC2DAD6}"/>
+              </a:ext>
+            </a:extLst>
+          </p:cNvPr>
+          <p:cNvSpPr>
+            <a:spLocks noGrp="1"/>
+          </p:cNvSpPr>
+          <p:nvPr>
+            <p:ph idx="1"/>
+          </p:nvPr>
+        </p:nvSpPr>
+        <p:spPr/>
+        <p:txBody>
+          <a:bodyPr/>
+          <a:lstStyle/>
+          <a:p>
+            <a:pPr marL="0" indent="0">
+              <a:buNone/>
+            </a:pPr>
+            <a:endParaRPr lang="en-US" altLang="ko-KR" dirty="0"/>
+          </a:p>
+          <a:p>
+            <a:pPr marL="0" indent="0">
+              <a:buNone/>
+            </a:pPr>
+            <a:endParaRPr lang="en-US" altLang="ko-KR" dirty="0"/>
+          </a:p>
+        </p:txBody>
+      </p:sp>
+      <p:sp>
+        <p:nvSpPr>
+          <p:cNvPr id="4" name="슬라이드 번호 개체 틀 3">
+            <a:extLst>
+              <a:ext uri="{FF2B5EF4-FFF2-40B4-BE49-F238E27FC236}">
+                <a16:creationId xmlns:a16="http://schemas.microsoft.com/office/drawing/2014/main" id="{37648B6A-0480-1C1E-D625-EE18B7DEBECC}"/>
+              </a:ext>
+            </a:extLst>
+          </p:cNvPr>
+          <p:cNvSpPr>
+            <a:spLocks noGrp="1"/>
+          </p:cNvSpPr>
+          <p:nvPr>
+            <p:ph type="sldNum" sz="quarter" idx="12"/>
+          </p:nvPr>
+        </p:nvSpPr>
+        <p:spPr/>
+        <p:txBody>
+          <a:bodyPr/>
+          <a:lstStyle/>
+          <a:p>
+            <a:fld id="{35B45C20-CD26-4AB6-99FD-1165E1BECAF9}" type="slidenum">
+              <a:rPr lang="ko-KR" altLang="en-US" smtClean="0"/>
+              <a:t>24</a:t>
             </a:fld>
             <a:endParaRPr lang="ko-KR" altLang="en-US"/>
           </a:p>
@@ -10244,7 +10377,7 @@
 </p:sld>
 </file>
 
-<file path=ppt/slides/slide24.xml><?xml version="1.0" encoding="utf-8"?>
+<file path=ppt/slides/slide25.xml><?xml version="1.0" encoding="utf-8"?>
 <p:sld xmlns:a="http://schemas.openxmlformats.org/drawingml/2006/main" xmlns:r="http://schemas.openxmlformats.org/officeDocument/2006/relationships" xmlns:p="http://schemas.openxmlformats.org/presentationml/2006/main">
   <p:cSld>
     <p:spTree>
@@ -10315,7 +10448,7 @@
           <a:p>
             <a:fld id="{35B45C20-CD26-4AB6-99FD-1165E1BECAF9}" type="slidenum">
               <a:rPr lang="ko-KR" altLang="en-US" smtClean="0"/>
-              <a:t>24</a:t>
+              <a:t>25</a:t>
             </a:fld>
             <a:endParaRPr lang="ko-KR" altLang="en-US"/>
           </a:p>
@@ -10617,7 +10750,7 @@
 </p:sld>
 </file>
 
-<file path=ppt/slides/slide25.xml><?xml version="1.0" encoding="utf-8"?>
+<file path=ppt/slides/slide26.xml><?xml version="1.0" encoding="utf-8"?>
 <p:sld xmlns:a="http://schemas.openxmlformats.org/drawingml/2006/main" xmlns:r="http://schemas.openxmlformats.org/officeDocument/2006/relationships" xmlns:p="http://schemas.openxmlformats.org/presentationml/2006/main">
   <p:cSld>
     <p:spTree>
@@ -10688,7 +10821,7 @@
           <a:p>
             <a:fld id="{35B45C20-CD26-4AB6-99FD-1165E1BECAF9}" type="slidenum">
               <a:rPr lang="ko-KR" altLang="en-US" smtClean="0"/>
-              <a:t>25</a:t>
+              <a:t>26</a:t>
             </a:fld>
             <a:endParaRPr lang="ko-KR" altLang="en-US"/>
           </a:p>
@@ -11294,286 +11427,6 @@
 </p:sld>
 </file>
 
-<file path=ppt/slides/slide26.xml><?xml version="1.0" encoding="utf-8"?>
-<p:sld xmlns:a="http://schemas.openxmlformats.org/drawingml/2006/main" xmlns:r="http://schemas.openxmlformats.org/officeDocument/2006/relationships" xmlns:p="http://schemas.openxmlformats.org/presentationml/2006/main">
-  <p:cSld>
-    <p:spTree>
-      <p:nvGrpSpPr>
-        <p:cNvPr id="1" name=""/>
-        <p:cNvGrpSpPr/>
-        <p:nvPr/>
-      </p:nvGrpSpPr>
-      <p:grpSpPr>
-        <a:xfrm>
-          <a:off x="0" y="0"/>
-          <a:ext cx="0" cy="0"/>
-          <a:chOff x="0" y="0"/>
-          <a:chExt cx="0" cy="0"/>
-        </a:xfrm>
-      </p:grpSpPr>
-      <p:sp>
-        <p:nvSpPr>
-          <p:cNvPr id="2" name="제목 1">
-            <a:extLst>
-              <a:ext uri="{FF2B5EF4-FFF2-40B4-BE49-F238E27FC236}">
-                <a16:creationId xmlns:a16="http://schemas.microsoft.com/office/drawing/2014/main" id="{8C055FF2-620C-82E6-2303-B2B61C0802A1}"/>
-              </a:ext>
-            </a:extLst>
-          </p:cNvPr>
-          <p:cNvSpPr>
-            <a:spLocks noGrp="1"/>
-          </p:cNvSpPr>
-          <p:nvPr>
-            <p:ph type="title"/>
-          </p:nvPr>
-        </p:nvSpPr>
-        <p:spPr/>
-        <p:txBody>
-          <a:bodyPr/>
-          <a:lstStyle/>
-          <a:p>
-            <a:r>
-              <a:rPr lang="ko-KR" altLang="en-US" dirty="0">
-                <a:latin typeface="더잠실 3 Regular" panose="00000500000000000000" pitchFamily="2" charset="-127"/>
-                <a:ea typeface="더잠실 3 Regular" panose="00000500000000000000" pitchFamily="2" charset="-127"/>
-              </a:rPr>
-              <a:t>큐</a:t>
-            </a:r>
-            <a:r>
-              <a:rPr lang="en-US" altLang="ko-KR" dirty="0">
-                <a:latin typeface="더잠실 3 Regular" panose="00000500000000000000" pitchFamily="2" charset="-127"/>
-                <a:ea typeface="더잠실 3 Regular" panose="00000500000000000000" pitchFamily="2" charset="-127"/>
-              </a:rPr>
-              <a:t>, </a:t>
-            </a:r>
-            <a:r>
-              <a:rPr lang="ko-KR" altLang="en-US" dirty="0" err="1">
-                <a:latin typeface="더잠실 3 Regular" panose="00000500000000000000" pitchFamily="2" charset="-127"/>
-                <a:ea typeface="더잠실 3 Regular" panose="00000500000000000000" pitchFamily="2" charset="-127"/>
-              </a:rPr>
-              <a:t>덱</a:t>
-            </a:r>
-            <a:r>
-              <a:rPr lang="en-US" altLang="ko-KR" dirty="0">
-                <a:latin typeface="더잠실 3 Regular" panose="00000500000000000000" pitchFamily="2" charset="-127"/>
-                <a:ea typeface="더잠실 3 Regular" panose="00000500000000000000" pitchFamily="2" charset="-127"/>
-              </a:rPr>
-              <a:t> </a:t>
-            </a:r>
-            <a:r>
-              <a:rPr lang="ko-KR" altLang="en-US" dirty="0">
-                <a:latin typeface="더잠실 3 Regular" panose="00000500000000000000" pitchFamily="2" charset="-127"/>
-                <a:ea typeface="더잠실 3 Regular" panose="00000500000000000000" pitchFamily="2" charset="-127"/>
-              </a:rPr>
-              <a:t>구현</a:t>
-            </a:r>
-            <a:r>
-              <a:rPr lang="en-US" altLang="ko-KR" dirty="0">
-                <a:latin typeface="더잠실 3 Regular" panose="00000500000000000000" pitchFamily="2" charset="-127"/>
-                <a:ea typeface="더잠실 3 Regular" panose="00000500000000000000" pitchFamily="2" charset="-127"/>
-              </a:rPr>
-              <a:t>?</a:t>
-            </a:r>
-            <a:endParaRPr lang="ko-KR" altLang="en-US" dirty="0">
-              <a:latin typeface="더잠실 3 Regular" panose="00000500000000000000" pitchFamily="2" charset="-127"/>
-              <a:ea typeface="더잠실 3 Regular" panose="00000500000000000000" pitchFamily="2" charset="-127"/>
-            </a:endParaRPr>
-          </a:p>
-        </p:txBody>
-      </p:sp>
-      <p:sp>
-        <p:nvSpPr>
-          <p:cNvPr id="3" name="내용 개체 틀 2">
-            <a:extLst>
-              <a:ext uri="{FF2B5EF4-FFF2-40B4-BE49-F238E27FC236}">
-                <a16:creationId xmlns:a16="http://schemas.microsoft.com/office/drawing/2014/main" id="{086E018D-F489-6018-40EB-A372B09B495D}"/>
-              </a:ext>
-            </a:extLst>
-          </p:cNvPr>
-          <p:cNvSpPr>
-            <a:spLocks noGrp="1"/>
-          </p:cNvSpPr>
-          <p:nvPr>
-            <p:ph idx="1"/>
-          </p:nvPr>
-        </p:nvSpPr>
-        <p:spPr/>
-        <p:txBody>
-          <a:bodyPr/>
-          <a:lstStyle/>
-          <a:p>
-            <a:pPr marL="0" indent="0">
-              <a:buNone/>
-            </a:pPr>
-            <a:r>
-              <a:rPr lang="en-US" altLang="ko-KR" dirty="0">
-                <a:latin typeface="더잠실 2 Light" panose="00000300000000000000" pitchFamily="2" charset="-127"/>
-                <a:ea typeface="더잠실 2 Light" panose="00000300000000000000" pitchFamily="2" charset="-127"/>
-              </a:rPr>
-              <a:t>1. </a:t>
-            </a:r>
-            <a:r>
-              <a:rPr lang="ko-KR" altLang="en-US" dirty="0">
-                <a:latin typeface="더잠실 2 Light" panose="00000300000000000000" pitchFamily="2" charset="-127"/>
-                <a:ea typeface="더잠실 2 Light" panose="00000300000000000000" pitchFamily="2" charset="-127"/>
-              </a:rPr>
-              <a:t>리스트로 구현하는 큐</a:t>
-            </a:r>
-            <a:endParaRPr lang="en-US" altLang="ko-KR" dirty="0">
-              <a:latin typeface="더잠실 2 Light" panose="00000300000000000000" pitchFamily="2" charset="-127"/>
-              <a:ea typeface="더잠실 2 Light" panose="00000300000000000000" pitchFamily="2" charset="-127"/>
-            </a:endParaRPr>
-          </a:p>
-          <a:p>
-            <a:pPr marL="0" indent="0">
-              <a:buNone/>
-            </a:pPr>
-            <a:r>
-              <a:rPr lang="en-US" altLang="ko-KR" dirty="0">
-                <a:latin typeface="더잠실 2 Light" panose="00000300000000000000" pitchFamily="2" charset="-127"/>
-                <a:ea typeface="더잠실 2 Light" panose="00000300000000000000" pitchFamily="2" charset="-127"/>
-              </a:rPr>
-              <a:t>2. </a:t>
-            </a:r>
-            <a:r>
-              <a:rPr lang="ko-KR" altLang="en-US" dirty="0">
-                <a:latin typeface="더잠실 2 Light" panose="00000300000000000000" pitchFamily="2" charset="-127"/>
-                <a:ea typeface="더잠실 2 Light" panose="00000300000000000000" pitchFamily="2" charset="-127"/>
-              </a:rPr>
-              <a:t>연결 리스트로 구현하는 큐</a:t>
-            </a:r>
-            <a:endParaRPr lang="en-US" altLang="ko-KR" dirty="0">
-              <a:latin typeface="더잠실 2 Light" panose="00000300000000000000" pitchFamily="2" charset="-127"/>
-              <a:ea typeface="더잠실 2 Light" panose="00000300000000000000" pitchFamily="2" charset="-127"/>
-            </a:endParaRPr>
-          </a:p>
-          <a:p>
-            <a:pPr marL="0" indent="0">
-              <a:buNone/>
-            </a:pPr>
-            <a:r>
-              <a:rPr lang="en-US" altLang="ko-KR" dirty="0">
-                <a:highlight>
-                  <a:srgbClr val="FFFF00"/>
-                </a:highlight>
-                <a:latin typeface="더잠실 2 Light" panose="00000300000000000000" pitchFamily="2" charset="-127"/>
-                <a:ea typeface="더잠실 2 Light" panose="00000300000000000000" pitchFamily="2" charset="-127"/>
-              </a:rPr>
-              <a:t>3. </a:t>
-            </a:r>
-            <a:r>
-              <a:rPr lang="ko-KR" altLang="en-US" dirty="0">
-                <a:highlight>
-                  <a:srgbClr val="FFFF00"/>
-                </a:highlight>
-                <a:latin typeface="더잠실 2 Light" panose="00000300000000000000" pitchFamily="2" charset="-127"/>
-                <a:ea typeface="더잠실 2 Light" panose="00000300000000000000" pitchFamily="2" charset="-127"/>
-              </a:rPr>
-              <a:t>원형 연결 리스트로 구현하는 큐</a:t>
-            </a:r>
-            <a:endParaRPr lang="en-US" altLang="ko-KR" dirty="0">
-              <a:highlight>
-                <a:srgbClr val="FFFF00"/>
-              </a:highlight>
-              <a:latin typeface="더잠실 2 Light" panose="00000300000000000000" pitchFamily="2" charset="-127"/>
-              <a:ea typeface="더잠실 2 Light" panose="00000300000000000000" pitchFamily="2" charset="-127"/>
-            </a:endParaRPr>
-          </a:p>
-          <a:p>
-            <a:pPr marL="0" indent="0">
-              <a:buNone/>
-            </a:pPr>
-            <a:r>
-              <a:rPr lang="en-US" altLang="ko-KR" dirty="0">
-                <a:highlight>
-                  <a:srgbClr val="FFFF00"/>
-                </a:highlight>
-                <a:latin typeface="더잠실 2 Light" panose="00000300000000000000" pitchFamily="2" charset="-127"/>
-                <a:ea typeface="더잠실 2 Light" panose="00000300000000000000" pitchFamily="2" charset="-127"/>
-              </a:rPr>
-              <a:t>4. </a:t>
-            </a:r>
-            <a:r>
-              <a:rPr lang="ko-KR" altLang="en-US" dirty="0">
-                <a:highlight>
-                  <a:srgbClr val="FFFF00"/>
-                </a:highlight>
-                <a:latin typeface="더잠실 2 Light" panose="00000300000000000000" pitchFamily="2" charset="-127"/>
-                <a:ea typeface="더잠실 2 Light" panose="00000300000000000000" pitchFamily="2" charset="-127"/>
-              </a:rPr>
-              <a:t>원형 연결 큐로 구현하는 </a:t>
-            </a:r>
-            <a:r>
-              <a:rPr lang="ko-KR" altLang="en-US" dirty="0" err="1">
-                <a:highlight>
-                  <a:srgbClr val="FFFF00"/>
-                </a:highlight>
-                <a:latin typeface="더잠실 2 Light" panose="00000300000000000000" pitchFamily="2" charset="-127"/>
-                <a:ea typeface="더잠실 2 Light" panose="00000300000000000000" pitchFamily="2" charset="-127"/>
-              </a:rPr>
-              <a:t>덱</a:t>
-            </a:r>
-            <a:endParaRPr lang="en-US" altLang="ko-KR" dirty="0">
-              <a:highlight>
-                <a:srgbClr val="FFFF00"/>
-              </a:highlight>
-              <a:latin typeface="더잠실 2 Light" panose="00000300000000000000" pitchFamily="2" charset="-127"/>
-              <a:ea typeface="더잠실 2 Light" panose="00000300000000000000" pitchFamily="2" charset="-127"/>
-            </a:endParaRPr>
-          </a:p>
-          <a:p>
-            <a:pPr marL="0" indent="0">
-              <a:buNone/>
-            </a:pPr>
-            <a:endParaRPr lang="ko-KR" altLang="en-US" dirty="0">
-              <a:latin typeface="더잠실 2 Light" panose="00000300000000000000" pitchFamily="2" charset="-127"/>
-              <a:ea typeface="더잠실 2 Light" panose="00000300000000000000" pitchFamily="2" charset="-127"/>
-            </a:endParaRPr>
-          </a:p>
-        </p:txBody>
-      </p:sp>
-      <p:sp>
-        <p:nvSpPr>
-          <p:cNvPr id="4" name="슬라이드 번호 개체 틀 3">
-            <a:extLst>
-              <a:ext uri="{FF2B5EF4-FFF2-40B4-BE49-F238E27FC236}">
-                <a16:creationId xmlns:a16="http://schemas.microsoft.com/office/drawing/2014/main" id="{86FA49CA-9A94-36AD-3383-FA9B036EDCF4}"/>
-              </a:ext>
-            </a:extLst>
-          </p:cNvPr>
-          <p:cNvSpPr>
-            <a:spLocks noGrp="1"/>
-          </p:cNvSpPr>
-          <p:nvPr>
-            <p:ph type="sldNum" sz="quarter" idx="12"/>
-          </p:nvPr>
-        </p:nvSpPr>
-        <p:spPr/>
-        <p:txBody>
-          <a:bodyPr/>
-          <a:lstStyle/>
-          <a:p>
-            <a:fld id="{35B45C20-CD26-4AB6-99FD-1165E1BECAF9}" type="slidenum">
-              <a:rPr lang="ko-KR" altLang="en-US" smtClean="0"/>
-              <a:t>26</a:t>
-            </a:fld>
-            <a:endParaRPr lang="ko-KR" altLang="en-US"/>
-          </a:p>
-        </p:txBody>
-      </p:sp>
-    </p:spTree>
-    <p:extLst>
-      <p:ext uri="{BB962C8B-B14F-4D97-AF65-F5344CB8AC3E}">
-        <p14:creationId xmlns:p14="http://schemas.microsoft.com/office/powerpoint/2010/main" val="3248633364"/>
-      </p:ext>
-    </p:extLst>
-  </p:cSld>
-  <p:clrMapOvr>
-    <a:masterClrMapping/>
-  </p:clrMapOvr>
-</p:sld>
-</file>
-
 <file path=ppt/slides/slide27.xml><?xml version="1.0" encoding="utf-8"?>
 <p:sld xmlns:a="http://schemas.openxmlformats.org/drawingml/2006/main" xmlns:r="http://schemas.openxmlformats.org/officeDocument/2006/relationships" xmlns:p="http://schemas.openxmlformats.org/presentationml/2006/main">
   <p:cSld>
@@ -11596,7 +11449,7 @@
           <p:cNvPr id="2" name="제목 1">
             <a:extLst>
               <a:ext uri="{FF2B5EF4-FFF2-40B4-BE49-F238E27FC236}">
-                <a16:creationId xmlns:a16="http://schemas.microsoft.com/office/drawing/2014/main" id="{959A6062-92B1-51A5-4180-37B2EEED303F}"/>
+                <a16:creationId xmlns:a16="http://schemas.microsoft.com/office/drawing/2014/main" id="{8C055FF2-620C-82E6-2303-B2B61C0802A1}"/>
               </a:ext>
             </a:extLst>
           </p:cNvPr>
@@ -11617,8 +11470,47 @@
                 <a:latin typeface="더잠실 3 Regular" panose="00000500000000000000" pitchFamily="2" charset="-127"/>
                 <a:ea typeface="더잠실 3 Regular" panose="00000500000000000000" pitchFamily="2" charset="-127"/>
               </a:rPr>
-              <a:t>자료구조를 사용하는 예제</a:t>
-            </a:r>
+              <a:t>큐</a:t>
+            </a:r>
+            <a:r>
+              <a:rPr lang="en-US" altLang="ko-KR" dirty="0">
+                <a:latin typeface="더잠실 3 Regular" panose="00000500000000000000" pitchFamily="2" charset="-127"/>
+                <a:ea typeface="더잠실 3 Regular" panose="00000500000000000000" pitchFamily="2" charset="-127"/>
+              </a:rPr>
+              <a:t>, </a:t>
+            </a:r>
+            <a:r>
+              <a:rPr lang="ko-KR" altLang="en-US" dirty="0" err="1">
+                <a:latin typeface="더잠실 3 Regular" panose="00000500000000000000" pitchFamily="2" charset="-127"/>
+                <a:ea typeface="더잠실 3 Regular" panose="00000500000000000000" pitchFamily="2" charset="-127"/>
+              </a:rPr>
+              <a:t>덱</a:t>
+            </a:r>
+            <a:r>
+              <a:rPr lang="en-US" altLang="ko-KR" dirty="0">
+                <a:latin typeface="더잠실 3 Regular" panose="00000500000000000000" pitchFamily="2" charset="-127"/>
+                <a:ea typeface="더잠실 3 Regular" panose="00000500000000000000" pitchFamily="2" charset="-127"/>
+              </a:rPr>
+              <a:t> </a:t>
+            </a:r>
+            <a:r>
+              <a:rPr lang="ko-KR" altLang="en-US" dirty="0">
+                <a:latin typeface="더잠실 3 Regular" panose="00000500000000000000" pitchFamily="2" charset="-127"/>
+                <a:ea typeface="더잠실 3 Regular" panose="00000500000000000000" pitchFamily="2" charset="-127"/>
+              </a:rPr>
+              <a:t>구현</a:t>
+            </a:r>
+            <a:r>
+              <a:rPr lang="en-US" altLang="ko-KR" dirty="0">
+                <a:latin typeface="더잠실 3 Regular" panose="00000500000000000000" pitchFamily="2" charset="-127"/>
+                <a:ea typeface="더잠실 3 Regular" panose="00000500000000000000" pitchFamily="2" charset="-127"/>
+              </a:rPr>
+              <a:t>?</a:t>
+            </a:r>
+            <a:endParaRPr lang="ko-KR" altLang="en-US" dirty="0">
+              <a:latin typeface="더잠실 3 Regular" panose="00000500000000000000" pitchFamily="2" charset="-127"/>
+              <a:ea typeface="더잠실 3 Regular" panose="00000500000000000000" pitchFamily="2" charset="-127"/>
+            </a:endParaRPr>
           </a:p>
         </p:txBody>
       </p:sp>
@@ -11627,7 +11519,7 @@
           <p:cNvPr id="3" name="내용 개체 틀 2">
             <a:extLst>
               <a:ext uri="{FF2B5EF4-FFF2-40B4-BE49-F238E27FC236}">
-                <a16:creationId xmlns:a16="http://schemas.microsoft.com/office/drawing/2014/main" id="{85E87407-DFA5-9D52-7871-291BFB8162F9}"/>
+                <a16:creationId xmlns:a16="http://schemas.microsoft.com/office/drawing/2014/main" id="{086E018D-F489-6018-40EB-A372B09B495D}"/>
               </a:ext>
             </a:extLst>
           </p:cNvPr>
@@ -11643,20 +11535,22 @@
           <a:bodyPr/>
           <a:lstStyle/>
           <a:p>
+            <a:pPr marL="0" indent="0">
+              <a:buNone/>
+            </a:pPr>
+            <a:r>
+              <a:rPr lang="en-US" altLang="ko-KR" dirty="0">
+                <a:latin typeface="더잠실 2 Light" panose="00000300000000000000" pitchFamily="2" charset="-127"/>
+                <a:ea typeface="더잠실 2 Light" panose="00000300000000000000" pitchFamily="2" charset="-127"/>
+              </a:rPr>
+              <a:t>1. </a:t>
+            </a:r>
             <a:r>
               <a:rPr lang="ko-KR" altLang="en-US" dirty="0">
                 <a:latin typeface="더잠실 2 Light" panose="00000300000000000000" pitchFamily="2" charset="-127"/>
                 <a:ea typeface="더잠실 2 Light" panose="00000300000000000000" pitchFamily="2" charset="-127"/>
               </a:rPr>
-              <a:t>괄호  </a:t>
-            </a:r>
-            <a:r>
-              <a:rPr lang="en-US" altLang="ko-KR" dirty="0">
-                <a:latin typeface="더잠실 2 Light" panose="00000300000000000000" pitchFamily="2" charset="-127"/>
-                <a:ea typeface="더잠실 2 Light" panose="00000300000000000000" pitchFamily="2" charset="-127"/>
-                <a:hlinkClick r:id="rId2"/>
-              </a:rPr>
-              <a:t>https://www.acmicpc.net/problem/9012</a:t>
+              <a:t>리스트로 구현하는 큐</a:t>
             </a:r>
             <a:endParaRPr lang="en-US" altLang="ko-KR" dirty="0">
               <a:latin typeface="더잠실 2 Light" panose="00000300000000000000" pitchFamily="2" charset="-127"/>
@@ -11664,28 +11558,88 @@
             </a:endParaRPr>
           </a:p>
           <a:p>
+            <a:pPr marL="0" indent="0">
+              <a:buNone/>
+            </a:pPr>
+            <a:r>
+              <a:rPr lang="en-US" altLang="ko-KR" dirty="0">
+                <a:latin typeface="더잠실 2 Light" panose="00000300000000000000" pitchFamily="2" charset="-127"/>
+                <a:ea typeface="더잠실 2 Light" panose="00000300000000000000" pitchFamily="2" charset="-127"/>
+              </a:rPr>
+              <a:t>2. </a:t>
+            </a:r>
             <a:r>
               <a:rPr lang="ko-KR" altLang="en-US" dirty="0">
                 <a:latin typeface="더잠실 2 Light" panose="00000300000000000000" pitchFamily="2" charset="-127"/>
                 <a:ea typeface="더잠실 2 Light" panose="00000300000000000000" pitchFamily="2" charset="-127"/>
               </a:rPr>
-              <a:t>카드</a:t>
-            </a:r>
+              <a:t>연결 리스트로 구현하는 큐</a:t>
+            </a:r>
+            <a:endParaRPr lang="en-US" altLang="ko-KR" dirty="0">
+              <a:latin typeface="더잠실 2 Light" panose="00000300000000000000" pitchFamily="2" charset="-127"/>
+              <a:ea typeface="더잠실 2 Light" panose="00000300000000000000" pitchFamily="2" charset="-127"/>
+            </a:endParaRPr>
+          </a:p>
+          <a:p>
+            <a:pPr marL="0" indent="0">
+              <a:buNone/>
+            </a:pPr>
             <a:r>
               <a:rPr lang="en-US" altLang="ko-KR" dirty="0">
                 <a:latin typeface="더잠실 2 Light" panose="00000300000000000000" pitchFamily="2" charset="-127"/>
                 <a:ea typeface="더잠실 2 Light" panose="00000300000000000000" pitchFamily="2" charset="-127"/>
               </a:rPr>
-              <a:t>2  </a:t>
-            </a:r>
+              <a:t>3. </a:t>
+            </a:r>
+            <a:r>
+              <a:rPr lang="ko-KR" altLang="en-US" dirty="0">
+                <a:latin typeface="더잠실 2 Light" panose="00000300000000000000" pitchFamily="2" charset="-127"/>
+                <a:ea typeface="더잠실 2 Light" panose="00000300000000000000" pitchFamily="2" charset="-127"/>
+              </a:rPr>
+              <a:t>원형 연결 리스트로 구현하는 큐</a:t>
+            </a:r>
+            <a:endParaRPr lang="en-US" altLang="ko-KR" dirty="0">
+              <a:latin typeface="더잠실 2 Light" panose="00000300000000000000" pitchFamily="2" charset="-127"/>
+              <a:ea typeface="더잠실 2 Light" panose="00000300000000000000" pitchFamily="2" charset="-127"/>
+            </a:endParaRPr>
+          </a:p>
+          <a:p>
+            <a:pPr marL="0" indent="0">
+              <a:buNone/>
+            </a:pPr>
             <a:r>
               <a:rPr lang="en-US" altLang="ko-KR" dirty="0">
                 <a:latin typeface="더잠실 2 Light" panose="00000300000000000000" pitchFamily="2" charset="-127"/>
                 <a:ea typeface="더잠실 2 Light" panose="00000300000000000000" pitchFamily="2" charset="-127"/>
-                <a:hlinkClick r:id="rId3"/>
-              </a:rPr>
-              <a:t>https://www.acmicpc.net/problem/2164</a:t>
-            </a:r>
+              </a:rPr>
+              <a:t>4. </a:t>
+            </a:r>
+            <a:r>
+              <a:rPr lang="ko-KR" altLang="en-US" dirty="0" err="1">
+                <a:latin typeface="더잠실 2 Light" panose="00000300000000000000" pitchFamily="2" charset="-127"/>
+                <a:ea typeface="더잠실 2 Light" panose="00000300000000000000" pitchFamily="2" charset="-127"/>
+              </a:rPr>
+              <a:t>덱</a:t>
+            </a:r>
+            <a:r>
+              <a:rPr lang="ko-KR" altLang="en-US" dirty="0">
+                <a:latin typeface="더잠실 2 Light" panose="00000300000000000000" pitchFamily="2" charset="-127"/>
+                <a:ea typeface="더잠실 2 Light" panose="00000300000000000000" pitchFamily="2" charset="-127"/>
+              </a:rPr>
+              <a:t> </a:t>
+            </a:r>
+            <a:r>
+              <a:rPr lang="en-US" altLang="ko-KR" dirty="0">
+                <a:latin typeface="더잠실 2 Light" panose="00000300000000000000" pitchFamily="2" charset="-127"/>
+                <a:ea typeface="더잠실 2 Light" panose="00000300000000000000" pitchFamily="2" charset="-127"/>
+              </a:rPr>
+              <a:t>?</a:t>
+            </a:r>
+          </a:p>
+          <a:p>
+            <a:pPr marL="0" indent="0">
+              <a:buNone/>
+            </a:pPr>
             <a:endParaRPr lang="ko-KR" altLang="en-US" dirty="0">
               <a:latin typeface="더잠실 2 Light" panose="00000300000000000000" pitchFamily="2" charset="-127"/>
               <a:ea typeface="더잠실 2 Light" panose="00000300000000000000" pitchFamily="2" charset="-127"/>
@@ -11698,7 +11652,7 @@
           <p:cNvPr id="4" name="슬라이드 번호 개체 틀 3">
             <a:extLst>
               <a:ext uri="{FF2B5EF4-FFF2-40B4-BE49-F238E27FC236}">
-                <a16:creationId xmlns:a16="http://schemas.microsoft.com/office/drawing/2014/main" id="{F234C5CB-6FF1-ADAD-1272-4F99D0B8948D}"/>
+                <a16:creationId xmlns:a16="http://schemas.microsoft.com/office/drawing/2014/main" id="{86FA49CA-9A94-36AD-3383-FA9B036EDCF4}"/>
               </a:ext>
             </a:extLst>
           </p:cNvPr>
@@ -11725,7 +11679,448 @@
     </p:spTree>
     <p:extLst>
       <p:ext uri="{BB962C8B-B14F-4D97-AF65-F5344CB8AC3E}">
-        <p14:creationId xmlns:p14="http://schemas.microsoft.com/office/powerpoint/2010/main" val="1828514258"/>
+        <p14:creationId xmlns:p14="http://schemas.microsoft.com/office/powerpoint/2010/main" val="3248633364"/>
+      </p:ext>
+    </p:extLst>
+  </p:cSld>
+  <p:clrMapOvr>
+    <a:masterClrMapping/>
+  </p:clrMapOvr>
+</p:sld>
+</file>
+
+<file path=ppt/slides/slide28.xml><?xml version="1.0" encoding="utf-8"?>
+<p:sld xmlns:a="http://schemas.openxmlformats.org/drawingml/2006/main" xmlns:r="http://schemas.openxmlformats.org/officeDocument/2006/relationships" xmlns:p="http://schemas.openxmlformats.org/presentationml/2006/main">
+  <p:cSld>
+    <p:spTree>
+      <p:nvGrpSpPr>
+        <p:cNvPr id="1" name=""/>
+        <p:cNvGrpSpPr/>
+        <p:nvPr/>
+      </p:nvGrpSpPr>
+      <p:grpSpPr>
+        <a:xfrm>
+          <a:off x="0" y="0"/>
+          <a:ext cx="0" cy="0"/>
+          <a:chOff x="0" y="0"/>
+          <a:chExt cx="0" cy="0"/>
+        </a:xfrm>
+      </p:grpSpPr>
+      <p:sp>
+        <p:nvSpPr>
+          <p:cNvPr id="2" name="제목 1">
+            <a:extLst>
+              <a:ext uri="{FF2B5EF4-FFF2-40B4-BE49-F238E27FC236}">
+                <a16:creationId xmlns:a16="http://schemas.microsoft.com/office/drawing/2014/main" id="{9365FC75-3EC0-2D02-F8DC-2CD9CF02AE2F}"/>
+              </a:ext>
+            </a:extLst>
+          </p:cNvPr>
+          <p:cNvSpPr>
+            <a:spLocks noGrp="1"/>
+          </p:cNvSpPr>
+          <p:nvPr>
+            <p:ph type="title"/>
+          </p:nvPr>
+        </p:nvSpPr>
+        <p:spPr/>
+        <p:txBody>
+          <a:bodyPr/>
+          <a:lstStyle/>
+          <a:p>
+            <a:r>
+              <a:rPr lang="en-US" altLang="ko-KR" dirty="0">
+                <a:latin typeface="더잠실 3 Regular" panose="00000500000000000000" pitchFamily="2" charset="-127"/>
+                <a:ea typeface="더잠실 3 Regular" panose="00000500000000000000" pitchFamily="2" charset="-127"/>
+              </a:rPr>
+              <a:t>1. </a:t>
+            </a:r>
+            <a:r>
+              <a:rPr lang="ko-KR" altLang="en-US" dirty="0">
+                <a:latin typeface="더잠실 3 Regular" panose="00000500000000000000" pitchFamily="2" charset="-127"/>
+                <a:ea typeface="더잠실 3 Regular" panose="00000500000000000000" pitchFamily="2" charset="-127"/>
+              </a:rPr>
+              <a:t>리스트로 구현하는 큐</a:t>
+            </a:r>
+          </a:p>
+        </p:txBody>
+      </p:sp>
+      <p:sp>
+        <p:nvSpPr>
+          <p:cNvPr id="3" name="내용 개체 틀 2">
+            <a:extLst>
+              <a:ext uri="{FF2B5EF4-FFF2-40B4-BE49-F238E27FC236}">
+                <a16:creationId xmlns:a16="http://schemas.microsoft.com/office/drawing/2014/main" id="{7538F4A3-393E-974C-F1AE-9BAA8514EB55}"/>
+              </a:ext>
+            </a:extLst>
+          </p:cNvPr>
+          <p:cNvSpPr>
+            <a:spLocks noGrp="1"/>
+          </p:cNvSpPr>
+          <p:nvPr>
+            <p:ph idx="1"/>
+          </p:nvPr>
+        </p:nvSpPr>
+        <p:spPr/>
+        <p:txBody>
+          <a:bodyPr/>
+          <a:lstStyle/>
+          <a:p>
+            <a:pPr marL="0" indent="0">
+              <a:buNone/>
+            </a:pPr>
+            <a:endParaRPr lang="ko-KR" altLang="en-US" dirty="0"/>
+          </a:p>
+        </p:txBody>
+      </p:sp>
+      <p:sp>
+        <p:nvSpPr>
+          <p:cNvPr id="4" name="슬라이드 번호 개체 틀 3">
+            <a:extLst>
+              <a:ext uri="{FF2B5EF4-FFF2-40B4-BE49-F238E27FC236}">
+                <a16:creationId xmlns:a16="http://schemas.microsoft.com/office/drawing/2014/main" id="{4413BF1C-0360-A449-5CAF-929B2048319C}"/>
+              </a:ext>
+            </a:extLst>
+          </p:cNvPr>
+          <p:cNvSpPr>
+            <a:spLocks noGrp="1"/>
+          </p:cNvSpPr>
+          <p:nvPr>
+            <p:ph type="sldNum" sz="quarter" idx="12"/>
+          </p:nvPr>
+        </p:nvSpPr>
+        <p:spPr/>
+        <p:txBody>
+          <a:bodyPr/>
+          <a:lstStyle/>
+          <a:p>
+            <a:fld id="{35B45C20-CD26-4AB6-99FD-1165E1BECAF9}" type="slidenum">
+              <a:rPr lang="ko-KR" altLang="en-US" smtClean="0"/>
+              <a:t>28</a:t>
+            </a:fld>
+            <a:endParaRPr lang="ko-KR" altLang="en-US"/>
+          </a:p>
+        </p:txBody>
+      </p:sp>
+      <p:pic>
+        <p:nvPicPr>
+          <p:cNvPr id="7" name="Picture 2" descr="자료구조] 배열(Array)과 연결리스트(LinkedList) :: Ahribori's Blog">
+            <a:extLst>
+              <a:ext uri="{FF2B5EF4-FFF2-40B4-BE49-F238E27FC236}">
+                <a16:creationId xmlns:a16="http://schemas.microsoft.com/office/drawing/2014/main" id="{7C406A86-99E0-BA85-B144-81AFD9F2B75C}"/>
+              </a:ext>
+            </a:extLst>
+          </p:cNvPr>
+          <p:cNvPicPr>
+            <a:picLocks noChangeAspect="1" noChangeArrowheads="1"/>
+          </p:cNvPicPr>
+          <p:nvPr/>
+        </p:nvPicPr>
+        <p:blipFill>
+          <a:blip r:embed="rId2">
+            <a:extLst>
+              <a:ext uri="{28A0092B-C50C-407E-A947-70E740481C1C}">
+                <a14:useLocalDpi xmlns:a14="http://schemas.microsoft.com/office/drawing/2010/main" val="0"/>
+              </a:ext>
+            </a:extLst>
+          </a:blip>
+          <a:srcRect/>
+          <a:stretch>
+            <a:fillRect/>
+          </a:stretch>
+        </p:blipFill>
+        <p:spPr bwMode="auto">
+          <a:xfrm>
+            <a:off x="838200" y="1690688"/>
+            <a:ext cx="10515600" cy="2867890"/>
+          </a:xfrm>
+          <a:prstGeom prst="rect">
+            <a:avLst/>
+          </a:prstGeom>
+          <a:noFill/>
+          <a:extLst>
+            <a:ext uri="{909E8E84-426E-40DD-AFC4-6F175D3DCCD1}">
+              <a14:hiddenFill xmlns:a14="http://schemas.microsoft.com/office/drawing/2010/main">
+                <a:solidFill>
+                  <a:srgbClr val="FFFFFF"/>
+                </a:solidFill>
+              </a14:hiddenFill>
+            </a:ext>
+          </a:extLst>
+        </p:spPr>
+      </p:pic>
+    </p:spTree>
+    <p:extLst>
+      <p:ext uri="{BB962C8B-B14F-4D97-AF65-F5344CB8AC3E}">
+        <p14:creationId xmlns:p14="http://schemas.microsoft.com/office/powerpoint/2010/main" val="1270917181"/>
+      </p:ext>
+    </p:extLst>
+  </p:cSld>
+  <p:clrMapOvr>
+    <a:masterClrMapping/>
+  </p:clrMapOvr>
+</p:sld>
+</file>
+
+<file path=ppt/slides/slide29.xml><?xml version="1.0" encoding="utf-8"?>
+<p:sld xmlns:a="http://schemas.openxmlformats.org/drawingml/2006/main" xmlns:r="http://schemas.openxmlformats.org/officeDocument/2006/relationships" xmlns:p="http://schemas.openxmlformats.org/presentationml/2006/main">
+  <p:cSld>
+    <p:spTree>
+      <p:nvGrpSpPr>
+        <p:cNvPr id="1" name=""/>
+        <p:cNvGrpSpPr/>
+        <p:nvPr/>
+      </p:nvGrpSpPr>
+      <p:grpSpPr>
+        <a:xfrm>
+          <a:off x="0" y="0"/>
+          <a:ext cx="0" cy="0"/>
+          <a:chOff x="0" y="0"/>
+          <a:chExt cx="0" cy="0"/>
+        </a:xfrm>
+      </p:grpSpPr>
+      <p:sp>
+        <p:nvSpPr>
+          <p:cNvPr id="2" name="제목 1">
+            <a:extLst>
+              <a:ext uri="{FF2B5EF4-FFF2-40B4-BE49-F238E27FC236}">
+                <a16:creationId xmlns:a16="http://schemas.microsoft.com/office/drawing/2014/main" id="{9365FC75-3EC0-2D02-F8DC-2CD9CF02AE2F}"/>
+              </a:ext>
+            </a:extLst>
+          </p:cNvPr>
+          <p:cNvSpPr>
+            <a:spLocks noGrp="1"/>
+          </p:cNvSpPr>
+          <p:nvPr>
+            <p:ph type="title"/>
+          </p:nvPr>
+        </p:nvSpPr>
+        <p:spPr/>
+        <p:txBody>
+          <a:bodyPr/>
+          <a:lstStyle/>
+          <a:p>
+            <a:r>
+              <a:rPr lang="en-US" altLang="ko-KR" dirty="0">
+                <a:latin typeface="더잠실 3 Regular" panose="00000500000000000000" pitchFamily="2" charset="-127"/>
+                <a:ea typeface="더잠실 3 Regular" panose="00000500000000000000" pitchFamily="2" charset="-127"/>
+              </a:rPr>
+              <a:t>1. </a:t>
+            </a:r>
+            <a:r>
+              <a:rPr lang="ko-KR" altLang="en-US" dirty="0">
+                <a:latin typeface="더잠실 3 Regular" panose="00000500000000000000" pitchFamily="2" charset="-127"/>
+                <a:ea typeface="더잠실 3 Regular" panose="00000500000000000000" pitchFamily="2" charset="-127"/>
+              </a:rPr>
+              <a:t>리스트로 구현하는 큐</a:t>
+            </a:r>
+          </a:p>
+        </p:txBody>
+      </p:sp>
+      <p:sp>
+        <p:nvSpPr>
+          <p:cNvPr id="4" name="슬라이드 번호 개체 틀 3">
+            <a:extLst>
+              <a:ext uri="{FF2B5EF4-FFF2-40B4-BE49-F238E27FC236}">
+                <a16:creationId xmlns:a16="http://schemas.microsoft.com/office/drawing/2014/main" id="{4413BF1C-0360-A449-5CAF-929B2048319C}"/>
+              </a:ext>
+            </a:extLst>
+          </p:cNvPr>
+          <p:cNvSpPr>
+            <a:spLocks noGrp="1"/>
+          </p:cNvSpPr>
+          <p:nvPr>
+            <p:ph type="sldNum" sz="quarter" idx="12"/>
+          </p:nvPr>
+        </p:nvSpPr>
+        <p:spPr/>
+        <p:txBody>
+          <a:bodyPr/>
+          <a:lstStyle/>
+          <a:p>
+            <a:fld id="{35B45C20-CD26-4AB6-99FD-1165E1BECAF9}" type="slidenum">
+              <a:rPr lang="ko-KR" altLang="en-US" smtClean="0"/>
+              <a:t>29</a:t>
+            </a:fld>
+            <a:endParaRPr lang="ko-KR" altLang="en-US"/>
+          </a:p>
+        </p:txBody>
+      </p:sp>
+      <p:pic>
+        <p:nvPicPr>
+          <p:cNvPr id="7" name="Picture 2" descr="자료구조] 배열(Array)과 연결리스트(LinkedList) :: Ahribori's Blog">
+            <a:extLst>
+              <a:ext uri="{FF2B5EF4-FFF2-40B4-BE49-F238E27FC236}">
+                <a16:creationId xmlns:a16="http://schemas.microsoft.com/office/drawing/2014/main" id="{7C406A86-99E0-BA85-B144-81AFD9F2B75C}"/>
+              </a:ext>
+            </a:extLst>
+          </p:cNvPr>
+          <p:cNvPicPr>
+            <a:picLocks noChangeAspect="1" noChangeArrowheads="1"/>
+          </p:cNvPicPr>
+          <p:nvPr/>
+        </p:nvPicPr>
+        <p:blipFill>
+          <a:blip r:embed="rId2">
+            <a:extLst>
+              <a:ext uri="{28A0092B-C50C-407E-A947-70E740481C1C}">
+                <a14:useLocalDpi xmlns:a14="http://schemas.microsoft.com/office/drawing/2010/main" val="0"/>
+              </a:ext>
+            </a:extLst>
+          </a:blip>
+          <a:srcRect/>
+          <a:stretch>
+            <a:fillRect/>
+          </a:stretch>
+        </p:blipFill>
+        <p:spPr bwMode="auto">
+          <a:xfrm>
+            <a:off x="838200" y="1690688"/>
+            <a:ext cx="10515600" cy="2867890"/>
+          </a:xfrm>
+          <a:prstGeom prst="rect">
+            <a:avLst/>
+          </a:prstGeom>
+          <a:noFill/>
+          <a:extLst>
+            <a:ext uri="{909E8E84-426E-40DD-AFC4-6F175D3DCCD1}">
+              <a14:hiddenFill xmlns:a14="http://schemas.microsoft.com/office/drawing/2010/main">
+                <a:solidFill>
+                  <a:srgbClr val="FFFFFF"/>
+                </a:solidFill>
+              </a14:hiddenFill>
+            </a:ext>
+          </a:extLst>
+        </p:spPr>
+      </p:pic>
+      <p:grpSp>
+        <p:nvGrpSpPr>
+          <p:cNvPr id="8" name="그룹 7">
+            <a:extLst>
+              <a:ext uri="{FF2B5EF4-FFF2-40B4-BE49-F238E27FC236}">
+                <a16:creationId xmlns:a16="http://schemas.microsoft.com/office/drawing/2014/main" id="{A9A8C789-7E9D-7D0B-7CE8-99B6465A1F36}"/>
+              </a:ext>
+            </a:extLst>
+          </p:cNvPr>
+          <p:cNvGrpSpPr/>
+          <p:nvPr/>
+        </p:nvGrpSpPr>
+        <p:grpSpPr>
+          <a:xfrm rot="167141">
+            <a:off x="2584873" y="541959"/>
+            <a:ext cx="7058526" cy="7036769"/>
+            <a:chOff x="2927493" y="160156"/>
+            <a:chExt cx="5514474" cy="5514474"/>
+          </a:xfrm>
+        </p:grpSpPr>
+        <p:sp>
+          <p:nvSpPr>
+            <p:cNvPr id="5" name="직사각형 4">
+              <a:extLst>
+                <a:ext uri="{FF2B5EF4-FFF2-40B4-BE49-F238E27FC236}">
+                  <a16:creationId xmlns:a16="http://schemas.microsoft.com/office/drawing/2014/main" id="{B1EAF609-D736-63B1-67AD-2C3E4FFB7523}"/>
+                </a:ext>
+              </a:extLst>
+            </p:cNvPr>
+            <p:cNvSpPr/>
+            <p:nvPr/>
+          </p:nvSpPr>
+          <p:spPr>
+            <a:xfrm rot="2405228">
+              <a:off x="2927493" y="2747108"/>
+              <a:ext cx="5514474" cy="266449"/>
+            </a:xfrm>
+            <a:prstGeom prst="rect">
+              <a:avLst/>
+            </a:prstGeom>
+            <a:solidFill>
+              <a:srgbClr val="FF0000"/>
+            </a:solidFill>
+            <a:ln>
+              <a:noFill/>
+            </a:ln>
+          </p:spPr>
+          <p:style>
+            <a:lnRef idx="2">
+              <a:schemeClr val="accent2">
+                <a:shade val="15000"/>
+              </a:schemeClr>
+            </a:lnRef>
+            <a:fillRef idx="1">
+              <a:schemeClr val="accent2"/>
+            </a:fillRef>
+            <a:effectRef idx="0">
+              <a:schemeClr val="accent2"/>
+            </a:effectRef>
+            <a:fontRef idx="minor">
+              <a:schemeClr val="lt1"/>
+            </a:fontRef>
+          </p:style>
+          <p:txBody>
+            <a:bodyPr rtlCol="0" anchor="ctr"/>
+            <a:lstStyle/>
+            <a:p>
+              <a:pPr algn="ctr"/>
+              <a:endParaRPr lang="ko-KR" altLang="en-US" dirty="0"/>
+            </a:p>
+          </p:txBody>
+        </p:sp>
+        <p:sp>
+          <p:nvSpPr>
+            <p:cNvPr id="6" name="직사각형 5">
+              <a:extLst>
+                <a:ext uri="{FF2B5EF4-FFF2-40B4-BE49-F238E27FC236}">
+                  <a16:creationId xmlns:a16="http://schemas.microsoft.com/office/drawing/2014/main" id="{526CCADA-7FFF-1AE7-8743-DE20CBCE3282}"/>
+                </a:ext>
+              </a:extLst>
+            </p:cNvPr>
+            <p:cNvSpPr/>
+            <p:nvPr/>
+          </p:nvSpPr>
+          <p:spPr>
+            <a:xfrm rot="18761814">
+              <a:off x="2871536" y="2784168"/>
+              <a:ext cx="5514474" cy="266449"/>
+            </a:xfrm>
+            <a:prstGeom prst="rect">
+              <a:avLst/>
+            </a:prstGeom>
+            <a:solidFill>
+              <a:srgbClr val="FF0000"/>
+            </a:solidFill>
+            <a:ln>
+              <a:noFill/>
+            </a:ln>
+          </p:spPr>
+          <p:style>
+            <a:lnRef idx="2">
+              <a:schemeClr val="accent2">
+                <a:shade val="15000"/>
+              </a:schemeClr>
+            </a:lnRef>
+            <a:fillRef idx="1">
+              <a:schemeClr val="accent2"/>
+            </a:fillRef>
+            <a:effectRef idx="0">
+              <a:schemeClr val="accent2"/>
+            </a:effectRef>
+            <a:fontRef idx="minor">
+              <a:schemeClr val="lt1"/>
+            </a:fontRef>
+          </p:style>
+          <p:txBody>
+            <a:bodyPr rtlCol="0" anchor="ctr"/>
+            <a:lstStyle/>
+            <a:p>
+              <a:pPr algn="ctr"/>
+              <a:endParaRPr lang="ko-KR" altLang="en-US" dirty="0"/>
+            </a:p>
+          </p:txBody>
+        </p:sp>
+      </p:grpSp>
+    </p:spTree>
+    <p:extLst>
+      <p:ext uri="{BB962C8B-B14F-4D97-AF65-F5344CB8AC3E}">
+        <p14:creationId xmlns:p14="http://schemas.microsoft.com/office/powerpoint/2010/main" val="2640669033"/>
       </p:ext>
     </p:extLst>
   </p:cSld>
@@ -12021,6 +12416,1373 @@
     <p:extLst>
       <p:ext uri="{BB962C8B-B14F-4D97-AF65-F5344CB8AC3E}">
         <p14:creationId xmlns:p14="http://schemas.microsoft.com/office/powerpoint/2010/main" val="191223682"/>
+      </p:ext>
+    </p:extLst>
+  </p:cSld>
+  <p:clrMapOvr>
+    <a:masterClrMapping/>
+  </p:clrMapOvr>
+</p:sld>
+</file>
+
+<file path=ppt/slides/slide30.xml><?xml version="1.0" encoding="utf-8"?>
+<p:sld xmlns:a="http://schemas.openxmlformats.org/drawingml/2006/main" xmlns:r="http://schemas.openxmlformats.org/officeDocument/2006/relationships" xmlns:p="http://schemas.openxmlformats.org/presentationml/2006/main">
+  <p:cSld>
+    <p:spTree>
+      <p:nvGrpSpPr>
+        <p:cNvPr id="1" name=""/>
+        <p:cNvGrpSpPr/>
+        <p:nvPr/>
+      </p:nvGrpSpPr>
+      <p:grpSpPr>
+        <a:xfrm>
+          <a:off x="0" y="0"/>
+          <a:ext cx="0" cy="0"/>
+          <a:chOff x="0" y="0"/>
+          <a:chExt cx="0" cy="0"/>
+        </a:xfrm>
+      </p:grpSpPr>
+      <p:sp>
+        <p:nvSpPr>
+          <p:cNvPr id="4" name="슬라이드 번호 개체 틀 3">
+            <a:extLst>
+              <a:ext uri="{FF2B5EF4-FFF2-40B4-BE49-F238E27FC236}">
+                <a16:creationId xmlns:a16="http://schemas.microsoft.com/office/drawing/2014/main" id="{4413BF1C-0360-A449-5CAF-929B2048319C}"/>
+              </a:ext>
+            </a:extLst>
+          </p:cNvPr>
+          <p:cNvSpPr>
+            <a:spLocks noGrp="1"/>
+          </p:cNvSpPr>
+          <p:nvPr>
+            <p:ph type="sldNum" sz="quarter" idx="12"/>
+          </p:nvPr>
+        </p:nvSpPr>
+        <p:spPr/>
+        <p:txBody>
+          <a:bodyPr/>
+          <a:lstStyle/>
+          <a:p>
+            <a:fld id="{35B45C20-CD26-4AB6-99FD-1165E1BECAF9}" type="slidenum">
+              <a:rPr lang="ko-KR" altLang="en-US" smtClean="0"/>
+              <a:t>30</a:t>
+            </a:fld>
+            <a:endParaRPr lang="ko-KR" altLang="en-US" dirty="0"/>
+          </a:p>
+        </p:txBody>
+      </p:sp>
+      <p:pic>
+        <p:nvPicPr>
+          <p:cNvPr id="1026" name="Picture 2" descr="원형연결리스트의 응용: 연결된 큐">
+            <a:extLst>
+              <a:ext uri="{FF2B5EF4-FFF2-40B4-BE49-F238E27FC236}">
+                <a16:creationId xmlns:a16="http://schemas.microsoft.com/office/drawing/2014/main" id="{831B9459-A956-C7E7-7B50-552827198E8B}"/>
+              </a:ext>
+            </a:extLst>
+          </p:cNvPr>
+          <p:cNvPicPr>
+            <a:picLocks noChangeAspect="1" noChangeArrowheads="1"/>
+          </p:cNvPicPr>
+          <p:nvPr/>
+        </p:nvPicPr>
+        <p:blipFill>
+          <a:blip r:embed="rId2">
+            <a:extLst>
+              <a:ext uri="{28A0092B-C50C-407E-A947-70E740481C1C}">
+                <a14:useLocalDpi xmlns:a14="http://schemas.microsoft.com/office/drawing/2010/main" val="0"/>
+              </a:ext>
+            </a:extLst>
+          </a:blip>
+          <a:srcRect/>
+          <a:stretch>
+            <a:fillRect/>
+          </a:stretch>
+        </p:blipFill>
+        <p:spPr bwMode="auto">
+          <a:xfrm>
+            <a:off x="1564105" y="1821317"/>
+            <a:ext cx="9063789" cy="3215366"/>
+          </a:xfrm>
+          <a:prstGeom prst="rect">
+            <a:avLst/>
+          </a:prstGeom>
+          <a:noFill/>
+          <a:extLst>
+            <a:ext uri="{909E8E84-426E-40DD-AFC4-6F175D3DCCD1}">
+              <a14:hiddenFill xmlns:a14="http://schemas.microsoft.com/office/drawing/2010/main">
+                <a:solidFill>
+                  <a:srgbClr val="FFFFFF"/>
+                </a:solidFill>
+              </a14:hiddenFill>
+            </a:ext>
+          </a:extLst>
+        </p:spPr>
+      </p:pic>
+      <p:sp>
+        <p:nvSpPr>
+          <p:cNvPr id="5" name="TextBox 4">
+            <a:extLst>
+              <a:ext uri="{FF2B5EF4-FFF2-40B4-BE49-F238E27FC236}">
+                <a16:creationId xmlns:a16="http://schemas.microsoft.com/office/drawing/2014/main" id="{0D343047-3248-AD4E-87E2-0E732FA72713}"/>
+              </a:ext>
+            </a:extLst>
+          </p:cNvPr>
+          <p:cNvSpPr txBox="1"/>
+          <p:nvPr/>
+        </p:nvSpPr>
+        <p:spPr>
+          <a:xfrm>
+            <a:off x="2342147" y="5036683"/>
+            <a:ext cx="7796464" cy="584775"/>
+          </a:xfrm>
+          <a:prstGeom prst="rect">
+            <a:avLst/>
+          </a:prstGeom>
+          <a:noFill/>
+        </p:spPr>
+        <p:txBody>
+          <a:bodyPr wrap="square" rtlCol="0">
+            <a:spAutoFit/>
+          </a:bodyPr>
+          <a:lstStyle/>
+          <a:p>
+            <a:pPr algn="ctr"/>
+            <a:r>
+              <a:rPr lang="ko-KR" altLang="en-US" sz="3200" dirty="0">
+                <a:latin typeface="더잠실 3 Regular" panose="00000500000000000000" pitchFamily="2" charset="-127"/>
+                <a:ea typeface="더잠실 3 Regular" panose="00000500000000000000" pitchFamily="2" charset="-127"/>
+              </a:rPr>
+              <a:t>뭐가 문제일까</a:t>
+            </a:r>
+            <a:r>
+              <a:rPr lang="en-US" altLang="ko-KR" sz="3200" dirty="0">
+                <a:latin typeface="더잠실 3 Regular" panose="00000500000000000000" pitchFamily="2" charset="-127"/>
+                <a:ea typeface="더잠실 3 Regular" panose="00000500000000000000" pitchFamily="2" charset="-127"/>
+              </a:rPr>
+              <a:t>?</a:t>
+            </a:r>
+            <a:endParaRPr lang="ko-KR" altLang="en-US" sz="3200" dirty="0">
+              <a:latin typeface="더잠실 3 Regular" panose="00000500000000000000" pitchFamily="2" charset="-127"/>
+              <a:ea typeface="더잠실 3 Regular" panose="00000500000000000000" pitchFamily="2" charset="-127"/>
+            </a:endParaRPr>
+          </a:p>
+        </p:txBody>
+      </p:sp>
+      <p:sp>
+        <p:nvSpPr>
+          <p:cNvPr id="8" name="제목 1">
+            <a:extLst>
+              <a:ext uri="{FF2B5EF4-FFF2-40B4-BE49-F238E27FC236}">
+                <a16:creationId xmlns:a16="http://schemas.microsoft.com/office/drawing/2014/main" id="{1B07D358-FC6F-C411-0EF9-60C9797979DC}"/>
+              </a:ext>
+            </a:extLst>
+          </p:cNvPr>
+          <p:cNvSpPr>
+            <a:spLocks noGrp="1"/>
+          </p:cNvSpPr>
+          <p:nvPr>
+            <p:ph type="title"/>
+          </p:nvPr>
+        </p:nvSpPr>
+        <p:spPr>
+          <a:xfrm>
+            <a:off x="838200" y="365125"/>
+            <a:ext cx="10515600" cy="1325563"/>
+          </a:xfrm>
+        </p:spPr>
+        <p:txBody>
+          <a:bodyPr/>
+          <a:lstStyle/>
+          <a:p>
+            <a:r>
+              <a:rPr lang="en-US" altLang="ko-KR" dirty="0">
+                <a:latin typeface="더잠실 3 Regular" panose="00000500000000000000" pitchFamily="2" charset="-127"/>
+                <a:ea typeface="더잠실 3 Regular" panose="00000500000000000000" pitchFamily="2" charset="-127"/>
+              </a:rPr>
+              <a:t>2. </a:t>
+            </a:r>
+            <a:r>
+              <a:rPr lang="ko-KR" altLang="en-US" dirty="0">
+                <a:latin typeface="더잠실 3 Regular" panose="00000500000000000000" pitchFamily="2" charset="-127"/>
+                <a:ea typeface="더잠실 3 Regular" panose="00000500000000000000" pitchFamily="2" charset="-127"/>
+              </a:rPr>
+              <a:t>단순 연결 리스트로 구현하는 큐</a:t>
+            </a:r>
+          </a:p>
+        </p:txBody>
+      </p:sp>
+    </p:spTree>
+    <p:extLst>
+      <p:ext uri="{BB962C8B-B14F-4D97-AF65-F5344CB8AC3E}">
+        <p14:creationId xmlns:p14="http://schemas.microsoft.com/office/powerpoint/2010/main" val="81147037"/>
+      </p:ext>
+    </p:extLst>
+  </p:cSld>
+  <p:clrMapOvr>
+    <a:masterClrMapping/>
+  </p:clrMapOvr>
+</p:sld>
+</file>
+
+<file path=ppt/slides/slide31.xml><?xml version="1.0" encoding="utf-8"?>
+<p:sld xmlns:a="http://schemas.openxmlformats.org/drawingml/2006/main" xmlns:r="http://schemas.openxmlformats.org/officeDocument/2006/relationships" xmlns:p="http://schemas.openxmlformats.org/presentationml/2006/main">
+  <p:cSld>
+    <p:spTree>
+      <p:nvGrpSpPr>
+        <p:cNvPr id="1" name=""/>
+        <p:cNvGrpSpPr/>
+        <p:nvPr/>
+      </p:nvGrpSpPr>
+      <p:grpSpPr>
+        <a:xfrm>
+          <a:off x="0" y="0"/>
+          <a:ext cx="0" cy="0"/>
+          <a:chOff x="0" y="0"/>
+          <a:chExt cx="0" cy="0"/>
+        </a:xfrm>
+      </p:grpSpPr>
+      <p:sp>
+        <p:nvSpPr>
+          <p:cNvPr id="2" name="제목 1">
+            <a:extLst>
+              <a:ext uri="{FF2B5EF4-FFF2-40B4-BE49-F238E27FC236}">
+                <a16:creationId xmlns:a16="http://schemas.microsoft.com/office/drawing/2014/main" id="{7B887BAC-E55E-C9A1-C2C6-0CF18210C5EB}"/>
+              </a:ext>
+            </a:extLst>
+          </p:cNvPr>
+          <p:cNvSpPr>
+            <a:spLocks noGrp="1"/>
+          </p:cNvSpPr>
+          <p:nvPr>
+            <p:ph type="title"/>
+          </p:nvPr>
+        </p:nvSpPr>
+        <p:spPr/>
+        <p:txBody>
+          <a:bodyPr/>
+          <a:lstStyle/>
+          <a:p>
+            <a:r>
+              <a:rPr lang="en-US" altLang="ko-KR" dirty="0">
+                <a:latin typeface="더잠실 3 Regular" panose="00000500000000000000" pitchFamily="2" charset="-127"/>
+                <a:ea typeface="더잠실 3 Regular" panose="00000500000000000000" pitchFamily="2" charset="-127"/>
+              </a:rPr>
+              <a:t>3. </a:t>
+            </a:r>
+            <a:r>
+              <a:rPr lang="ko-KR" altLang="en-US" dirty="0">
+                <a:latin typeface="더잠실 3 Regular" panose="00000500000000000000" pitchFamily="2" charset="-127"/>
+                <a:ea typeface="더잠실 3 Regular" panose="00000500000000000000" pitchFamily="2" charset="-127"/>
+              </a:rPr>
+              <a:t>원형 연결 리스트로 구현하는 큐</a:t>
+            </a:r>
+          </a:p>
+        </p:txBody>
+      </p:sp>
+      <p:sp>
+        <p:nvSpPr>
+          <p:cNvPr id="3" name="내용 개체 틀 2">
+            <a:extLst>
+              <a:ext uri="{FF2B5EF4-FFF2-40B4-BE49-F238E27FC236}">
+                <a16:creationId xmlns:a16="http://schemas.microsoft.com/office/drawing/2014/main" id="{3678DE5D-0B0B-FB62-776A-CDE131810959}"/>
+              </a:ext>
+            </a:extLst>
+          </p:cNvPr>
+          <p:cNvSpPr>
+            <a:spLocks noGrp="1"/>
+          </p:cNvSpPr>
+          <p:nvPr>
+            <p:ph idx="1"/>
+          </p:nvPr>
+        </p:nvSpPr>
+        <p:spPr/>
+        <p:txBody>
+          <a:bodyPr/>
+          <a:lstStyle/>
+          <a:p>
+            <a:endParaRPr lang="ko-KR" altLang="en-US" dirty="0"/>
+          </a:p>
+        </p:txBody>
+      </p:sp>
+      <p:sp>
+        <p:nvSpPr>
+          <p:cNvPr id="4" name="슬라이드 번호 개체 틀 3">
+            <a:extLst>
+              <a:ext uri="{FF2B5EF4-FFF2-40B4-BE49-F238E27FC236}">
+                <a16:creationId xmlns:a16="http://schemas.microsoft.com/office/drawing/2014/main" id="{647FFCCA-2EA7-E376-73A7-DC43041EF15F}"/>
+              </a:ext>
+            </a:extLst>
+          </p:cNvPr>
+          <p:cNvSpPr>
+            <a:spLocks noGrp="1"/>
+          </p:cNvSpPr>
+          <p:nvPr>
+            <p:ph type="sldNum" sz="quarter" idx="12"/>
+          </p:nvPr>
+        </p:nvSpPr>
+        <p:spPr/>
+        <p:txBody>
+          <a:bodyPr/>
+          <a:lstStyle/>
+          <a:p>
+            <a:fld id="{35B45C20-CD26-4AB6-99FD-1165E1BECAF9}" type="slidenum">
+              <a:rPr lang="ko-KR" altLang="en-US" smtClean="0"/>
+              <a:t>31</a:t>
+            </a:fld>
+            <a:endParaRPr lang="ko-KR" altLang="en-US"/>
+          </a:p>
+        </p:txBody>
+      </p:sp>
+      <p:pic>
+        <p:nvPicPr>
+          <p:cNvPr id="6" name="그림 5">
+            <a:extLst>
+              <a:ext uri="{FF2B5EF4-FFF2-40B4-BE49-F238E27FC236}">
+                <a16:creationId xmlns:a16="http://schemas.microsoft.com/office/drawing/2014/main" id="{AE79ABA4-4AF7-7FCB-C55E-AA96D788970B}"/>
+              </a:ext>
+            </a:extLst>
+          </p:cNvPr>
+          <p:cNvPicPr>
+            <a:picLocks noChangeAspect="1"/>
+          </p:cNvPicPr>
+          <p:nvPr/>
+        </p:nvPicPr>
+        <p:blipFill>
+          <a:blip r:embed="rId2"/>
+          <a:stretch>
+            <a:fillRect/>
+          </a:stretch>
+        </p:blipFill>
+        <p:spPr>
+          <a:xfrm>
+            <a:off x="338137" y="2002798"/>
+            <a:ext cx="11515725" cy="3676650"/>
+          </a:xfrm>
+          <a:prstGeom prst="rect">
+            <a:avLst/>
+          </a:prstGeom>
+        </p:spPr>
+      </p:pic>
+    </p:spTree>
+    <p:extLst>
+      <p:ext uri="{BB962C8B-B14F-4D97-AF65-F5344CB8AC3E}">
+        <p14:creationId xmlns:p14="http://schemas.microsoft.com/office/powerpoint/2010/main" val="2853486376"/>
+      </p:ext>
+    </p:extLst>
+  </p:cSld>
+  <p:clrMapOvr>
+    <a:masterClrMapping/>
+  </p:clrMapOvr>
+</p:sld>
+</file>
+
+<file path=ppt/slides/slide32.xml><?xml version="1.0" encoding="utf-8"?>
+<p:sld xmlns:a="http://schemas.openxmlformats.org/drawingml/2006/main" xmlns:r="http://schemas.openxmlformats.org/officeDocument/2006/relationships" xmlns:p="http://schemas.openxmlformats.org/presentationml/2006/main">
+  <p:cSld>
+    <p:spTree>
+      <p:nvGrpSpPr>
+        <p:cNvPr id="1" name=""/>
+        <p:cNvGrpSpPr/>
+        <p:nvPr/>
+      </p:nvGrpSpPr>
+      <p:grpSpPr>
+        <a:xfrm>
+          <a:off x="0" y="0"/>
+          <a:ext cx="0" cy="0"/>
+          <a:chOff x="0" y="0"/>
+          <a:chExt cx="0" cy="0"/>
+        </a:xfrm>
+      </p:grpSpPr>
+      <p:sp>
+        <p:nvSpPr>
+          <p:cNvPr id="2" name="제목 1">
+            <a:extLst>
+              <a:ext uri="{FF2B5EF4-FFF2-40B4-BE49-F238E27FC236}">
+                <a16:creationId xmlns:a16="http://schemas.microsoft.com/office/drawing/2014/main" id="{9E8B0F68-4873-C5E9-1854-A6301C8C5829}"/>
+              </a:ext>
+            </a:extLst>
+          </p:cNvPr>
+          <p:cNvSpPr>
+            <a:spLocks noGrp="1"/>
+          </p:cNvSpPr>
+          <p:nvPr>
+            <p:ph type="title"/>
+          </p:nvPr>
+        </p:nvSpPr>
+        <p:spPr/>
+        <p:txBody>
+          <a:bodyPr/>
+          <a:lstStyle/>
+          <a:p>
+            <a:r>
+              <a:rPr lang="ko-KR" altLang="en-US" dirty="0" err="1">
+                <a:latin typeface="더잠실 3 Regular" panose="00000500000000000000" pitchFamily="2" charset="-127"/>
+                <a:ea typeface="더잠실 3 Regular" panose="00000500000000000000" pitchFamily="2" charset="-127"/>
+              </a:rPr>
+              <a:t>덱을</a:t>
+            </a:r>
+            <a:r>
+              <a:rPr lang="ko-KR" altLang="en-US" dirty="0">
+                <a:latin typeface="더잠실 3 Regular" panose="00000500000000000000" pitchFamily="2" charset="-127"/>
+                <a:ea typeface="더잠실 3 Regular" panose="00000500000000000000" pitchFamily="2" charset="-127"/>
+              </a:rPr>
+              <a:t> 구현하려면</a:t>
+            </a:r>
+            <a:r>
+              <a:rPr lang="en-US" altLang="ko-KR" dirty="0">
+                <a:latin typeface="더잠실 3 Regular" panose="00000500000000000000" pitchFamily="2" charset="-127"/>
+                <a:ea typeface="더잠실 3 Regular" panose="00000500000000000000" pitchFamily="2" charset="-127"/>
+              </a:rPr>
+              <a:t>?</a:t>
+            </a:r>
+            <a:endParaRPr lang="ko-KR" altLang="en-US" dirty="0">
+              <a:latin typeface="더잠실 3 Regular" panose="00000500000000000000" pitchFamily="2" charset="-127"/>
+              <a:ea typeface="더잠실 3 Regular" panose="00000500000000000000" pitchFamily="2" charset="-127"/>
+            </a:endParaRPr>
+          </a:p>
+        </p:txBody>
+      </p:sp>
+      <p:sp>
+        <p:nvSpPr>
+          <p:cNvPr id="4" name="슬라이드 번호 개체 틀 3">
+            <a:extLst>
+              <a:ext uri="{FF2B5EF4-FFF2-40B4-BE49-F238E27FC236}">
+                <a16:creationId xmlns:a16="http://schemas.microsoft.com/office/drawing/2014/main" id="{2A0E251C-FA2F-28B7-0734-F7B3566A1866}"/>
+              </a:ext>
+            </a:extLst>
+          </p:cNvPr>
+          <p:cNvSpPr>
+            <a:spLocks noGrp="1"/>
+          </p:cNvSpPr>
+          <p:nvPr>
+            <p:ph type="sldNum" sz="quarter" idx="12"/>
+          </p:nvPr>
+        </p:nvSpPr>
+        <p:spPr/>
+        <p:txBody>
+          <a:bodyPr/>
+          <a:lstStyle/>
+          <a:p>
+            <a:fld id="{35B45C20-CD26-4AB6-99FD-1165E1BECAF9}" type="slidenum">
+              <a:rPr lang="ko-KR" altLang="en-US" smtClean="0"/>
+              <a:t>32</a:t>
+            </a:fld>
+            <a:endParaRPr lang="ko-KR" altLang="en-US"/>
+          </a:p>
+        </p:txBody>
+      </p:sp>
+      <p:pic>
+        <p:nvPicPr>
+          <p:cNvPr id="7" name="그림 6">
+            <a:extLst>
+              <a:ext uri="{FF2B5EF4-FFF2-40B4-BE49-F238E27FC236}">
+                <a16:creationId xmlns:a16="http://schemas.microsoft.com/office/drawing/2014/main" id="{ED6CE7E0-319F-4A84-A4E3-ACC4E0F58025}"/>
+              </a:ext>
+            </a:extLst>
+          </p:cNvPr>
+          <p:cNvPicPr>
+            <a:picLocks noChangeAspect="1"/>
+          </p:cNvPicPr>
+          <p:nvPr/>
+        </p:nvPicPr>
+        <p:blipFill>
+          <a:blip r:embed="rId2"/>
+          <a:stretch>
+            <a:fillRect/>
+          </a:stretch>
+        </p:blipFill>
+        <p:spPr>
+          <a:xfrm>
+            <a:off x="1115355" y="1760787"/>
+            <a:ext cx="9961289" cy="4134351"/>
+          </a:xfrm>
+          <a:prstGeom prst="rect">
+            <a:avLst/>
+          </a:prstGeom>
+        </p:spPr>
+      </p:pic>
+    </p:spTree>
+    <p:extLst>
+      <p:ext uri="{BB962C8B-B14F-4D97-AF65-F5344CB8AC3E}">
+        <p14:creationId xmlns:p14="http://schemas.microsoft.com/office/powerpoint/2010/main" val="3918523760"/>
+      </p:ext>
+    </p:extLst>
+  </p:cSld>
+  <p:clrMapOvr>
+    <a:masterClrMapping/>
+  </p:clrMapOvr>
+</p:sld>
+</file>
+
+<file path=ppt/slides/slide33.xml><?xml version="1.0" encoding="utf-8"?>
+<p:sld xmlns:a="http://schemas.openxmlformats.org/drawingml/2006/main" xmlns:r="http://schemas.openxmlformats.org/officeDocument/2006/relationships" xmlns:p="http://schemas.openxmlformats.org/presentationml/2006/main">
+  <p:cSld>
+    <p:spTree>
+      <p:nvGrpSpPr>
+        <p:cNvPr id="1" name=""/>
+        <p:cNvGrpSpPr/>
+        <p:nvPr/>
+      </p:nvGrpSpPr>
+      <p:grpSpPr>
+        <a:xfrm>
+          <a:off x="0" y="0"/>
+          <a:ext cx="0" cy="0"/>
+          <a:chOff x="0" y="0"/>
+          <a:chExt cx="0" cy="0"/>
+        </a:xfrm>
+      </p:grpSpPr>
+      <p:sp>
+        <p:nvSpPr>
+          <p:cNvPr id="2" name="제목 1">
+            <a:extLst>
+              <a:ext uri="{FF2B5EF4-FFF2-40B4-BE49-F238E27FC236}">
+                <a16:creationId xmlns:a16="http://schemas.microsoft.com/office/drawing/2014/main" id="{E5B69537-4F27-B970-16C8-720EC7F1529B}"/>
+              </a:ext>
+            </a:extLst>
+          </p:cNvPr>
+          <p:cNvSpPr>
+            <a:spLocks noGrp="1"/>
+          </p:cNvSpPr>
+          <p:nvPr>
+            <p:ph type="title"/>
+          </p:nvPr>
+        </p:nvSpPr>
+        <p:spPr/>
+        <p:txBody>
+          <a:bodyPr/>
+          <a:lstStyle/>
+          <a:p>
+            <a:r>
+              <a:rPr lang="ko-KR" altLang="en-US" dirty="0" err="1">
+                <a:latin typeface="더잠실 3 Regular" panose="00000500000000000000" pitchFamily="2" charset="-127"/>
+                <a:ea typeface="더잠실 3 Regular" panose="00000500000000000000" pitchFamily="2" charset="-127"/>
+              </a:rPr>
+              <a:t>덱은</a:t>
+            </a:r>
+            <a:r>
+              <a:rPr lang="ko-KR" altLang="en-US" dirty="0">
+                <a:latin typeface="더잠실 3 Regular" panose="00000500000000000000" pitchFamily="2" charset="-127"/>
+                <a:ea typeface="더잠실 3 Regular" panose="00000500000000000000" pitchFamily="2" charset="-127"/>
+              </a:rPr>
+              <a:t> 이중 연결 노드를 사용</a:t>
+            </a:r>
+          </a:p>
+        </p:txBody>
+      </p:sp>
+      <p:sp>
+        <p:nvSpPr>
+          <p:cNvPr id="4" name="슬라이드 번호 개체 틀 3">
+            <a:extLst>
+              <a:ext uri="{FF2B5EF4-FFF2-40B4-BE49-F238E27FC236}">
+                <a16:creationId xmlns:a16="http://schemas.microsoft.com/office/drawing/2014/main" id="{1944CC18-94AD-EB36-2304-4B15B56EA22F}"/>
+              </a:ext>
+            </a:extLst>
+          </p:cNvPr>
+          <p:cNvSpPr>
+            <a:spLocks noGrp="1"/>
+          </p:cNvSpPr>
+          <p:nvPr>
+            <p:ph type="sldNum" sz="quarter" idx="12"/>
+          </p:nvPr>
+        </p:nvSpPr>
+        <p:spPr/>
+        <p:txBody>
+          <a:bodyPr/>
+          <a:lstStyle/>
+          <a:p>
+            <a:fld id="{35B45C20-CD26-4AB6-99FD-1165E1BECAF9}" type="slidenum">
+              <a:rPr lang="ko-KR" altLang="en-US" smtClean="0"/>
+              <a:t>33</a:t>
+            </a:fld>
+            <a:endParaRPr lang="ko-KR" altLang="en-US"/>
+          </a:p>
+        </p:txBody>
+      </p:sp>
+      <p:pic>
+        <p:nvPicPr>
+          <p:cNvPr id="7" name="그림 6">
+            <a:extLst>
+              <a:ext uri="{FF2B5EF4-FFF2-40B4-BE49-F238E27FC236}">
+                <a16:creationId xmlns:a16="http://schemas.microsoft.com/office/drawing/2014/main" id="{217B41FA-18DF-2777-AE86-C01B2557AA0A}"/>
+              </a:ext>
+            </a:extLst>
+          </p:cNvPr>
+          <p:cNvPicPr>
+            <a:picLocks noChangeAspect="1"/>
+          </p:cNvPicPr>
+          <p:nvPr/>
+        </p:nvPicPr>
+        <p:blipFill>
+          <a:blip r:embed="rId2"/>
+          <a:stretch>
+            <a:fillRect/>
+          </a:stretch>
+        </p:blipFill>
+        <p:spPr>
+          <a:xfrm>
+            <a:off x="899916" y="1937920"/>
+            <a:ext cx="10392167" cy="3499585"/>
+          </a:xfrm>
+          <a:prstGeom prst="rect">
+            <a:avLst/>
+          </a:prstGeom>
+        </p:spPr>
+      </p:pic>
+    </p:spTree>
+    <p:extLst>
+      <p:ext uri="{BB962C8B-B14F-4D97-AF65-F5344CB8AC3E}">
+        <p14:creationId xmlns:p14="http://schemas.microsoft.com/office/powerpoint/2010/main" val="1821191976"/>
+      </p:ext>
+    </p:extLst>
+  </p:cSld>
+  <p:clrMapOvr>
+    <a:masterClrMapping/>
+  </p:clrMapOvr>
+</p:sld>
+</file>
+
+<file path=ppt/slides/slide34.xml><?xml version="1.0" encoding="utf-8"?>
+<p:sld xmlns:a="http://schemas.openxmlformats.org/drawingml/2006/main" xmlns:r="http://schemas.openxmlformats.org/officeDocument/2006/relationships" xmlns:p="http://schemas.openxmlformats.org/presentationml/2006/main">
+  <p:cSld>
+    <p:spTree>
+      <p:nvGrpSpPr>
+        <p:cNvPr id="1" name=""/>
+        <p:cNvGrpSpPr/>
+        <p:nvPr/>
+      </p:nvGrpSpPr>
+      <p:grpSpPr>
+        <a:xfrm>
+          <a:off x="0" y="0"/>
+          <a:ext cx="0" cy="0"/>
+          <a:chOff x="0" y="0"/>
+          <a:chExt cx="0" cy="0"/>
+        </a:xfrm>
+      </p:grpSpPr>
+      <p:sp>
+        <p:nvSpPr>
+          <p:cNvPr id="2" name="제목 1">
+            <a:extLst>
+              <a:ext uri="{FF2B5EF4-FFF2-40B4-BE49-F238E27FC236}">
+                <a16:creationId xmlns:a16="http://schemas.microsoft.com/office/drawing/2014/main" id="{8217A231-1368-3BCB-EB07-789C21167449}"/>
+              </a:ext>
+            </a:extLst>
+          </p:cNvPr>
+          <p:cNvSpPr>
+            <a:spLocks noGrp="1"/>
+          </p:cNvSpPr>
+          <p:nvPr>
+            <p:ph type="title"/>
+          </p:nvPr>
+        </p:nvSpPr>
+        <p:spPr/>
+        <p:txBody>
+          <a:bodyPr/>
+          <a:lstStyle/>
+          <a:p>
+            <a:r>
+              <a:rPr lang="ko-KR" altLang="en-US" dirty="0">
+                <a:latin typeface="더잠실 3 Regular" panose="00000500000000000000" pitchFamily="2" charset="-127"/>
+                <a:ea typeface="더잠실 3 Regular" panose="00000500000000000000" pitchFamily="2" charset="-127"/>
+              </a:rPr>
+              <a:t>자료구조</a:t>
+            </a:r>
+            <a:r>
+              <a:rPr lang="en-US" altLang="ko-KR" dirty="0">
+                <a:latin typeface="더잠실 3 Regular" panose="00000500000000000000" pitchFamily="2" charset="-127"/>
+                <a:ea typeface="더잠실 3 Regular" panose="00000500000000000000" pitchFamily="2" charset="-127"/>
+              </a:rPr>
+              <a:t>, </a:t>
+            </a:r>
+            <a:r>
+              <a:rPr lang="ko-KR" altLang="en-US" dirty="0">
+                <a:latin typeface="더잠실 3 Regular" panose="00000500000000000000" pitchFamily="2" charset="-127"/>
+                <a:ea typeface="더잠실 3 Regular" panose="00000500000000000000" pitchFamily="2" charset="-127"/>
+              </a:rPr>
+              <a:t>왜 알아야 하지</a:t>
+            </a:r>
+            <a:r>
+              <a:rPr lang="en-US" altLang="ko-KR" dirty="0">
+                <a:latin typeface="더잠실 3 Regular" panose="00000500000000000000" pitchFamily="2" charset="-127"/>
+                <a:ea typeface="더잠실 3 Regular" panose="00000500000000000000" pitchFamily="2" charset="-127"/>
+              </a:rPr>
+              <a:t>?</a:t>
+            </a:r>
+            <a:endParaRPr lang="ko-KR" altLang="en-US" dirty="0">
+              <a:latin typeface="더잠실 3 Regular" panose="00000500000000000000" pitchFamily="2" charset="-127"/>
+              <a:ea typeface="더잠실 3 Regular" panose="00000500000000000000" pitchFamily="2" charset="-127"/>
+            </a:endParaRPr>
+          </a:p>
+        </p:txBody>
+      </p:sp>
+      <p:sp>
+        <p:nvSpPr>
+          <p:cNvPr id="3" name="내용 개체 틀 2">
+            <a:extLst>
+              <a:ext uri="{FF2B5EF4-FFF2-40B4-BE49-F238E27FC236}">
+                <a16:creationId xmlns:a16="http://schemas.microsoft.com/office/drawing/2014/main" id="{2FE7EAFF-B533-26BA-83D6-623EDBF8FE69}"/>
+              </a:ext>
+            </a:extLst>
+          </p:cNvPr>
+          <p:cNvSpPr>
+            <a:spLocks noGrp="1"/>
+          </p:cNvSpPr>
+          <p:nvPr>
+            <p:ph idx="1"/>
+          </p:nvPr>
+        </p:nvSpPr>
+        <p:spPr/>
+        <p:txBody>
+          <a:bodyPr>
+            <a:normAutofit/>
+          </a:bodyPr>
+          <a:lstStyle/>
+          <a:p>
+            <a:r>
+              <a:rPr lang="ko-KR" altLang="en-US" sz="2400" dirty="0">
+                <a:latin typeface="더잠실 2 Light" panose="00000300000000000000" pitchFamily="2" charset="-127"/>
+                <a:ea typeface="더잠실 2 Light" panose="00000300000000000000" pitchFamily="2" charset="-127"/>
+              </a:rPr>
+              <a:t>자료구조</a:t>
+            </a:r>
+            <a:r>
+              <a:rPr lang="en-US" altLang="ko-KR" sz="2400" dirty="0">
+                <a:latin typeface="더잠실 2 Light" panose="00000300000000000000" pitchFamily="2" charset="-127"/>
+                <a:ea typeface="더잠실 2 Light" panose="00000300000000000000" pitchFamily="2" charset="-127"/>
+              </a:rPr>
+              <a:t>, </a:t>
+            </a:r>
+            <a:r>
+              <a:rPr lang="ko-KR" altLang="en-US" sz="2400" dirty="0">
+                <a:latin typeface="더잠실 2 Light" panose="00000300000000000000" pitchFamily="2" charset="-127"/>
+                <a:ea typeface="더잠실 2 Light" panose="00000300000000000000" pitchFamily="2" charset="-127"/>
+              </a:rPr>
+              <a:t>데이터를 관리하는 방법은 </a:t>
+            </a:r>
+            <a:r>
+              <a:rPr lang="ko-KR" altLang="en-US" sz="2400" dirty="0">
+                <a:highlight>
+                  <a:srgbClr val="FFFF00"/>
+                </a:highlight>
+                <a:latin typeface="더잠실 2 Light" panose="00000300000000000000" pitchFamily="2" charset="-127"/>
+                <a:ea typeface="더잠실 2 Light" panose="00000300000000000000" pitchFamily="2" charset="-127"/>
+              </a:rPr>
+              <a:t>컴퓨터</a:t>
+            </a:r>
+            <a:r>
+              <a:rPr lang="en-US" altLang="ko-KR" sz="2400" dirty="0">
+                <a:highlight>
+                  <a:srgbClr val="FFFF00"/>
+                </a:highlight>
+                <a:latin typeface="더잠실 2 Light" panose="00000300000000000000" pitchFamily="2" charset="-127"/>
+                <a:ea typeface="더잠실 2 Light" panose="00000300000000000000" pitchFamily="2" charset="-127"/>
+              </a:rPr>
+              <a:t>, </a:t>
+            </a:r>
+            <a:r>
+              <a:rPr lang="ko-KR" altLang="en-US" sz="2400" dirty="0">
+                <a:highlight>
+                  <a:srgbClr val="FFFF00"/>
+                </a:highlight>
+                <a:latin typeface="더잠실 2 Light" panose="00000300000000000000" pitchFamily="2" charset="-127"/>
+                <a:ea typeface="더잠실 2 Light" panose="00000300000000000000" pitchFamily="2" charset="-127"/>
+              </a:rPr>
+              <a:t>프로그래밍과 떼어낼 수 없</a:t>
+            </a:r>
+            <a:r>
+              <a:rPr lang="ko-KR" altLang="en-US" sz="2400" dirty="0">
+                <a:latin typeface="더잠실 2 Light" panose="00000300000000000000" pitchFamily="2" charset="-127"/>
+                <a:ea typeface="더잠실 2 Light" panose="00000300000000000000" pitchFamily="2" charset="-127"/>
+              </a:rPr>
+              <a:t>는 매우 </a:t>
+            </a:r>
+            <a:r>
+              <a:rPr lang="ko-KR" altLang="en-US" sz="2400" dirty="0" err="1">
+                <a:latin typeface="더잠실 2 Light" panose="00000300000000000000" pitchFamily="2" charset="-127"/>
+                <a:ea typeface="더잠실 2 Light" panose="00000300000000000000" pitchFamily="2" charset="-127"/>
+              </a:rPr>
+              <a:t>매우</a:t>
+            </a:r>
+            <a:r>
+              <a:rPr lang="ko-KR" altLang="en-US" sz="2400" dirty="0">
+                <a:latin typeface="더잠실 2 Light" panose="00000300000000000000" pitchFamily="2" charset="-127"/>
+                <a:ea typeface="더잠실 2 Light" panose="00000300000000000000" pitchFamily="2" charset="-127"/>
+              </a:rPr>
+              <a:t> 중요한 개념</a:t>
+            </a:r>
+            <a:endParaRPr lang="en-US" altLang="ko-KR" sz="2400" dirty="0">
+              <a:latin typeface="더잠실 2 Light" panose="00000300000000000000" pitchFamily="2" charset="-127"/>
+              <a:ea typeface="더잠실 2 Light" panose="00000300000000000000" pitchFamily="2" charset="-127"/>
+            </a:endParaRPr>
+          </a:p>
+          <a:p>
+            <a:endParaRPr lang="en-US" altLang="ko-KR" sz="2400" dirty="0">
+              <a:latin typeface="더잠실 2 Light" panose="00000300000000000000" pitchFamily="2" charset="-127"/>
+              <a:ea typeface="더잠실 2 Light" panose="00000300000000000000" pitchFamily="2" charset="-127"/>
+            </a:endParaRPr>
+          </a:p>
+          <a:p>
+            <a:r>
+              <a:rPr lang="ko-KR" altLang="en-US" sz="2400" dirty="0">
+                <a:latin typeface="더잠실 2 Light" panose="00000300000000000000" pitchFamily="2" charset="-127"/>
+                <a:ea typeface="더잠실 2 Light" panose="00000300000000000000" pitchFamily="2" charset="-127"/>
+              </a:rPr>
+              <a:t>프로그래머는 자신이 사용하는 </a:t>
+            </a:r>
+            <a:r>
+              <a:rPr lang="ko-KR" altLang="en-US" sz="2400" dirty="0">
+                <a:highlight>
+                  <a:srgbClr val="FFFF00"/>
+                </a:highlight>
+                <a:latin typeface="더잠실 2 Light" panose="00000300000000000000" pitchFamily="2" charset="-127"/>
+                <a:ea typeface="더잠실 2 Light" panose="00000300000000000000" pitchFamily="2" charset="-127"/>
+              </a:rPr>
+              <a:t>기술의 작동 원리와 성능</a:t>
+            </a:r>
+            <a:r>
+              <a:rPr lang="ko-KR" altLang="en-US" sz="2400" dirty="0">
+                <a:latin typeface="더잠실 2 Light" panose="00000300000000000000" pitchFamily="2" charset="-127"/>
+                <a:ea typeface="더잠실 2 Light" panose="00000300000000000000" pitchFamily="2" charset="-127"/>
+              </a:rPr>
+              <a:t>을 파악해야 할 의무가 있음</a:t>
+            </a:r>
+            <a:r>
+              <a:rPr lang="en-US" altLang="ko-KR" sz="2400" dirty="0">
+                <a:latin typeface="더잠실 2 Light" panose="00000300000000000000" pitchFamily="2" charset="-127"/>
+                <a:ea typeface="더잠실 2 Light" panose="00000300000000000000" pitchFamily="2" charset="-127"/>
+              </a:rPr>
+              <a:t> </a:t>
+            </a:r>
+            <a:r>
+              <a:rPr lang="en-US" altLang="ko-KR" sz="2400" dirty="0">
+                <a:latin typeface="더잠실 2 Light" panose="00000300000000000000" pitchFamily="2" charset="-127"/>
+                <a:ea typeface="더잠실 2 Light" panose="00000300000000000000" pitchFamily="2" charset="-127"/>
+                <a:sym typeface="Wingdings" panose="05000000000000000000" pitchFamily="2" charset="2"/>
+              </a:rPr>
+              <a:t> </a:t>
+            </a:r>
+            <a:r>
+              <a:rPr lang="ko-KR" altLang="en-US" sz="2400" dirty="0" err="1">
+                <a:latin typeface="더잠실 2 Light" panose="00000300000000000000" pitchFamily="2" charset="-127"/>
+                <a:ea typeface="더잠실 2 Light" panose="00000300000000000000" pitchFamily="2" charset="-127"/>
+                <a:sym typeface="Wingdings" panose="05000000000000000000" pitchFamily="2" charset="2"/>
+              </a:rPr>
+              <a:t>근본있는</a:t>
+            </a:r>
+            <a:r>
+              <a:rPr lang="en-US" altLang="ko-KR" sz="2400" dirty="0">
+                <a:latin typeface="더잠실 2 Light" panose="00000300000000000000" pitchFamily="2" charset="-127"/>
+                <a:ea typeface="더잠실 2 Light" panose="00000300000000000000" pitchFamily="2" charset="-127"/>
+                <a:sym typeface="Wingdings" panose="05000000000000000000" pitchFamily="2" charset="2"/>
+              </a:rPr>
+              <a:t>(</a:t>
+            </a:r>
+            <a:r>
+              <a:rPr lang="ko-KR" altLang="en-US" sz="2400" dirty="0">
+                <a:latin typeface="더잠실 2 Light" panose="00000300000000000000" pitchFamily="2" charset="-127"/>
+                <a:ea typeface="더잠실 2 Light" panose="00000300000000000000" pitchFamily="2" charset="-127"/>
+                <a:sym typeface="Wingdings" panose="05000000000000000000" pitchFamily="2" charset="2"/>
+              </a:rPr>
+              <a:t>올바른</a:t>
+            </a:r>
+            <a:r>
+              <a:rPr lang="en-US" altLang="ko-KR" sz="2400" dirty="0">
+                <a:latin typeface="더잠실 2 Light" panose="00000300000000000000" pitchFamily="2" charset="-127"/>
+                <a:ea typeface="더잠실 2 Light" panose="00000300000000000000" pitchFamily="2" charset="-127"/>
+                <a:sym typeface="Wingdings" panose="05000000000000000000" pitchFamily="2" charset="2"/>
+              </a:rPr>
+              <a:t>)</a:t>
+            </a:r>
+            <a:r>
+              <a:rPr lang="ko-KR" altLang="en-US" sz="2400" dirty="0">
+                <a:latin typeface="더잠실 2 Light" panose="00000300000000000000" pitchFamily="2" charset="-127"/>
+                <a:ea typeface="더잠실 2 Light" panose="00000300000000000000" pitchFamily="2" charset="-127"/>
+                <a:sym typeface="Wingdings" panose="05000000000000000000" pitchFamily="2" charset="2"/>
+              </a:rPr>
+              <a:t> 프로그래밍이 가능</a:t>
+            </a:r>
+            <a:r>
+              <a:rPr lang="en-US" altLang="ko-KR" sz="2400" dirty="0">
+                <a:latin typeface="더잠실 2 Light" panose="00000300000000000000" pitchFamily="2" charset="-127"/>
+                <a:ea typeface="더잠실 2 Light" panose="00000300000000000000" pitchFamily="2" charset="-127"/>
+                <a:sym typeface="Wingdings" panose="05000000000000000000" pitchFamily="2" charset="2"/>
+              </a:rPr>
+              <a:t>, CS</a:t>
+            </a:r>
+            <a:r>
+              <a:rPr lang="ko-KR" altLang="en-US" sz="2400" dirty="0">
+                <a:latin typeface="더잠실 2 Light" panose="00000300000000000000" pitchFamily="2" charset="-127"/>
+                <a:ea typeface="더잠실 2 Light" panose="00000300000000000000" pitchFamily="2" charset="-127"/>
+                <a:sym typeface="Wingdings" panose="05000000000000000000" pitchFamily="2" charset="2"/>
+              </a:rPr>
+              <a:t> 면접이 존재하는 이유</a:t>
+            </a:r>
+            <a:endParaRPr lang="en-US" altLang="ko-KR" sz="2400" dirty="0">
+              <a:latin typeface="더잠실 2 Light" panose="00000300000000000000" pitchFamily="2" charset="-127"/>
+              <a:ea typeface="더잠실 2 Light" panose="00000300000000000000" pitchFamily="2" charset="-127"/>
+              <a:sym typeface="Wingdings" panose="05000000000000000000" pitchFamily="2" charset="2"/>
+            </a:endParaRPr>
+          </a:p>
+          <a:p>
+            <a:endParaRPr lang="en-US" altLang="ko-KR" sz="2400" dirty="0">
+              <a:latin typeface="더잠실 2 Light" panose="00000300000000000000" pitchFamily="2" charset="-127"/>
+              <a:ea typeface="더잠실 2 Light" panose="00000300000000000000" pitchFamily="2" charset="-127"/>
+              <a:sym typeface="Wingdings" panose="05000000000000000000" pitchFamily="2" charset="2"/>
+            </a:endParaRPr>
+          </a:p>
+          <a:p>
+            <a:r>
+              <a:rPr lang="ko-KR" altLang="en-US" sz="2400" dirty="0">
+                <a:latin typeface="더잠실 2 Light" panose="00000300000000000000" pitchFamily="2" charset="-127"/>
+                <a:ea typeface="더잠실 2 Light" panose="00000300000000000000" pitchFamily="2" charset="-127"/>
+                <a:sym typeface="Wingdings" panose="05000000000000000000" pitchFamily="2" charset="2"/>
+              </a:rPr>
+              <a:t>그래프 탐색</a:t>
+            </a:r>
+            <a:r>
+              <a:rPr lang="en-US" altLang="ko-KR" sz="2400" dirty="0">
+                <a:latin typeface="더잠실 2 Light" panose="00000300000000000000" pitchFamily="2" charset="-127"/>
+                <a:ea typeface="더잠실 2 Light" panose="00000300000000000000" pitchFamily="2" charset="-127"/>
+                <a:sym typeface="Wingdings" panose="05000000000000000000" pitchFamily="2" charset="2"/>
+              </a:rPr>
+              <a:t>, </a:t>
+            </a:r>
+            <a:r>
+              <a:rPr lang="ko-KR" altLang="en-US" sz="2400" dirty="0">
+                <a:latin typeface="더잠실 2 Light" panose="00000300000000000000" pitchFamily="2" charset="-127"/>
+                <a:ea typeface="더잠실 2 Light" panose="00000300000000000000" pitchFamily="2" charset="-127"/>
+                <a:sym typeface="Wingdings" panose="05000000000000000000" pitchFamily="2" charset="2"/>
+              </a:rPr>
+              <a:t>스케줄링 등 </a:t>
+            </a:r>
+            <a:r>
+              <a:rPr lang="ko-KR" altLang="en-US" sz="2400" dirty="0">
+                <a:highlight>
+                  <a:srgbClr val="FFFF00"/>
+                </a:highlight>
+                <a:latin typeface="더잠실 2 Light" panose="00000300000000000000" pitchFamily="2" charset="-127"/>
+                <a:ea typeface="더잠실 2 Light" panose="00000300000000000000" pitchFamily="2" charset="-127"/>
+                <a:sym typeface="Wingdings" panose="05000000000000000000" pitchFamily="2" charset="2"/>
+              </a:rPr>
+              <a:t>중요 알고리즘들의 기초</a:t>
+            </a:r>
+            <a:r>
+              <a:rPr lang="ko-KR" altLang="en-US" sz="2400" dirty="0">
+                <a:latin typeface="더잠실 2 Light" panose="00000300000000000000" pitchFamily="2" charset="-127"/>
+                <a:ea typeface="더잠실 2 Light" panose="00000300000000000000" pitchFamily="2" charset="-127"/>
+                <a:sym typeface="Wingdings" panose="05000000000000000000" pitchFamily="2" charset="2"/>
+              </a:rPr>
+              <a:t>가 됨</a:t>
+            </a:r>
+            <a:endParaRPr lang="en-US" altLang="ko-KR" sz="2400" dirty="0">
+              <a:latin typeface="더잠실 2 Light" panose="00000300000000000000" pitchFamily="2" charset="-127"/>
+              <a:ea typeface="더잠실 2 Light" panose="00000300000000000000" pitchFamily="2" charset="-127"/>
+              <a:sym typeface="Wingdings" panose="05000000000000000000" pitchFamily="2" charset="2"/>
+            </a:endParaRPr>
+          </a:p>
+          <a:p>
+            <a:endParaRPr lang="en-US" altLang="ko-KR" sz="2400" dirty="0">
+              <a:latin typeface="더잠실 2 Light" panose="00000300000000000000" pitchFamily="2" charset="-127"/>
+              <a:ea typeface="더잠실 2 Light" panose="00000300000000000000" pitchFamily="2" charset="-127"/>
+              <a:sym typeface="Wingdings" panose="05000000000000000000" pitchFamily="2" charset="2"/>
+            </a:endParaRPr>
+          </a:p>
+          <a:p>
+            <a:r>
+              <a:rPr lang="ko-KR" altLang="en-US" sz="2400" dirty="0">
+                <a:latin typeface="더잠실 2 Light" panose="00000300000000000000" pitchFamily="2" charset="-127"/>
+                <a:ea typeface="더잠실 2 Light" panose="00000300000000000000" pitchFamily="2" charset="-127"/>
+              </a:rPr>
+              <a:t>일단 </a:t>
+            </a:r>
+            <a:r>
+              <a:rPr lang="ko-KR" altLang="en-US" sz="2400" dirty="0">
+                <a:highlight>
+                  <a:srgbClr val="FFFF00"/>
+                </a:highlight>
+                <a:latin typeface="더잠실 2 Light" panose="00000300000000000000" pitchFamily="2" charset="-127"/>
+                <a:ea typeface="더잠실 2 Light" panose="00000300000000000000" pitchFamily="2" charset="-127"/>
+              </a:rPr>
+              <a:t>시험에 나온다</a:t>
+            </a:r>
+            <a:r>
+              <a:rPr lang="en-US" altLang="ko-KR" sz="2400" dirty="0">
+                <a:highlight>
+                  <a:srgbClr val="FFFF00"/>
+                </a:highlight>
+                <a:latin typeface="더잠실 2 Light" panose="00000300000000000000" pitchFamily="2" charset="-127"/>
+                <a:ea typeface="더잠실 2 Light" panose="00000300000000000000" pitchFamily="2" charset="-127"/>
+              </a:rPr>
+              <a:t>.</a:t>
+            </a:r>
+            <a:r>
+              <a:rPr lang="ko-KR" altLang="en-US" sz="2400" dirty="0">
+                <a:highlight>
+                  <a:srgbClr val="FFFF00"/>
+                </a:highlight>
+                <a:latin typeface="더잠실 2 Light" panose="00000300000000000000" pitchFamily="2" charset="-127"/>
+                <a:ea typeface="더잠실 2 Light" panose="00000300000000000000" pitchFamily="2" charset="-127"/>
+              </a:rPr>
+              <a:t> </a:t>
+            </a:r>
+            <a:endParaRPr lang="en-US" altLang="ko-KR" sz="2400" dirty="0">
+              <a:highlight>
+                <a:srgbClr val="FFFF00"/>
+              </a:highlight>
+              <a:latin typeface="더잠실 2 Light" panose="00000300000000000000" pitchFamily="2" charset="-127"/>
+              <a:ea typeface="더잠실 2 Light" panose="00000300000000000000" pitchFamily="2" charset="-127"/>
+            </a:endParaRPr>
+          </a:p>
+        </p:txBody>
+      </p:sp>
+      <p:sp>
+        <p:nvSpPr>
+          <p:cNvPr id="4" name="슬라이드 번호 개체 틀 3">
+            <a:extLst>
+              <a:ext uri="{FF2B5EF4-FFF2-40B4-BE49-F238E27FC236}">
+                <a16:creationId xmlns:a16="http://schemas.microsoft.com/office/drawing/2014/main" id="{FC7D14A4-5824-D28A-C5EF-2B7B2D29CEFA}"/>
+              </a:ext>
+            </a:extLst>
+          </p:cNvPr>
+          <p:cNvSpPr>
+            <a:spLocks noGrp="1"/>
+          </p:cNvSpPr>
+          <p:nvPr>
+            <p:ph type="sldNum" sz="quarter" idx="12"/>
+          </p:nvPr>
+        </p:nvSpPr>
+        <p:spPr/>
+        <p:txBody>
+          <a:bodyPr/>
+          <a:lstStyle/>
+          <a:p>
+            <a:fld id="{35B45C20-CD26-4AB6-99FD-1165E1BECAF9}" type="slidenum">
+              <a:rPr lang="ko-KR" altLang="en-US" smtClean="0"/>
+              <a:t>34</a:t>
+            </a:fld>
+            <a:endParaRPr lang="ko-KR" altLang="en-US"/>
+          </a:p>
+        </p:txBody>
+      </p:sp>
+    </p:spTree>
+    <p:extLst>
+      <p:ext uri="{BB962C8B-B14F-4D97-AF65-F5344CB8AC3E}">
+        <p14:creationId xmlns:p14="http://schemas.microsoft.com/office/powerpoint/2010/main" val="1499562507"/>
+      </p:ext>
+    </p:extLst>
+  </p:cSld>
+  <p:clrMapOvr>
+    <a:masterClrMapping/>
+  </p:clrMapOvr>
+</p:sld>
+</file>
+
+<file path=ppt/slides/slide35.xml><?xml version="1.0" encoding="utf-8"?>
+<p:sld xmlns:a="http://schemas.openxmlformats.org/drawingml/2006/main" xmlns:r="http://schemas.openxmlformats.org/officeDocument/2006/relationships" xmlns:p="http://schemas.openxmlformats.org/presentationml/2006/main">
+  <p:cSld>
+    <p:spTree>
+      <p:nvGrpSpPr>
+        <p:cNvPr id="1" name=""/>
+        <p:cNvGrpSpPr/>
+        <p:nvPr/>
+      </p:nvGrpSpPr>
+      <p:grpSpPr>
+        <a:xfrm>
+          <a:off x="0" y="0"/>
+          <a:ext cx="0" cy="0"/>
+          <a:chOff x="0" y="0"/>
+          <a:chExt cx="0" cy="0"/>
+        </a:xfrm>
+      </p:grpSpPr>
+      <p:sp>
+        <p:nvSpPr>
+          <p:cNvPr id="2" name="제목 1">
+            <a:extLst>
+              <a:ext uri="{FF2B5EF4-FFF2-40B4-BE49-F238E27FC236}">
+                <a16:creationId xmlns:a16="http://schemas.microsoft.com/office/drawing/2014/main" id="{AB9628C0-8072-33FF-876B-D442BA5CF3B5}"/>
+              </a:ext>
+            </a:extLst>
+          </p:cNvPr>
+          <p:cNvSpPr>
+            <a:spLocks noGrp="1"/>
+          </p:cNvSpPr>
+          <p:nvPr>
+            <p:ph type="title"/>
+          </p:nvPr>
+        </p:nvSpPr>
+        <p:spPr/>
+        <p:txBody>
+          <a:bodyPr/>
+          <a:lstStyle/>
+          <a:p>
+            <a:r>
+              <a:rPr lang="ko-KR" altLang="en-US" dirty="0">
+                <a:latin typeface="더잠실 3 Regular" panose="00000500000000000000" pitchFamily="2" charset="-127"/>
+                <a:ea typeface="더잠실 3 Regular" panose="00000500000000000000" pitchFamily="2" charset="-127"/>
+              </a:rPr>
+              <a:t>자료구조를 편하게 사용하는 방법</a:t>
+            </a:r>
+          </a:p>
+        </p:txBody>
+      </p:sp>
+      <p:sp>
+        <p:nvSpPr>
+          <p:cNvPr id="3" name="내용 개체 틀 2">
+            <a:extLst>
+              <a:ext uri="{FF2B5EF4-FFF2-40B4-BE49-F238E27FC236}">
+                <a16:creationId xmlns:a16="http://schemas.microsoft.com/office/drawing/2014/main" id="{822CC84C-98E6-791B-DCF0-8CC7AFD0F32F}"/>
+              </a:ext>
+            </a:extLst>
+          </p:cNvPr>
+          <p:cNvSpPr>
+            <a:spLocks noGrp="1"/>
+          </p:cNvSpPr>
+          <p:nvPr>
+            <p:ph idx="1"/>
+          </p:nvPr>
+        </p:nvSpPr>
+        <p:spPr/>
+        <p:txBody>
+          <a:bodyPr/>
+          <a:lstStyle/>
+          <a:p>
+            <a:pPr marL="0" indent="0">
+              <a:buNone/>
+            </a:pPr>
+            <a:r>
+              <a:rPr lang="en-US" altLang="ko-KR" dirty="0"/>
+              <a:t>howToUseModule.py</a:t>
+            </a:r>
+            <a:endParaRPr lang="ko-KR" altLang="en-US" dirty="0"/>
+          </a:p>
+        </p:txBody>
+      </p:sp>
+      <p:sp>
+        <p:nvSpPr>
+          <p:cNvPr id="4" name="슬라이드 번호 개체 틀 3">
+            <a:extLst>
+              <a:ext uri="{FF2B5EF4-FFF2-40B4-BE49-F238E27FC236}">
+                <a16:creationId xmlns:a16="http://schemas.microsoft.com/office/drawing/2014/main" id="{1A5D7F43-97D1-858E-CF95-61AED20A68B3}"/>
+              </a:ext>
+            </a:extLst>
+          </p:cNvPr>
+          <p:cNvSpPr>
+            <a:spLocks noGrp="1"/>
+          </p:cNvSpPr>
+          <p:nvPr>
+            <p:ph type="sldNum" sz="quarter" idx="12"/>
+          </p:nvPr>
+        </p:nvSpPr>
+        <p:spPr/>
+        <p:txBody>
+          <a:bodyPr/>
+          <a:lstStyle/>
+          <a:p>
+            <a:fld id="{35B45C20-CD26-4AB6-99FD-1165E1BECAF9}" type="slidenum">
+              <a:rPr lang="ko-KR" altLang="en-US" smtClean="0"/>
+              <a:t>35</a:t>
+            </a:fld>
+            <a:endParaRPr lang="ko-KR" altLang="en-US"/>
+          </a:p>
+        </p:txBody>
+      </p:sp>
+    </p:spTree>
+    <p:extLst>
+      <p:ext uri="{BB962C8B-B14F-4D97-AF65-F5344CB8AC3E}">
+        <p14:creationId xmlns:p14="http://schemas.microsoft.com/office/powerpoint/2010/main" val="2795011746"/>
+      </p:ext>
+    </p:extLst>
+  </p:cSld>
+  <p:clrMapOvr>
+    <a:masterClrMapping/>
+  </p:clrMapOvr>
+</p:sld>
+</file>
+
+<file path=ppt/slides/slide36.xml><?xml version="1.0" encoding="utf-8"?>
+<p:sld xmlns:a="http://schemas.openxmlformats.org/drawingml/2006/main" xmlns:r="http://schemas.openxmlformats.org/officeDocument/2006/relationships" xmlns:p="http://schemas.openxmlformats.org/presentationml/2006/main">
+  <p:cSld>
+    <p:spTree>
+      <p:nvGrpSpPr>
+        <p:cNvPr id="1" name=""/>
+        <p:cNvGrpSpPr/>
+        <p:nvPr/>
+      </p:nvGrpSpPr>
+      <p:grpSpPr>
+        <a:xfrm>
+          <a:off x="0" y="0"/>
+          <a:ext cx="0" cy="0"/>
+          <a:chOff x="0" y="0"/>
+          <a:chExt cx="0" cy="0"/>
+        </a:xfrm>
+      </p:grpSpPr>
+      <p:sp>
+        <p:nvSpPr>
+          <p:cNvPr id="2" name="제목 1">
+            <a:extLst>
+              <a:ext uri="{FF2B5EF4-FFF2-40B4-BE49-F238E27FC236}">
+                <a16:creationId xmlns:a16="http://schemas.microsoft.com/office/drawing/2014/main" id="{959A6062-92B1-51A5-4180-37B2EEED303F}"/>
+              </a:ext>
+            </a:extLst>
+          </p:cNvPr>
+          <p:cNvSpPr>
+            <a:spLocks noGrp="1"/>
+          </p:cNvSpPr>
+          <p:nvPr>
+            <p:ph type="title"/>
+          </p:nvPr>
+        </p:nvSpPr>
+        <p:spPr/>
+        <p:txBody>
+          <a:bodyPr/>
+          <a:lstStyle/>
+          <a:p>
+            <a:r>
+              <a:rPr lang="ko-KR" altLang="en-US" dirty="0">
+                <a:latin typeface="더잠실 3 Regular" panose="00000500000000000000" pitchFamily="2" charset="-127"/>
+                <a:ea typeface="더잠실 3 Regular" panose="00000500000000000000" pitchFamily="2" charset="-127"/>
+              </a:rPr>
+              <a:t>자료구조를 사용하는 예제</a:t>
+            </a:r>
+          </a:p>
+        </p:txBody>
+      </p:sp>
+      <p:sp>
+        <p:nvSpPr>
+          <p:cNvPr id="3" name="내용 개체 틀 2">
+            <a:extLst>
+              <a:ext uri="{FF2B5EF4-FFF2-40B4-BE49-F238E27FC236}">
+                <a16:creationId xmlns:a16="http://schemas.microsoft.com/office/drawing/2014/main" id="{85E87407-DFA5-9D52-7871-291BFB8162F9}"/>
+              </a:ext>
+            </a:extLst>
+          </p:cNvPr>
+          <p:cNvSpPr>
+            <a:spLocks noGrp="1"/>
+          </p:cNvSpPr>
+          <p:nvPr>
+            <p:ph idx="1"/>
+          </p:nvPr>
+        </p:nvSpPr>
+        <p:spPr/>
+        <p:txBody>
+          <a:bodyPr/>
+          <a:lstStyle/>
+          <a:p>
+            <a:r>
+              <a:rPr lang="ko-KR" altLang="en-US" dirty="0">
+                <a:latin typeface="더잠실 2 Light" panose="00000300000000000000" pitchFamily="2" charset="-127"/>
+                <a:ea typeface="더잠실 2 Light" panose="00000300000000000000" pitchFamily="2" charset="-127"/>
+              </a:rPr>
+              <a:t>괄호  </a:t>
+            </a:r>
+            <a:r>
+              <a:rPr lang="en-US" altLang="ko-KR" dirty="0">
+                <a:latin typeface="더잠실 2 Light" panose="00000300000000000000" pitchFamily="2" charset="-127"/>
+                <a:ea typeface="더잠실 2 Light" panose="00000300000000000000" pitchFamily="2" charset="-127"/>
+                <a:hlinkClick r:id="rId2"/>
+              </a:rPr>
+              <a:t>https://www.acmicpc.net/problem/9012</a:t>
+            </a:r>
+            <a:endParaRPr lang="en-US" altLang="ko-KR" dirty="0">
+              <a:latin typeface="더잠실 2 Light" panose="00000300000000000000" pitchFamily="2" charset="-127"/>
+              <a:ea typeface="더잠실 2 Light" panose="00000300000000000000" pitchFamily="2" charset="-127"/>
+            </a:endParaRPr>
+          </a:p>
+          <a:p>
+            <a:endParaRPr lang="en-US" altLang="ko-KR" dirty="0">
+              <a:latin typeface="더잠실 2 Light" panose="00000300000000000000" pitchFamily="2" charset="-127"/>
+              <a:ea typeface="더잠실 2 Light" panose="00000300000000000000" pitchFamily="2" charset="-127"/>
+            </a:endParaRPr>
+          </a:p>
+          <a:p>
+            <a:r>
+              <a:rPr lang="ko-KR" altLang="en-US" dirty="0">
+                <a:latin typeface="더잠실 2 Light" panose="00000300000000000000" pitchFamily="2" charset="-127"/>
+                <a:ea typeface="더잠실 2 Light" panose="00000300000000000000" pitchFamily="2" charset="-127"/>
+              </a:rPr>
+              <a:t>카드</a:t>
+            </a:r>
+            <a:r>
+              <a:rPr lang="en-US" altLang="ko-KR" dirty="0">
+                <a:latin typeface="더잠실 2 Light" panose="00000300000000000000" pitchFamily="2" charset="-127"/>
+                <a:ea typeface="더잠실 2 Light" panose="00000300000000000000" pitchFamily="2" charset="-127"/>
+              </a:rPr>
+              <a:t>2  </a:t>
+            </a:r>
+            <a:r>
+              <a:rPr lang="en-US" altLang="ko-KR" dirty="0">
+                <a:latin typeface="더잠실 2 Light" panose="00000300000000000000" pitchFamily="2" charset="-127"/>
+                <a:ea typeface="더잠실 2 Light" panose="00000300000000000000" pitchFamily="2" charset="-127"/>
+                <a:hlinkClick r:id="rId3"/>
+              </a:rPr>
+              <a:t>https://www.acmicpc.net/problem/2164</a:t>
+            </a:r>
+            <a:endParaRPr lang="en-US" altLang="ko-KR" dirty="0">
+              <a:latin typeface="더잠실 2 Light" panose="00000300000000000000" pitchFamily="2" charset="-127"/>
+              <a:ea typeface="더잠실 2 Light" panose="00000300000000000000" pitchFamily="2" charset="-127"/>
+            </a:endParaRPr>
+          </a:p>
+          <a:p>
+            <a:endParaRPr lang="en-US" altLang="ko-KR" dirty="0">
+              <a:latin typeface="더잠실 2 Light" panose="00000300000000000000" pitchFamily="2" charset="-127"/>
+              <a:ea typeface="더잠실 2 Light" panose="00000300000000000000" pitchFamily="2" charset="-127"/>
+            </a:endParaRPr>
+          </a:p>
+          <a:p>
+            <a:r>
+              <a:rPr lang="ko-KR" altLang="en-US" dirty="0">
+                <a:latin typeface="더잠실 2 Light" panose="00000300000000000000" pitchFamily="2" charset="-127"/>
+                <a:ea typeface="더잠실 2 Light" panose="00000300000000000000" pitchFamily="2" charset="-127"/>
+              </a:rPr>
+              <a:t>프린터 큐 </a:t>
+            </a:r>
+            <a:r>
+              <a:rPr lang="en-US" altLang="ko-KR" dirty="0">
+                <a:latin typeface="더잠실 2 Light" panose="00000300000000000000" pitchFamily="2" charset="-127"/>
+                <a:ea typeface="더잠실 2 Light" panose="00000300000000000000" pitchFamily="2" charset="-127"/>
+                <a:hlinkClick r:id="rId4"/>
+              </a:rPr>
+              <a:t>https://www.acmicpc.net/problem/1966</a:t>
+            </a:r>
+            <a:endParaRPr lang="ko-KR" altLang="en-US" dirty="0">
+              <a:latin typeface="더잠실 2 Light" panose="00000300000000000000" pitchFamily="2" charset="-127"/>
+              <a:ea typeface="더잠실 2 Light" panose="00000300000000000000" pitchFamily="2" charset="-127"/>
+            </a:endParaRPr>
+          </a:p>
+        </p:txBody>
+      </p:sp>
+      <p:sp>
+        <p:nvSpPr>
+          <p:cNvPr id="4" name="슬라이드 번호 개체 틀 3">
+            <a:extLst>
+              <a:ext uri="{FF2B5EF4-FFF2-40B4-BE49-F238E27FC236}">
+                <a16:creationId xmlns:a16="http://schemas.microsoft.com/office/drawing/2014/main" id="{F234C5CB-6FF1-ADAD-1272-4F99D0B8948D}"/>
+              </a:ext>
+            </a:extLst>
+          </p:cNvPr>
+          <p:cNvSpPr>
+            <a:spLocks noGrp="1"/>
+          </p:cNvSpPr>
+          <p:nvPr>
+            <p:ph type="sldNum" sz="quarter" idx="12"/>
+          </p:nvPr>
+        </p:nvSpPr>
+        <p:spPr/>
+        <p:txBody>
+          <a:bodyPr/>
+          <a:lstStyle/>
+          <a:p>
+            <a:fld id="{35B45C20-CD26-4AB6-99FD-1165E1BECAF9}" type="slidenum">
+              <a:rPr lang="ko-KR" altLang="en-US" smtClean="0"/>
+              <a:t>36</a:t>
+            </a:fld>
+            <a:endParaRPr lang="ko-KR" altLang="en-US"/>
+          </a:p>
+        </p:txBody>
+      </p:sp>
+    </p:spTree>
+    <p:extLst>
+      <p:ext uri="{BB962C8B-B14F-4D97-AF65-F5344CB8AC3E}">
+        <p14:creationId xmlns:p14="http://schemas.microsoft.com/office/powerpoint/2010/main" val="1828514258"/>
       </p:ext>
     </p:extLst>
   </p:cSld>

</xml_diff>